<commit_message>
graphs for Espacenet patents and adjustment to presentation
</commit_message>
<xml_diff>
--- a/presentation/DataDrivenForesight.pptx
+++ b/presentation/DataDrivenForesight.pptx
@@ -13,6 +13,11 @@
     <p:sldId id="261" r:id="rId7"/>
     <p:sldId id="262" r:id="rId8"/>
     <p:sldId id="263" r:id="rId9"/>
+    <p:sldId id="265" r:id="rId10"/>
+    <p:sldId id="266" r:id="rId11"/>
+    <p:sldId id="268" r:id="rId12"/>
+    <p:sldId id="269" r:id="rId13"/>
+    <p:sldId id="270" r:id="rId14"/>
   </p:sldIdLst>
   <p:sldSz cx="12192000" cy="6858000"/>
   <p:notesSz cx="6858000" cy="9144000"/>
@@ -258,7 +263,7 @@
           <a:p>
             <a:fld id="{846CE7D5-CF57-46EF-B807-FDD0502418D4}" type="datetimeFigureOut">
               <a:rPr lang="en-GB" smtClean="0"/>
-              <a:t>04/01/2025</a:t>
+              <a:t>05/01/2025</a:t>
             </a:fld>
             <a:endParaRPr lang="en-GB"/>
           </a:p>
@@ -300,7 +305,7 @@
           <a:p>
             <a:fld id="{330EA680-D336-4FF7-8B7A-9848BB0A1C32}" type="slidenum">
               <a:rPr lang="en-GB" smtClean="0"/>
-              <a:t>‹Nr.›</a:t>
+              <a:t>‹#›</a:t>
             </a:fld>
             <a:endParaRPr lang="en-GB"/>
           </a:p>
@@ -428,7 +433,7 @@
           <a:p>
             <a:fld id="{846CE7D5-CF57-46EF-B807-FDD0502418D4}" type="datetimeFigureOut">
               <a:rPr lang="en-GB" smtClean="0"/>
-              <a:t>04/01/2025</a:t>
+              <a:t>05/01/2025</a:t>
             </a:fld>
             <a:endParaRPr lang="en-GB"/>
           </a:p>
@@ -470,7 +475,7 @@
           <a:p>
             <a:fld id="{330EA680-D336-4FF7-8B7A-9848BB0A1C32}" type="slidenum">
               <a:rPr lang="en-GB" smtClean="0"/>
-              <a:t>‹Nr.›</a:t>
+              <a:t>‹#›</a:t>
             </a:fld>
             <a:endParaRPr lang="en-GB"/>
           </a:p>
@@ -608,7 +613,7 @@
           <a:p>
             <a:fld id="{846CE7D5-CF57-46EF-B807-FDD0502418D4}" type="datetimeFigureOut">
               <a:rPr lang="en-GB" smtClean="0"/>
-              <a:t>04/01/2025</a:t>
+              <a:t>05/01/2025</a:t>
             </a:fld>
             <a:endParaRPr lang="en-GB"/>
           </a:p>
@@ -650,7 +655,7 @@
           <a:p>
             <a:fld id="{330EA680-D336-4FF7-8B7A-9848BB0A1C32}" type="slidenum">
               <a:rPr lang="en-GB" smtClean="0"/>
-              <a:t>‹Nr.›</a:t>
+              <a:t>‹#›</a:t>
             </a:fld>
             <a:endParaRPr lang="en-GB"/>
           </a:p>
@@ -778,7 +783,7 @@
           <a:p>
             <a:fld id="{846CE7D5-CF57-46EF-B807-FDD0502418D4}" type="datetimeFigureOut">
               <a:rPr lang="en-GB" smtClean="0"/>
-              <a:t>04/01/2025</a:t>
+              <a:t>05/01/2025</a:t>
             </a:fld>
             <a:endParaRPr lang="en-GB"/>
           </a:p>
@@ -820,7 +825,7 @@
           <a:p>
             <a:fld id="{330EA680-D336-4FF7-8B7A-9848BB0A1C32}" type="slidenum">
               <a:rPr lang="en-GB" smtClean="0"/>
-              <a:t>‹Nr.›</a:t>
+              <a:t>‹#›</a:t>
             </a:fld>
             <a:endParaRPr lang="en-GB"/>
           </a:p>
@@ -1024,7 +1029,7 @@
           <a:p>
             <a:fld id="{846CE7D5-CF57-46EF-B807-FDD0502418D4}" type="datetimeFigureOut">
               <a:rPr lang="en-GB" smtClean="0"/>
-              <a:t>04/01/2025</a:t>
+              <a:t>05/01/2025</a:t>
             </a:fld>
             <a:endParaRPr lang="en-GB"/>
           </a:p>
@@ -1066,7 +1071,7 @@
           <a:p>
             <a:fld id="{330EA680-D336-4FF7-8B7A-9848BB0A1C32}" type="slidenum">
               <a:rPr lang="en-GB" smtClean="0"/>
-              <a:t>‹Nr.›</a:t>
+              <a:t>‹#›</a:t>
             </a:fld>
             <a:endParaRPr lang="en-GB"/>
           </a:p>
@@ -1256,7 +1261,7 @@
           <a:p>
             <a:fld id="{846CE7D5-CF57-46EF-B807-FDD0502418D4}" type="datetimeFigureOut">
               <a:rPr lang="en-GB" smtClean="0"/>
-              <a:t>04/01/2025</a:t>
+              <a:t>05/01/2025</a:t>
             </a:fld>
             <a:endParaRPr lang="en-GB"/>
           </a:p>
@@ -1298,7 +1303,7 @@
           <a:p>
             <a:fld id="{330EA680-D336-4FF7-8B7A-9848BB0A1C32}" type="slidenum">
               <a:rPr lang="en-GB" smtClean="0"/>
-              <a:t>‹Nr.›</a:t>
+              <a:t>‹#›</a:t>
             </a:fld>
             <a:endParaRPr lang="en-GB"/>
           </a:p>
@@ -1623,7 +1628,7 @@
           <a:p>
             <a:fld id="{846CE7D5-CF57-46EF-B807-FDD0502418D4}" type="datetimeFigureOut">
               <a:rPr lang="en-GB" smtClean="0"/>
-              <a:t>04/01/2025</a:t>
+              <a:t>05/01/2025</a:t>
             </a:fld>
             <a:endParaRPr lang="en-GB"/>
           </a:p>
@@ -1665,7 +1670,7 @@
           <a:p>
             <a:fld id="{330EA680-D336-4FF7-8B7A-9848BB0A1C32}" type="slidenum">
               <a:rPr lang="en-GB" smtClean="0"/>
-              <a:t>‹Nr.›</a:t>
+              <a:t>‹#›</a:t>
             </a:fld>
             <a:endParaRPr lang="en-GB"/>
           </a:p>
@@ -1741,7 +1746,7 @@
           <a:p>
             <a:fld id="{846CE7D5-CF57-46EF-B807-FDD0502418D4}" type="datetimeFigureOut">
               <a:rPr lang="en-GB" smtClean="0"/>
-              <a:t>04/01/2025</a:t>
+              <a:t>05/01/2025</a:t>
             </a:fld>
             <a:endParaRPr lang="en-GB"/>
           </a:p>
@@ -1783,7 +1788,7 @@
           <a:p>
             <a:fld id="{330EA680-D336-4FF7-8B7A-9848BB0A1C32}" type="slidenum">
               <a:rPr lang="en-GB" smtClean="0"/>
-              <a:t>‹Nr.›</a:t>
+              <a:t>‹#›</a:t>
             </a:fld>
             <a:endParaRPr lang="en-GB"/>
           </a:p>
@@ -1836,7 +1841,7 @@
           <a:p>
             <a:fld id="{846CE7D5-CF57-46EF-B807-FDD0502418D4}" type="datetimeFigureOut">
               <a:rPr lang="en-GB" smtClean="0"/>
-              <a:t>04/01/2025</a:t>
+              <a:t>05/01/2025</a:t>
             </a:fld>
             <a:endParaRPr lang="en-GB"/>
           </a:p>
@@ -1878,7 +1883,7 @@
           <a:p>
             <a:fld id="{330EA680-D336-4FF7-8B7A-9848BB0A1C32}" type="slidenum">
               <a:rPr lang="en-GB" smtClean="0"/>
-              <a:t>‹Nr.›</a:t>
+              <a:t>‹#›</a:t>
             </a:fld>
             <a:endParaRPr lang="en-GB"/>
           </a:p>
@@ -2113,7 +2118,7 @@
           <a:p>
             <a:fld id="{846CE7D5-CF57-46EF-B807-FDD0502418D4}" type="datetimeFigureOut">
               <a:rPr lang="en-GB" smtClean="0"/>
-              <a:t>04/01/2025</a:t>
+              <a:t>05/01/2025</a:t>
             </a:fld>
             <a:endParaRPr lang="en-GB"/>
           </a:p>
@@ -2155,7 +2160,7 @@
           <a:p>
             <a:fld id="{330EA680-D336-4FF7-8B7A-9848BB0A1C32}" type="slidenum">
               <a:rPr lang="en-GB" smtClean="0"/>
-              <a:t>‹Nr.›</a:t>
+              <a:t>‹#›</a:t>
             </a:fld>
             <a:endParaRPr lang="en-GB"/>
           </a:p>
@@ -2370,7 +2375,7 @@
           <a:p>
             <a:fld id="{846CE7D5-CF57-46EF-B807-FDD0502418D4}" type="datetimeFigureOut">
               <a:rPr lang="en-GB" smtClean="0"/>
-              <a:t>04/01/2025</a:t>
+              <a:t>05/01/2025</a:t>
             </a:fld>
             <a:endParaRPr lang="en-GB"/>
           </a:p>
@@ -2412,7 +2417,7 @@
           <a:p>
             <a:fld id="{330EA680-D336-4FF7-8B7A-9848BB0A1C32}" type="slidenum">
               <a:rPr lang="en-GB" smtClean="0"/>
-              <a:t>‹Nr.›</a:t>
+              <a:t>‹#›</a:t>
             </a:fld>
             <a:endParaRPr lang="en-GB"/>
           </a:p>
@@ -2583,7 +2588,7 @@
           <a:p>
             <a:fld id="{846CE7D5-CF57-46EF-B807-FDD0502418D4}" type="datetimeFigureOut">
               <a:rPr lang="en-GB" smtClean="0"/>
-              <a:t>04/01/2025</a:t>
+              <a:t>05/01/2025</a:t>
             </a:fld>
             <a:endParaRPr lang="en-GB"/>
           </a:p>
@@ -2661,7 +2666,7 @@
           <a:p>
             <a:fld id="{330EA680-D336-4FF7-8B7A-9848BB0A1C32}" type="slidenum">
               <a:rPr lang="en-GB" smtClean="0"/>
-              <a:t>‹Nr.›</a:t>
+              <a:t>‹#›</a:t>
             </a:fld>
             <a:endParaRPr lang="en-GB"/>
           </a:p>
@@ -3062,6 +3067,482 @@
 </p:sld>
 </file>
 
+<file path=ppt/slides/slide10.xml><?xml version="1.0" encoding="utf-8"?>
+<p:sld xmlns:a="http://schemas.openxmlformats.org/drawingml/2006/main" xmlns:r="http://schemas.openxmlformats.org/officeDocument/2006/relationships" xmlns:p="http://schemas.openxmlformats.org/presentationml/2006/main">
+  <p:cSld>
+    <p:spTree>
+      <p:nvGrpSpPr>
+        <p:cNvPr id="1" name=""/>
+        <p:cNvGrpSpPr/>
+        <p:nvPr/>
+      </p:nvGrpSpPr>
+      <p:grpSpPr>
+        <a:xfrm>
+          <a:off x="0" y="0"/>
+          <a:ext cx="0" cy="0"/>
+          <a:chOff x="0" y="0"/>
+          <a:chExt cx="0" cy="0"/>
+        </a:xfrm>
+      </p:grpSpPr>
+      <p:sp>
+        <p:nvSpPr>
+          <p:cNvPr id="2" name="Title 1">
+            <a:extLst>
+              <a:ext uri="{FF2B5EF4-FFF2-40B4-BE49-F238E27FC236}">
+                <a16:creationId xmlns:a16="http://schemas.microsoft.com/office/drawing/2014/main" id="{A1B1FB28-5B8C-BCFB-04B3-54966AAE995C}"/>
+              </a:ext>
+            </a:extLst>
+          </p:cNvPr>
+          <p:cNvSpPr>
+            <a:spLocks noGrp="1"/>
+          </p:cNvSpPr>
+          <p:nvPr>
+            <p:ph type="title"/>
+          </p:nvPr>
+        </p:nvSpPr>
+        <p:spPr/>
+        <p:txBody>
+          <a:bodyPr/>
+          <a:lstStyle/>
+          <a:p>
+            <a:r>
+              <a:rPr lang="en-US" dirty="0" err="1"/>
+              <a:t>Espacenet</a:t>
+            </a:r>
+            <a:endParaRPr lang="en-DE" dirty="0"/>
+          </a:p>
+        </p:txBody>
+      </p:sp>
+      <p:pic>
+        <p:nvPicPr>
+          <p:cNvPr id="6" name="Content Placeholder 5" descr="A graph with orange line&#10;&#10;Description automatically generated">
+            <a:extLst>
+              <a:ext uri="{FF2B5EF4-FFF2-40B4-BE49-F238E27FC236}">
+                <a16:creationId xmlns:a16="http://schemas.microsoft.com/office/drawing/2014/main" id="{3B06DD3A-2AA8-12A5-CADB-AE91931A3D5D}"/>
+              </a:ext>
+            </a:extLst>
+          </p:cNvPr>
+          <p:cNvPicPr>
+            <a:picLocks noGrp="1" noChangeAspect="1"/>
+          </p:cNvPicPr>
+          <p:nvPr>
+            <p:ph idx="1"/>
+          </p:nvPr>
+        </p:nvPicPr>
+        <p:blipFill>
+          <a:blip r:embed="rId2">
+            <a:extLst>
+              <a:ext uri="{28A0092B-C50C-407E-A947-70E740481C1C}">
+                <a14:useLocalDpi xmlns:a14="http://schemas.microsoft.com/office/drawing/2010/main" val="0"/>
+              </a:ext>
+            </a:extLst>
+          </a:blip>
+          <a:stretch>
+            <a:fillRect/>
+          </a:stretch>
+        </p:blipFill>
+        <p:spPr>
+          <a:xfrm>
+            <a:off x="5183188" y="1572577"/>
+            <a:ext cx="6172200" cy="3703320"/>
+          </a:xfrm>
+        </p:spPr>
+      </p:pic>
+      <p:sp>
+        <p:nvSpPr>
+          <p:cNvPr id="4" name="Text Placeholder 3">
+            <a:extLst>
+              <a:ext uri="{FF2B5EF4-FFF2-40B4-BE49-F238E27FC236}">
+                <a16:creationId xmlns:a16="http://schemas.microsoft.com/office/drawing/2014/main" id="{EC61FC60-B060-12B2-5E82-55544DE04D4C}"/>
+              </a:ext>
+            </a:extLst>
+          </p:cNvPr>
+          <p:cNvSpPr>
+            <a:spLocks noGrp="1"/>
+          </p:cNvSpPr>
+          <p:nvPr>
+            <p:ph type="body" sz="half" idx="2"/>
+          </p:nvPr>
+        </p:nvSpPr>
+        <p:spPr/>
+        <p:txBody>
+          <a:bodyPr/>
+          <a:lstStyle/>
+          <a:p>
+            <a:endParaRPr lang="en-DE"/>
+          </a:p>
+        </p:txBody>
+      </p:sp>
+    </p:spTree>
+    <p:extLst>
+      <p:ext uri="{BB962C8B-B14F-4D97-AF65-F5344CB8AC3E}">
+        <p14:creationId xmlns:p14="http://schemas.microsoft.com/office/powerpoint/2010/main" val="3666487214"/>
+      </p:ext>
+    </p:extLst>
+  </p:cSld>
+  <p:clrMapOvr>
+    <a:masterClrMapping/>
+  </p:clrMapOvr>
+</p:sld>
+</file>
+
+<file path=ppt/slides/slide11.xml><?xml version="1.0" encoding="utf-8"?>
+<p:sld xmlns:a="http://schemas.openxmlformats.org/drawingml/2006/main" xmlns:r="http://schemas.openxmlformats.org/officeDocument/2006/relationships" xmlns:p="http://schemas.openxmlformats.org/presentationml/2006/main">
+  <p:cSld>
+    <p:spTree>
+      <p:nvGrpSpPr>
+        <p:cNvPr id="1" name=""/>
+        <p:cNvGrpSpPr/>
+        <p:nvPr/>
+      </p:nvGrpSpPr>
+      <p:grpSpPr>
+        <a:xfrm>
+          <a:off x="0" y="0"/>
+          <a:ext cx="0" cy="0"/>
+          <a:chOff x="0" y="0"/>
+          <a:chExt cx="0" cy="0"/>
+        </a:xfrm>
+      </p:grpSpPr>
+      <p:sp>
+        <p:nvSpPr>
+          <p:cNvPr id="2" name="Title 1">
+            <a:extLst>
+              <a:ext uri="{FF2B5EF4-FFF2-40B4-BE49-F238E27FC236}">
+                <a16:creationId xmlns:a16="http://schemas.microsoft.com/office/drawing/2014/main" id="{7103A217-21A5-7901-6120-28237D26EEE7}"/>
+              </a:ext>
+            </a:extLst>
+          </p:cNvPr>
+          <p:cNvSpPr>
+            <a:spLocks noGrp="1"/>
+          </p:cNvSpPr>
+          <p:nvPr>
+            <p:ph type="title"/>
+          </p:nvPr>
+        </p:nvSpPr>
+        <p:spPr/>
+        <p:txBody>
+          <a:bodyPr/>
+          <a:lstStyle/>
+          <a:p>
+            <a:r>
+              <a:rPr lang="en-US" dirty="0"/>
+              <a:t>WIPO</a:t>
+            </a:r>
+            <a:endParaRPr lang="en-DE" dirty="0"/>
+          </a:p>
+        </p:txBody>
+      </p:sp>
+      <p:pic>
+        <p:nvPicPr>
+          <p:cNvPr id="6" name="Content Placeholder 5" descr="A screenshot of a computer&#10;&#10;Description automatically generated">
+            <a:extLst>
+              <a:ext uri="{FF2B5EF4-FFF2-40B4-BE49-F238E27FC236}">
+                <a16:creationId xmlns:a16="http://schemas.microsoft.com/office/drawing/2014/main" id="{4B3A4204-5FA0-8266-8F40-B1B7C419A7FD}"/>
+              </a:ext>
+            </a:extLst>
+          </p:cNvPr>
+          <p:cNvPicPr>
+            <a:picLocks noGrp="1" noChangeAspect="1"/>
+          </p:cNvPicPr>
+          <p:nvPr>
+            <p:ph idx="1"/>
+          </p:nvPr>
+        </p:nvPicPr>
+        <p:blipFill>
+          <a:blip r:embed="rId2" cstate="print">
+            <a:extLst>
+              <a:ext uri="{28A0092B-C50C-407E-A947-70E740481C1C}">
+                <a14:useLocalDpi xmlns:a14="http://schemas.microsoft.com/office/drawing/2010/main" val="0"/>
+              </a:ext>
+            </a:extLst>
+          </a:blip>
+          <a:stretch>
+            <a:fillRect/>
+          </a:stretch>
+        </p:blipFill>
+        <p:spPr>
+          <a:xfrm>
+            <a:off x="5225609" y="2499396"/>
+            <a:ext cx="6172200" cy="1387771"/>
+          </a:xfrm>
+        </p:spPr>
+      </p:pic>
+      <p:sp>
+        <p:nvSpPr>
+          <p:cNvPr id="4" name="Text Placeholder 3">
+            <a:extLst>
+              <a:ext uri="{FF2B5EF4-FFF2-40B4-BE49-F238E27FC236}">
+                <a16:creationId xmlns:a16="http://schemas.microsoft.com/office/drawing/2014/main" id="{62A3F758-1198-A982-F141-E7B7353A52B0}"/>
+              </a:ext>
+            </a:extLst>
+          </p:cNvPr>
+          <p:cNvSpPr>
+            <a:spLocks noGrp="1"/>
+          </p:cNvSpPr>
+          <p:nvPr>
+            <p:ph type="body" sz="half" idx="2"/>
+          </p:nvPr>
+        </p:nvSpPr>
+        <p:spPr/>
+        <p:txBody>
+          <a:bodyPr/>
+          <a:lstStyle/>
+          <a:p>
+            <a:endParaRPr lang="en-DE"/>
+          </a:p>
+        </p:txBody>
+      </p:sp>
+    </p:spTree>
+    <p:extLst>
+      <p:ext uri="{BB962C8B-B14F-4D97-AF65-F5344CB8AC3E}">
+        <p14:creationId xmlns:p14="http://schemas.microsoft.com/office/powerpoint/2010/main" val="3145640299"/>
+      </p:ext>
+    </p:extLst>
+  </p:cSld>
+  <p:clrMapOvr>
+    <a:masterClrMapping/>
+  </p:clrMapOvr>
+</p:sld>
+</file>
+
+<file path=ppt/slides/slide12.xml><?xml version="1.0" encoding="utf-8"?>
+<p:sld xmlns:a="http://schemas.openxmlformats.org/drawingml/2006/main" xmlns:r="http://schemas.openxmlformats.org/officeDocument/2006/relationships" xmlns:p="http://schemas.openxmlformats.org/presentationml/2006/main">
+  <p:cSld>
+    <p:spTree>
+      <p:nvGrpSpPr>
+        <p:cNvPr id="1" name=""/>
+        <p:cNvGrpSpPr/>
+        <p:nvPr/>
+      </p:nvGrpSpPr>
+      <p:grpSpPr>
+        <a:xfrm>
+          <a:off x="0" y="0"/>
+          <a:ext cx="0" cy="0"/>
+          <a:chOff x="0" y="0"/>
+          <a:chExt cx="0" cy="0"/>
+        </a:xfrm>
+      </p:grpSpPr>
+      <p:sp>
+        <p:nvSpPr>
+          <p:cNvPr id="2" name="Title 1">
+            <a:extLst>
+              <a:ext uri="{FF2B5EF4-FFF2-40B4-BE49-F238E27FC236}">
+                <a16:creationId xmlns:a16="http://schemas.microsoft.com/office/drawing/2014/main" id="{2607136C-E885-609E-94FD-103F489D415B}"/>
+              </a:ext>
+            </a:extLst>
+          </p:cNvPr>
+          <p:cNvSpPr>
+            <a:spLocks noGrp="1"/>
+          </p:cNvSpPr>
+          <p:nvPr>
+            <p:ph type="title"/>
+          </p:nvPr>
+        </p:nvSpPr>
+        <p:spPr/>
+        <p:txBody>
+          <a:bodyPr/>
+          <a:lstStyle/>
+          <a:p>
+            <a:r>
+              <a:rPr lang="en-US" dirty="0"/>
+              <a:t>WIPO</a:t>
+            </a:r>
+            <a:endParaRPr lang="en-DE" dirty="0"/>
+          </a:p>
+        </p:txBody>
+      </p:sp>
+      <p:pic>
+        <p:nvPicPr>
+          <p:cNvPr id="6" name="Content Placeholder 5" descr="A graph with blue lines&#10;&#10;Description automatically generated with medium confidence">
+            <a:extLst>
+              <a:ext uri="{FF2B5EF4-FFF2-40B4-BE49-F238E27FC236}">
+                <a16:creationId xmlns:a16="http://schemas.microsoft.com/office/drawing/2014/main" id="{1F093164-2A53-596D-D50E-AC3E9C2EFF2F}"/>
+              </a:ext>
+            </a:extLst>
+          </p:cNvPr>
+          <p:cNvPicPr>
+            <a:picLocks noGrp="1" noChangeAspect="1"/>
+          </p:cNvPicPr>
+          <p:nvPr>
+            <p:ph idx="1"/>
+          </p:nvPr>
+        </p:nvPicPr>
+        <p:blipFill>
+          <a:blip r:embed="rId2" cstate="print">
+            <a:extLst>
+              <a:ext uri="{28A0092B-C50C-407E-A947-70E740481C1C}">
+                <a14:useLocalDpi xmlns:a14="http://schemas.microsoft.com/office/drawing/2010/main" val="0"/>
+              </a:ext>
+            </a:extLst>
+          </a:blip>
+          <a:stretch>
+            <a:fillRect/>
+          </a:stretch>
+        </p:blipFill>
+        <p:spPr>
+          <a:xfrm>
+            <a:off x="5183188" y="2738438"/>
+            <a:ext cx="6172200" cy="1371599"/>
+          </a:xfrm>
+        </p:spPr>
+      </p:pic>
+      <p:sp>
+        <p:nvSpPr>
+          <p:cNvPr id="4" name="Text Placeholder 3">
+            <a:extLst>
+              <a:ext uri="{FF2B5EF4-FFF2-40B4-BE49-F238E27FC236}">
+                <a16:creationId xmlns:a16="http://schemas.microsoft.com/office/drawing/2014/main" id="{A9E17B91-A842-294D-FDBB-489DAA25A9FA}"/>
+              </a:ext>
+            </a:extLst>
+          </p:cNvPr>
+          <p:cNvSpPr>
+            <a:spLocks noGrp="1"/>
+          </p:cNvSpPr>
+          <p:nvPr>
+            <p:ph type="body" sz="half" idx="2"/>
+          </p:nvPr>
+        </p:nvSpPr>
+        <p:spPr/>
+        <p:txBody>
+          <a:bodyPr/>
+          <a:lstStyle/>
+          <a:p>
+            <a:endParaRPr lang="en-DE"/>
+          </a:p>
+        </p:txBody>
+      </p:sp>
+    </p:spTree>
+    <p:extLst>
+      <p:ext uri="{BB962C8B-B14F-4D97-AF65-F5344CB8AC3E}">
+        <p14:creationId xmlns:p14="http://schemas.microsoft.com/office/powerpoint/2010/main" val="3793083112"/>
+      </p:ext>
+    </p:extLst>
+  </p:cSld>
+  <p:clrMapOvr>
+    <a:masterClrMapping/>
+  </p:clrMapOvr>
+</p:sld>
+</file>
+
+<file path=ppt/slides/slide13.xml><?xml version="1.0" encoding="utf-8"?>
+<p:sld xmlns:a="http://schemas.openxmlformats.org/drawingml/2006/main" xmlns:r="http://schemas.openxmlformats.org/officeDocument/2006/relationships" xmlns:p="http://schemas.openxmlformats.org/presentationml/2006/main">
+  <p:cSld>
+    <p:spTree>
+      <p:nvGrpSpPr>
+        <p:cNvPr id="1" name=""/>
+        <p:cNvGrpSpPr/>
+        <p:nvPr/>
+      </p:nvGrpSpPr>
+      <p:grpSpPr>
+        <a:xfrm>
+          <a:off x="0" y="0"/>
+          <a:ext cx="0" cy="0"/>
+          <a:chOff x="0" y="0"/>
+          <a:chExt cx="0" cy="0"/>
+        </a:xfrm>
+      </p:grpSpPr>
+      <p:sp>
+        <p:nvSpPr>
+          <p:cNvPr id="2" name="Title 1">
+            <a:extLst>
+              <a:ext uri="{FF2B5EF4-FFF2-40B4-BE49-F238E27FC236}">
+                <a16:creationId xmlns:a16="http://schemas.microsoft.com/office/drawing/2014/main" id="{48B0D354-45FF-F7F1-B31C-13325FBFAE41}"/>
+              </a:ext>
+            </a:extLst>
+          </p:cNvPr>
+          <p:cNvSpPr>
+            <a:spLocks noGrp="1"/>
+          </p:cNvSpPr>
+          <p:nvPr>
+            <p:ph type="title"/>
+          </p:nvPr>
+        </p:nvSpPr>
+        <p:spPr/>
+        <p:txBody>
+          <a:bodyPr/>
+          <a:lstStyle/>
+          <a:p>
+            <a:r>
+              <a:rPr lang="en-US" dirty="0"/>
+              <a:t>WIPO</a:t>
+            </a:r>
+            <a:endParaRPr lang="en-DE" dirty="0"/>
+          </a:p>
+        </p:txBody>
+      </p:sp>
+      <p:pic>
+        <p:nvPicPr>
+          <p:cNvPr id="6" name="Content Placeholder 5" descr="A graph with blue squares&#10;&#10;Description automatically generated with medium confidence">
+            <a:extLst>
+              <a:ext uri="{FF2B5EF4-FFF2-40B4-BE49-F238E27FC236}">
+                <a16:creationId xmlns:a16="http://schemas.microsoft.com/office/drawing/2014/main" id="{B59F976F-0FF9-CD23-DA00-823CD41175A3}"/>
+              </a:ext>
+            </a:extLst>
+          </p:cNvPr>
+          <p:cNvPicPr>
+            <a:picLocks noGrp="1" noChangeAspect="1"/>
+          </p:cNvPicPr>
+          <p:nvPr>
+            <p:ph idx="1"/>
+          </p:nvPr>
+        </p:nvPicPr>
+        <p:blipFill>
+          <a:blip r:embed="rId2" cstate="print">
+            <a:extLst>
+              <a:ext uri="{28A0092B-C50C-407E-A947-70E740481C1C}">
+                <a14:useLocalDpi xmlns:a14="http://schemas.microsoft.com/office/drawing/2010/main" val="0"/>
+              </a:ext>
+            </a:extLst>
+          </a:blip>
+          <a:stretch>
+            <a:fillRect/>
+          </a:stretch>
+        </p:blipFill>
+        <p:spPr>
+          <a:xfrm>
+            <a:off x="5183188" y="2736787"/>
+            <a:ext cx="6172200" cy="1374900"/>
+          </a:xfrm>
+        </p:spPr>
+      </p:pic>
+      <p:sp>
+        <p:nvSpPr>
+          <p:cNvPr id="4" name="Text Placeholder 3">
+            <a:extLst>
+              <a:ext uri="{FF2B5EF4-FFF2-40B4-BE49-F238E27FC236}">
+                <a16:creationId xmlns:a16="http://schemas.microsoft.com/office/drawing/2014/main" id="{B6B3E347-573E-8418-4C83-C104B4CA332C}"/>
+              </a:ext>
+            </a:extLst>
+          </p:cNvPr>
+          <p:cNvSpPr>
+            <a:spLocks noGrp="1"/>
+          </p:cNvSpPr>
+          <p:nvPr>
+            <p:ph type="body" sz="half" idx="2"/>
+          </p:nvPr>
+        </p:nvSpPr>
+        <p:spPr/>
+        <p:txBody>
+          <a:bodyPr/>
+          <a:lstStyle/>
+          <a:p>
+            <a:endParaRPr lang="en-DE" dirty="0"/>
+          </a:p>
+        </p:txBody>
+      </p:sp>
+    </p:spTree>
+    <p:extLst>
+      <p:ext uri="{BB962C8B-B14F-4D97-AF65-F5344CB8AC3E}">
+        <p14:creationId xmlns:p14="http://schemas.microsoft.com/office/powerpoint/2010/main" val="1780811718"/>
+      </p:ext>
+    </p:extLst>
+  </p:cSld>
+  <p:clrMapOvr>
+    <a:masterClrMapping/>
+  </p:clrMapOvr>
+</p:sld>
+</file>
+
 <file path=ppt/slides/slide2.xml><?xml version="1.0" encoding="utf-8"?>
 <p:sld xmlns:a="http://schemas.openxmlformats.org/drawingml/2006/main" xmlns:r="http://schemas.openxmlformats.org/officeDocument/2006/relationships" xmlns:p="http://schemas.openxmlformats.org/presentationml/2006/main">
   <p:cSld>
@@ -4402,13 +4883,8 @@
             </a:pPr>
             <a:r>
               <a:rPr lang="en-GB" dirty="0"/>
-              <a:t>Most institutes are located in </a:t>
-            </a:r>
-            <a:r>
-              <a:rPr lang="en-GB" err="1"/>
-              <a:t>china</a:t>
-            </a:r>
-            <a:endParaRPr lang="en-GB"/>
+              <a:t>Most institutes are located in China</a:t>
+            </a:r>
           </a:p>
           <a:p>
             <a:pPr marL="285750" indent="-285750">
@@ -4416,23 +4892,7 @@
             </a:pPr>
             <a:r>
               <a:rPr lang="en-GB" dirty="0"/>
-              <a:t>The </a:t>
-            </a:r>
-            <a:r>
-              <a:rPr lang="en-GB" dirty="0" err="1"/>
-              <a:t>chinese</a:t>
-            </a:r>
-            <a:r>
-              <a:rPr lang="en-GB" dirty="0"/>
-              <a:t> academy of sciences (CAS) is listed under three different names, possibly to different translations to </a:t>
-            </a:r>
-            <a:r>
-              <a:rPr lang="en-GB" dirty="0" err="1"/>
-              <a:t>english</a:t>
-            </a:r>
-            <a:r>
-              <a:rPr lang="en-GB" dirty="0"/>
-              <a:t>:</a:t>
+              <a:t>The Chinese Academy of Sciences (CAS) is listed under three different names, possibly to different translations to English:</a:t>
             </a:r>
           </a:p>
           <a:p>
@@ -4838,6 +5298,125 @@
     <p:extLst>
       <p:ext uri="{BB962C8B-B14F-4D97-AF65-F5344CB8AC3E}">
         <p14:creationId xmlns:p14="http://schemas.microsoft.com/office/powerpoint/2010/main" val="2163132736"/>
+      </p:ext>
+    </p:extLst>
+  </p:cSld>
+  <p:clrMapOvr>
+    <a:masterClrMapping/>
+  </p:clrMapOvr>
+</p:sld>
+</file>
+
+<file path=ppt/slides/slide9.xml><?xml version="1.0" encoding="utf-8"?>
+<p:sld xmlns:a="http://schemas.openxmlformats.org/drawingml/2006/main" xmlns:r="http://schemas.openxmlformats.org/officeDocument/2006/relationships" xmlns:p="http://schemas.openxmlformats.org/presentationml/2006/main">
+  <p:cSld>
+    <p:spTree>
+      <p:nvGrpSpPr>
+        <p:cNvPr id="1" name=""/>
+        <p:cNvGrpSpPr/>
+        <p:nvPr/>
+      </p:nvGrpSpPr>
+      <p:grpSpPr>
+        <a:xfrm>
+          <a:off x="0" y="0"/>
+          <a:ext cx="0" cy="0"/>
+          <a:chOff x="0" y="0"/>
+          <a:chExt cx="0" cy="0"/>
+        </a:xfrm>
+      </p:grpSpPr>
+      <p:sp>
+        <p:nvSpPr>
+          <p:cNvPr id="2" name="Title 1">
+            <a:extLst>
+              <a:ext uri="{FF2B5EF4-FFF2-40B4-BE49-F238E27FC236}">
+                <a16:creationId xmlns:a16="http://schemas.microsoft.com/office/drawing/2014/main" id="{2AB2648D-BA5B-91F5-8BC1-12201440757D}"/>
+              </a:ext>
+            </a:extLst>
+          </p:cNvPr>
+          <p:cNvSpPr>
+            <a:spLocks noGrp="1"/>
+          </p:cNvSpPr>
+          <p:nvPr>
+            <p:ph type="title"/>
+          </p:nvPr>
+        </p:nvSpPr>
+        <p:spPr/>
+        <p:txBody>
+          <a:bodyPr/>
+          <a:lstStyle/>
+          <a:p>
+            <a:r>
+              <a:rPr lang="en-US" dirty="0" err="1"/>
+              <a:t>Espacenet</a:t>
+            </a:r>
+            <a:endParaRPr lang="en-DE" dirty="0"/>
+          </a:p>
+        </p:txBody>
+      </p:sp>
+      <p:pic>
+        <p:nvPicPr>
+          <p:cNvPr id="6" name="Content Placeholder 5" descr="A graph with numbers and lines&#10;&#10;Description automatically generated">
+            <a:extLst>
+              <a:ext uri="{FF2B5EF4-FFF2-40B4-BE49-F238E27FC236}">
+                <a16:creationId xmlns:a16="http://schemas.microsoft.com/office/drawing/2014/main" id="{00CEFB6E-7FBC-873C-D07C-D4DA47C2DFA9}"/>
+              </a:ext>
+            </a:extLst>
+          </p:cNvPr>
+          <p:cNvPicPr>
+            <a:picLocks noGrp="1" noChangeAspect="1"/>
+          </p:cNvPicPr>
+          <p:nvPr>
+            <p:ph idx="1"/>
+          </p:nvPr>
+        </p:nvPicPr>
+        <p:blipFill>
+          <a:blip r:embed="rId2">
+            <a:extLst>
+              <a:ext uri="{28A0092B-C50C-407E-A947-70E740481C1C}">
+                <a14:useLocalDpi xmlns:a14="http://schemas.microsoft.com/office/drawing/2010/main" val="0"/>
+              </a:ext>
+            </a:extLst>
+          </a:blip>
+          <a:stretch>
+            <a:fillRect/>
+          </a:stretch>
+        </p:blipFill>
+        <p:spPr>
+          <a:xfrm>
+            <a:off x="5183188" y="1572577"/>
+            <a:ext cx="6172200" cy="3703320"/>
+          </a:xfrm>
+        </p:spPr>
+      </p:pic>
+      <p:sp>
+        <p:nvSpPr>
+          <p:cNvPr id="4" name="Text Placeholder 3">
+            <a:extLst>
+              <a:ext uri="{FF2B5EF4-FFF2-40B4-BE49-F238E27FC236}">
+                <a16:creationId xmlns:a16="http://schemas.microsoft.com/office/drawing/2014/main" id="{8DC21876-0FFB-AD28-4A1F-84768DB132F2}"/>
+              </a:ext>
+            </a:extLst>
+          </p:cNvPr>
+          <p:cNvSpPr>
+            <a:spLocks noGrp="1"/>
+          </p:cNvSpPr>
+          <p:nvPr>
+            <p:ph type="body" sz="half" idx="2"/>
+          </p:nvPr>
+        </p:nvSpPr>
+        <p:spPr/>
+        <p:txBody>
+          <a:bodyPr/>
+          <a:lstStyle/>
+          <a:p>
+            <a:endParaRPr lang="en-DE"/>
+          </a:p>
+        </p:txBody>
+      </p:sp>
+    </p:spTree>
+    <p:extLst>
+      <p:ext uri="{BB962C8B-B14F-4D97-AF65-F5344CB8AC3E}">
+        <p14:creationId xmlns:p14="http://schemas.microsoft.com/office/powerpoint/2010/main" val="233784213"/>
       </p:ext>
     </p:extLst>
   </p:cSld>

</xml_diff>

<commit_message>
updated presentation with graph designs that match the rest of the designs.
</commit_message>
<xml_diff>
--- a/presentation/DataDrivenForesight.pptx
+++ b/presentation/DataDrivenForesight.pptx
@@ -127,6 +127,7 @@
 <file path=ppt/revisionInfo.xml><?xml version="1.0" encoding="utf-8"?>
 <p1510:revInfo xmlns:a="http://schemas.openxmlformats.org/drawingml/2006/main" xmlns:r="http://schemas.openxmlformats.org/officeDocument/2006/relationships" xmlns:p1510="http://schemas.microsoft.com/office/powerpoint/2015/10/main">
   <p1510:revLst>
+    <p1510:client id="{51F9B3D5-8488-FBE2-A0B2-6C7041F5146D}" v="14" dt="2025-01-06T08:52:58.948"/>
     <p1510:client id="{540E3A87-2F00-841D-61E9-926E31F8BBFD}" v="736" dt="2025-01-04T10:53:10.167"/>
   </p1510:revLst>
 </p1510:revInfo>
@@ -263,7 +264,7 @@
           <a:p>
             <a:fld id="{846CE7D5-CF57-46EF-B807-FDD0502418D4}" type="datetimeFigureOut">
               <a:rPr lang="en-GB" smtClean="0"/>
-              <a:t>05/01/2025</a:t>
+              <a:t>06/01/2025</a:t>
             </a:fld>
             <a:endParaRPr lang="en-GB"/>
           </a:p>
@@ -433,7 +434,7 @@
           <a:p>
             <a:fld id="{846CE7D5-CF57-46EF-B807-FDD0502418D4}" type="datetimeFigureOut">
               <a:rPr lang="en-GB" smtClean="0"/>
-              <a:t>05/01/2025</a:t>
+              <a:t>06/01/2025</a:t>
             </a:fld>
             <a:endParaRPr lang="en-GB"/>
           </a:p>
@@ -613,7 +614,7 @@
           <a:p>
             <a:fld id="{846CE7D5-CF57-46EF-B807-FDD0502418D4}" type="datetimeFigureOut">
               <a:rPr lang="en-GB" smtClean="0"/>
-              <a:t>05/01/2025</a:t>
+              <a:t>06/01/2025</a:t>
             </a:fld>
             <a:endParaRPr lang="en-GB"/>
           </a:p>
@@ -783,7 +784,7 @@
           <a:p>
             <a:fld id="{846CE7D5-CF57-46EF-B807-FDD0502418D4}" type="datetimeFigureOut">
               <a:rPr lang="en-GB" smtClean="0"/>
-              <a:t>05/01/2025</a:t>
+              <a:t>06/01/2025</a:t>
             </a:fld>
             <a:endParaRPr lang="en-GB"/>
           </a:p>
@@ -1029,7 +1030,7 @@
           <a:p>
             <a:fld id="{846CE7D5-CF57-46EF-B807-FDD0502418D4}" type="datetimeFigureOut">
               <a:rPr lang="en-GB" smtClean="0"/>
-              <a:t>05/01/2025</a:t>
+              <a:t>06/01/2025</a:t>
             </a:fld>
             <a:endParaRPr lang="en-GB"/>
           </a:p>
@@ -1261,7 +1262,7 @@
           <a:p>
             <a:fld id="{846CE7D5-CF57-46EF-B807-FDD0502418D4}" type="datetimeFigureOut">
               <a:rPr lang="en-GB" smtClean="0"/>
-              <a:t>05/01/2025</a:t>
+              <a:t>06/01/2025</a:t>
             </a:fld>
             <a:endParaRPr lang="en-GB"/>
           </a:p>
@@ -1628,7 +1629,7 @@
           <a:p>
             <a:fld id="{846CE7D5-CF57-46EF-B807-FDD0502418D4}" type="datetimeFigureOut">
               <a:rPr lang="en-GB" smtClean="0"/>
-              <a:t>05/01/2025</a:t>
+              <a:t>06/01/2025</a:t>
             </a:fld>
             <a:endParaRPr lang="en-GB"/>
           </a:p>
@@ -1746,7 +1747,7 @@
           <a:p>
             <a:fld id="{846CE7D5-CF57-46EF-B807-FDD0502418D4}" type="datetimeFigureOut">
               <a:rPr lang="en-GB" smtClean="0"/>
-              <a:t>05/01/2025</a:t>
+              <a:t>06/01/2025</a:t>
             </a:fld>
             <a:endParaRPr lang="en-GB"/>
           </a:p>
@@ -1841,7 +1842,7 @@
           <a:p>
             <a:fld id="{846CE7D5-CF57-46EF-B807-FDD0502418D4}" type="datetimeFigureOut">
               <a:rPr lang="en-GB" smtClean="0"/>
-              <a:t>05/01/2025</a:t>
+              <a:t>06/01/2025</a:t>
             </a:fld>
             <a:endParaRPr lang="en-GB"/>
           </a:p>
@@ -2118,7 +2119,7 @@
           <a:p>
             <a:fld id="{846CE7D5-CF57-46EF-B807-FDD0502418D4}" type="datetimeFigureOut">
               <a:rPr lang="en-GB" smtClean="0"/>
-              <a:t>05/01/2025</a:t>
+              <a:t>06/01/2025</a:t>
             </a:fld>
             <a:endParaRPr lang="en-GB"/>
           </a:p>
@@ -2375,7 +2376,7 @@
           <a:p>
             <a:fld id="{846CE7D5-CF57-46EF-B807-FDD0502418D4}" type="datetimeFigureOut">
               <a:rPr lang="en-GB" smtClean="0"/>
-              <a:t>05/01/2025</a:t>
+              <a:t>06/01/2025</a:t>
             </a:fld>
             <a:endParaRPr lang="en-GB"/>
           </a:p>
@@ -2588,7 +2589,7 @@
           <a:p>
             <a:fld id="{846CE7D5-CF57-46EF-B807-FDD0502418D4}" type="datetimeFigureOut">
               <a:rPr lang="en-GB" smtClean="0"/>
-              <a:t>05/01/2025</a:t>
+              <a:t>06/01/2025</a:t>
             </a:fld>
             <a:endParaRPr lang="en-GB"/>
           </a:p>
@@ -3113,41 +3114,6 @@
           </a:p>
         </p:txBody>
       </p:sp>
-      <p:pic>
-        <p:nvPicPr>
-          <p:cNvPr id="6" name="Content Placeholder 5" descr="A graph with orange line&#10;&#10;Description automatically generated">
-            <a:extLst>
-              <a:ext uri="{FF2B5EF4-FFF2-40B4-BE49-F238E27FC236}">
-                <a16:creationId xmlns:a16="http://schemas.microsoft.com/office/drawing/2014/main" id="{3B06DD3A-2AA8-12A5-CADB-AE91931A3D5D}"/>
-              </a:ext>
-            </a:extLst>
-          </p:cNvPr>
-          <p:cNvPicPr>
-            <a:picLocks noGrp="1" noChangeAspect="1"/>
-          </p:cNvPicPr>
-          <p:nvPr>
-            <p:ph idx="1"/>
-          </p:nvPr>
-        </p:nvPicPr>
-        <p:blipFill>
-          <a:blip r:embed="rId2">
-            <a:extLst>
-              <a:ext uri="{28A0092B-C50C-407E-A947-70E740481C1C}">
-                <a14:useLocalDpi xmlns:a14="http://schemas.microsoft.com/office/drawing/2010/main" val="0"/>
-              </a:ext>
-            </a:extLst>
-          </a:blip>
-          <a:stretch>
-            <a:fillRect/>
-          </a:stretch>
-        </p:blipFill>
-        <p:spPr>
-          <a:xfrm>
-            <a:off x="5183188" y="1572577"/>
-            <a:ext cx="6172200" cy="3703320"/>
-          </a:xfrm>
-        </p:spPr>
-      </p:pic>
       <p:sp>
         <p:nvSpPr>
           <p:cNvPr id="4" name="Text Placeholder 3">
@@ -3173,6 +3139,35 @@
           </a:p>
         </p:txBody>
       </p:sp>
+      <p:pic>
+        <p:nvPicPr>
+          <p:cNvPr id="7" name="Content Placeholder 6" descr="A graph showing the growth of a book&#10;&#10;Description automatically generated">
+            <a:extLst>
+              <a:ext uri="{FF2B5EF4-FFF2-40B4-BE49-F238E27FC236}">
+                <a16:creationId xmlns:a16="http://schemas.microsoft.com/office/drawing/2014/main" id="{19EA9D37-D23E-EE12-4ACB-031C10461D17}"/>
+              </a:ext>
+            </a:extLst>
+          </p:cNvPr>
+          <p:cNvPicPr>
+            <a:picLocks noGrp="1" noChangeAspect="1"/>
+          </p:cNvPicPr>
+          <p:nvPr>
+            <p:ph idx="1"/>
+          </p:nvPr>
+        </p:nvPicPr>
+        <p:blipFill>
+          <a:blip r:embed="rId2"/>
+          <a:stretch>
+            <a:fillRect/>
+          </a:stretch>
+        </p:blipFill>
+        <p:spPr>
+          <a:xfrm>
+            <a:off x="5221288" y="1595437"/>
+            <a:ext cx="6096000" cy="3657600"/>
+          </a:xfrm>
+        </p:spPr>
+      </p:pic>
     </p:spTree>
     <p:extLst>
       <p:ext uri="{BB962C8B-B14F-4D97-AF65-F5344CB8AC3E}">
@@ -3351,41 +3346,6 @@
           </a:p>
         </p:txBody>
       </p:sp>
-      <p:pic>
-        <p:nvPicPr>
-          <p:cNvPr id="6" name="Content Placeholder 5" descr="A graph with blue lines&#10;&#10;Description automatically generated with medium confidence">
-            <a:extLst>
-              <a:ext uri="{FF2B5EF4-FFF2-40B4-BE49-F238E27FC236}">
-                <a16:creationId xmlns:a16="http://schemas.microsoft.com/office/drawing/2014/main" id="{1F093164-2A53-596D-D50E-AC3E9C2EFF2F}"/>
-              </a:ext>
-            </a:extLst>
-          </p:cNvPr>
-          <p:cNvPicPr>
-            <a:picLocks noGrp="1" noChangeAspect="1"/>
-          </p:cNvPicPr>
-          <p:nvPr>
-            <p:ph idx="1"/>
-          </p:nvPr>
-        </p:nvPicPr>
-        <p:blipFill>
-          <a:blip r:embed="rId2" cstate="print">
-            <a:extLst>
-              <a:ext uri="{28A0092B-C50C-407E-A947-70E740481C1C}">
-                <a14:useLocalDpi xmlns:a14="http://schemas.microsoft.com/office/drawing/2010/main" val="0"/>
-              </a:ext>
-            </a:extLst>
-          </a:blip>
-          <a:stretch>
-            <a:fillRect/>
-          </a:stretch>
-        </p:blipFill>
-        <p:spPr>
-          <a:xfrm>
-            <a:off x="5183188" y="2738438"/>
-            <a:ext cx="6172200" cy="1371599"/>
-          </a:xfrm>
-        </p:spPr>
-      </p:pic>
       <p:sp>
         <p:nvSpPr>
           <p:cNvPr id="4" name="Text Placeholder 3">
@@ -3411,6 +3371,35 @@
           </a:p>
         </p:txBody>
       </p:sp>
+      <p:pic>
+        <p:nvPicPr>
+          <p:cNvPr id="7" name="Content Placeholder 6" descr="A graph of blue and white bars&#10;&#10;Description automatically generated">
+            <a:extLst>
+              <a:ext uri="{FF2B5EF4-FFF2-40B4-BE49-F238E27FC236}">
+                <a16:creationId xmlns:a16="http://schemas.microsoft.com/office/drawing/2014/main" id="{28E7E884-2B3B-27CF-FF3A-73A149F825F9}"/>
+              </a:ext>
+            </a:extLst>
+          </p:cNvPr>
+          <p:cNvPicPr>
+            <a:picLocks noGrp="1" noChangeAspect="1"/>
+          </p:cNvPicPr>
+          <p:nvPr>
+            <p:ph idx="1"/>
+          </p:nvPr>
+        </p:nvPicPr>
+        <p:blipFill>
+          <a:blip r:embed="rId2"/>
+          <a:stretch>
+            <a:fillRect/>
+          </a:stretch>
+        </p:blipFill>
+        <p:spPr>
+          <a:xfrm>
+            <a:off x="5221288" y="1595437"/>
+            <a:ext cx="6096000" cy="3657600"/>
+          </a:xfrm>
+        </p:spPr>
+      </p:pic>
     </p:spTree>
     <p:extLst>
       <p:ext uri="{BB962C8B-B14F-4D97-AF65-F5344CB8AC3E}">
@@ -3470,41 +3459,6 @@
           </a:p>
         </p:txBody>
       </p:sp>
-      <p:pic>
-        <p:nvPicPr>
-          <p:cNvPr id="6" name="Content Placeholder 5" descr="A graph with blue squares&#10;&#10;Description automatically generated with medium confidence">
-            <a:extLst>
-              <a:ext uri="{FF2B5EF4-FFF2-40B4-BE49-F238E27FC236}">
-                <a16:creationId xmlns:a16="http://schemas.microsoft.com/office/drawing/2014/main" id="{B59F976F-0FF9-CD23-DA00-823CD41175A3}"/>
-              </a:ext>
-            </a:extLst>
-          </p:cNvPr>
-          <p:cNvPicPr>
-            <a:picLocks noGrp="1" noChangeAspect="1"/>
-          </p:cNvPicPr>
-          <p:nvPr>
-            <p:ph idx="1"/>
-          </p:nvPr>
-        </p:nvPicPr>
-        <p:blipFill>
-          <a:blip r:embed="rId2" cstate="print">
-            <a:extLst>
-              <a:ext uri="{28A0092B-C50C-407E-A947-70E740481C1C}">
-                <a14:useLocalDpi xmlns:a14="http://schemas.microsoft.com/office/drawing/2010/main" val="0"/>
-              </a:ext>
-            </a:extLst>
-          </a:blip>
-          <a:stretch>
-            <a:fillRect/>
-          </a:stretch>
-        </p:blipFill>
-        <p:spPr>
-          <a:xfrm>
-            <a:off x="5183188" y="2736787"/>
-            <a:ext cx="6172200" cy="1374900"/>
-          </a:xfrm>
-        </p:spPr>
-      </p:pic>
       <p:sp>
         <p:nvSpPr>
           <p:cNvPr id="4" name="Text Placeholder 3">
@@ -3530,6 +3484,35 @@
           </a:p>
         </p:txBody>
       </p:sp>
+      <p:pic>
+        <p:nvPicPr>
+          <p:cNvPr id="7" name="Content Placeholder 6" descr="A graph showing the number of patentes&#10;&#10;Description automatically generated">
+            <a:extLst>
+              <a:ext uri="{FF2B5EF4-FFF2-40B4-BE49-F238E27FC236}">
+                <a16:creationId xmlns:a16="http://schemas.microsoft.com/office/drawing/2014/main" id="{32121764-E93C-8100-8E7A-17DFC621D7B6}"/>
+              </a:ext>
+            </a:extLst>
+          </p:cNvPr>
+          <p:cNvPicPr>
+            <a:picLocks noGrp="1" noChangeAspect="1"/>
+          </p:cNvPicPr>
+          <p:nvPr>
+            <p:ph idx="1"/>
+          </p:nvPr>
+        </p:nvPicPr>
+        <p:blipFill>
+          <a:blip r:embed="rId2"/>
+          <a:stretch>
+            <a:fillRect/>
+          </a:stretch>
+        </p:blipFill>
+        <p:spPr>
+          <a:xfrm>
+            <a:off x="5221288" y="1595437"/>
+            <a:ext cx="6096000" cy="3657600"/>
+          </a:xfrm>
+        </p:spPr>
+      </p:pic>
     </p:spTree>
     <p:extLst>
       <p:ext uri="{BB962C8B-B14F-4D97-AF65-F5344CB8AC3E}">
@@ -5353,41 +5336,6 @@
           </a:p>
         </p:txBody>
       </p:sp>
-      <p:pic>
-        <p:nvPicPr>
-          <p:cNvPr id="6" name="Content Placeholder 5" descr="A graph with numbers and lines&#10;&#10;Description automatically generated">
-            <a:extLst>
-              <a:ext uri="{FF2B5EF4-FFF2-40B4-BE49-F238E27FC236}">
-                <a16:creationId xmlns:a16="http://schemas.microsoft.com/office/drawing/2014/main" id="{00CEFB6E-7FBC-873C-D07C-D4DA47C2DFA9}"/>
-              </a:ext>
-            </a:extLst>
-          </p:cNvPr>
-          <p:cNvPicPr>
-            <a:picLocks noGrp="1" noChangeAspect="1"/>
-          </p:cNvPicPr>
-          <p:nvPr>
-            <p:ph idx="1"/>
-          </p:nvPr>
-        </p:nvPicPr>
-        <p:blipFill>
-          <a:blip r:embed="rId2">
-            <a:extLst>
-              <a:ext uri="{28A0092B-C50C-407E-A947-70E740481C1C}">
-                <a14:useLocalDpi xmlns:a14="http://schemas.microsoft.com/office/drawing/2010/main" val="0"/>
-              </a:ext>
-            </a:extLst>
-          </a:blip>
-          <a:stretch>
-            <a:fillRect/>
-          </a:stretch>
-        </p:blipFill>
-        <p:spPr>
-          <a:xfrm>
-            <a:off x="5183188" y="1572577"/>
-            <a:ext cx="6172200" cy="3703320"/>
-          </a:xfrm>
-        </p:spPr>
-      </p:pic>
       <p:sp>
         <p:nvSpPr>
           <p:cNvPr id="4" name="Text Placeholder 3">
@@ -5413,6 +5361,35 @@
           </a:p>
         </p:txBody>
       </p:sp>
+      <p:pic>
+        <p:nvPicPr>
+          <p:cNvPr id="10" name="Content Placeholder 9" descr="A graph of a bar graph&#10;&#10;Description automatically generated">
+            <a:extLst>
+              <a:ext uri="{FF2B5EF4-FFF2-40B4-BE49-F238E27FC236}">
+                <a16:creationId xmlns:a16="http://schemas.microsoft.com/office/drawing/2014/main" id="{B9389AA9-7EC0-A736-18AF-F9E6C5DCF848}"/>
+              </a:ext>
+            </a:extLst>
+          </p:cNvPr>
+          <p:cNvPicPr>
+            <a:picLocks noGrp="1" noChangeAspect="1"/>
+          </p:cNvPicPr>
+          <p:nvPr>
+            <p:ph idx="1"/>
+          </p:nvPr>
+        </p:nvPicPr>
+        <p:blipFill>
+          <a:blip r:embed="rId2"/>
+          <a:stretch>
+            <a:fillRect/>
+          </a:stretch>
+        </p:blipFill>
+        <p:spPr>
+          <a:xfrm>
+            <a:off x="5221288" y="1595437"/>
+            <a:ext cx="6096000" cy="3657600"/>
+          </a:xfrm>
+        </p:spPr>
+      </p:pic>
     </p:spTree>
     <p:extLst>
       <p:ext uri="{BB962C8B-B14F-4D97-AF65-F5344CB8AC3E}">

</xml_diff>

<commit_message>
Correcting the count for United Kingdom, omitting variations of CAS
</commit_message>
<xml_diff>
--- a/presentation/DataDrivenForesight.pptx
+++ b/presentation/DataDrivenForesight.pptx
@@ -265,7 +265,7 @@
           <a:p>
             <a:fld id="{846CE7D5-CF57-46EF-B807-FDD0502418D4}" type="datetimeFigureOut">
               <a:rPr lang="en-GB" smtClean="0"/>
-              <a:t>06/01/2025</a:t>
+              <a:t>07/01/2025</a:t>
             </a:fld>
             <a:endParaRPr lang="en-GB"/>
           </a:p>
@@ -307,7 +307,7 @@
           <a:p>
             <a:fld id="{330EA680-D336-4FF7-8B7A-9848BB0A1C32}" type="slidenum">
               <a:rPr lang="en-GB" smtClean="0"/>
-              <a:t>‹Nr.›</a:t>
+              <a:t>‹#›</a:t>
             </a:fld>
             <a:endParaRPr lang="en-GB"/>
           </a:p>
@@ -435,7 +435,7 @@
           <a:p>
             <a:fld id="{846CE7D5-CF57-46EF-B807-FDD0502418D4}" type="datetimeFigureOut">
               <a:rPr lang="en-GB" smtClean="0"/>
-              <a:t>06/01/2025</a:t>
+              <a:t>07/01/2025</a:t>
             </a:fld>
             <a:endParaRPr lang="en-GB"/>
           </a:p>
@@ -477,7 +477,7 @@
           <a:p>
             <a:fld id="{330EA680-D336-4FF7-8B7A-9848BB0A1C32}" type="slidenum">
               <a:rPr lang="en-GB" smtClean="0"/>
-              <a:t>‹Nr.›</a:t>
+              <a:t>‹#›</a:t>
             </a:fld>
             <a:endParaRPr lang="en-GB"/>
           </a:p>
@@ -615,7 +615,7 @@
           <a:p>
             <a:fld id="{846CE7D5-CF57-46EF-B807-FDD0502418D4}" type="datetimeFigureOut">
               <a:rPr lang="en-GB" smtClean="0"/>
-              <a:t>06/01/2025</a:t>
+              <a:t>07/01/2025</a:t>
             </a:fld>
             <a:endParaRPr lang="en-GB"/>
           </a:p>
@@ -657,7 +657,7 @@
           <a:p>
             <a:fld id="{330EA680-D336-4FF7-8B7A-9848BB0A1C32}" type="slidenum">
               <a:rPr lang="en-GB" smtClean="0"/>
-              <a:t>‹Nr.›</a:t>
+              <a:t>‹#›</a:t>
             </a:fld>
             <a:endParaRPr lang="en-GB"/>
           </a:p>
@@ -785,7 +785,7 @@
           <a:p>
             <a:fld id="{846CE7D5-CF57-46EF-B807-FDD0502418D4}" type="datetimeFigureOut">
               <a:rPr lang="en-GB" smtClean="0"/>
-              <a:t>06/01/2025</a:t>
+              <a:t>07/01/2025</a:t>
             </a:fld>
             <a:endParaRPr lang="en-GB"/>
           </a:p>
@@ -827,7 +827,7 @@
           <a:p>
             <a:fld id="{330EA680-D336-4FF7-8B7A-9848BB0A1C32}" type="slidenum">
               <a:rPr lang="en-GB" smtClean="0"/>
-              <a:t>‹Nr.›</a:t>
+              <a:t>‹#›</a:t>
             </a:fld>
             <a:endParaRPr lang="en-GB"/>
           </a:p>
@@ -1031,7 +1031,7 @@
           <a:p>
             <a:fld id="{846CE7D5-CF57-46EF-B807-FDD0502418D4}" type="datetimeFigureOut">
               <a:rPr lang="en-GB" smtClean="0"/>
-              <a:t>06/01/2025</a:t>
+              <a:t>07/01/2025</a:t>
             </a:fld>
             <a:endParaRPr lang="en-GB"/>
           </a:p>
@@ -1073,7 +1073,7 @@
           <a:p>
             <a:fld id="{330EA680-D336-4FF7-8B7A-9848BB0A1C32}" type="slidenum">
               <a:rPr lang="en-GB" smtClean="0"/>
-              <a:t>‹Nr.›</a:t>
+              <a:t>‹#›</a:t>
             </a:fld>
             <a:endParaRPr lang="en-GB"/>
           </a:p>
@@ -1263,7 +1263,7 @@
           <a:p>
             <a:fld id="{846CE7D5-CF57-46EF-B807-FDD0502418D4}" type="datetimeFigureOut">
               <a:rPr lang="en-GB" smtClean="0"/>
-              <a:t>06/01/2025</a:t>
+              <a:t>07/01/2025</a:t>
             </a:fld>
             <a:endParaRPr lang="en-GB"/>
           </a:p>
@@ -1305,7 +1305,7 @@
           <a:p>
             <a:fld id="{330EA680-D336-4FF7-8B7A-9848BB0A1C32}" type="slidenum">
               <a:rPr lang="en-GB" smtClean="0"/>
-              <a:t>‹Nr.›</a:t>
+              <a:t>‹#›</a:t>
             </a:fld>
             <a:endParaRPr lang="en-GB"/>
           </a:p>
@@ -1630,7 +1630,7 @@
           <a:p>
             <a:fld id="{846CE7D5-CF57-46EF-B807-FDD0502418D4}" type="datetimeFigureOut">
               <a:rPr lang="en-GB" smtClean="0"/>
-              <a:t>06/01/2025</a:t>
+              <a:t>07/01/2025</a:t>
             </a:fld>
             <a:endParaRPr lang="en-GB"/>
           </a:p>
@@ -1672,7 +1672,7 @@
           <a:p>
             <a:fld id="{330EA680-D336-4FF7-8B7A-9848BB0A1C32}" type="slidenum">
               <a:rPr lang="en-GB" smtClean="0"/>
-              <a:t>‹Nr.›</a:t>
+              <a:t>‹#›</a:t>
             </a:fld>
             <a:endParaRPr lang="en-GB"/>
           </a:p>
@@ -1748,7 +1748,7 @@
           <a:p>
             <a:fld id="{846CE7D5-CF57-46EF-B807-FDD0502418D4}" type="datetimeFigureOut">
               <a:rPr lang="en-GB" smtClean="0"/>
-              <a:t>06/01/2025</a:t>
+              <a:t>07/01/2025</a:t>
             </a:fld>
             <a:endParaRPr lang="en-GB"/>
           </a:p>
@@ -1790,7 +1790,7 @@
           <a:p>
             <a:fld id="{330EA680-D336-4FF7-8B7A-9848BB0A1C32}" type="slidenum">
               <a:rPr lang="en-GB" smtClean="0"/>
-              <a:t>‹Nr.›</a:t>
+              <a:t>‹#›</a:t>
             </a:fld>
             <a:endParaRPr lang="en-GB"/>
           </a:p>
@@ -1843,7 +1843,7 @@
           <a:p>
             <a:fld id="{846CE7D5-CF57-46EF-B807-FDD0502418D4}" type="datetimeFigureOut">
               <a:rPr lang="en-GB" smtClean="0"/>
-              <a:t>06/01/2025</a:t>
+              <a:t>07/01/2025</a:t>
             </a:fld>
             <a:endParaRPr lang="en-GB"/>
           </a:p>
@@ -1885,7 +1885,7 @@
           <a:p>
             <a:fld id="{330EA680-D336-4FF7-8B7A-9848BB0A1C32}" type="slidenum">
               <a:rPr lang="en-GB" smtClean="0"/>
-              <a:t>‹Nr.›</a:t>
+              <a:t>‹#›</a:t>
             </a:fld>
             <a:endParaRPr lang="en-GB"/>
           </a:p>
@@ -2120,7 +2120,7 @@
           <a:p>
             <a:fld id="{846CE7D5-CF57-46EF-B807-FDD0502418D4}" type="datetimeFigureOut">
               <a:rPr lang="en-GB" smtClean="0"/>
-              <a:t>06/01/2025</a:t>
+              <a:t>07/01/2025</a:t>
             </a:fld>
             <a:endParaRPr lang="en-GB"/>
           </a:p>
@@ -2162,7 +2162,7 @@
           <a:p>
             <a:fld id="{330EA680-D336-4FF7-8B7A-9848BB0A1C32}" type="slidenum">
               <a:rPr lang="en-GB" smtClean="0"/>
-              <a:t>‹Nr.›</a:t>
+              <a:t>‹#›</a:t>
             </a:fld>
             <a:endParaRPr lang="en-GB"/>
           </a:p>
@@ -2377,7 +2377,7 @@
           <a:p>
             <a:fld id="{846CE7D5-CF57-46EF-B807-FDD0502418D4}" type="datetimeFigureOut">
               <a:rPr lang="en-GB" smtClean="0"/>
-              <a:t>06/01/2025</a:t>
+              <a:t>07/01/2025</a:t>
             </a:fld>
             <a:endParaRPr lang="en-GB"/>
           </a:p>
@@ -2419,7 +2419,7 @@
           <a:p>
             <a:fld id="{330EA680-D336-4FF7-8B7A-9848BB0A1C32}" type="slidenum">
               <a:rPr lang="en-GB" smtClean="0"/>
-              <a:t>‹Nr.›</a:t>
+              <a:t>‹#›</a:t>
             </a:fld>
             <a:endParaRPr lang="en-GB"/>
           </a:p>
@@ -2590,7 +2590,7 @@
           <a:p>
             <a:fld id="{846CE7D5-CF57-46EF-B807-FDD0502418D4}" type="datetimeFigureOut">
               <a:rPr lang="en-GB" smtClean="0"/>
-              <a:t>06/01/2025</a:t>
+              <a:t>07/01/2025</a:t>
             </a:fld>
             <a:endParaRPr lang="en-GB"/>
           </a:p>
@@ -2668,7 +2668,7 @@
           <a:p>
             <a:fld id="{330EA680-D336-4FF7-8B7A-9848BB0A1C32}" type="slidenum">
               <a:rPr lang="en-GB" smtClean="0"/>
-              <a:t>‹Nr.›</a:t>
+              <a:t>‹#›</a:t>
             </a:fld>
             <a:endParaRPr lang="en-GB"/>
           </a:p>
@@ -5489,7 +5489,7 @@
         </p:spPr>
         <p:txBody>
           <a:bodyPr vert="horz" lIns="91440" tIns="45720" rIns="91440" bIns="45720" rtlCol="0" anchor="ctr">
-            <a:normAutofit lnSpcReduction="10000"/>
+            <a:normAutofit fontScale="92500" lnSpcReduction="20000"/>
           </a:bodyPr>
           <a:lstStyle/>
           <a:p>
@@ -5550,92 +5550,22 @@
             </a:r>
           </a:p>
           <a:p>
-            <a:pPr marL="742950" lvl="1" indent="-285750">
-              <a:buFont typeface="Courier New" panose="020B0604020202020204" pitchFamily="34" charset="0"/>
-              <a:buChar char="o"/>
-            </a:pPr>
-            <a:r>
-              <a:rPr lang="en-GB" dirty="0"/>
-              <a:t>Possibly a name change </a:t>
-            </a:r>
-            <a:r>
-              <a:rPr lang="en-GB"/>
-              <a:t>occurred</a:t>
-            </a:r>
-            <a:endParaRPr lang="en-GB" dirty="0"/>
-          </a:p>
-          <a:p>
             <a:pPr marL="285750" indent="-285750">
               <a:buChar char="•"/>
             </a:pPr>
-            <a:endParaRPr lang="en-GB" dirty="0"/>
-          </a:p>
-        </p:txBody>
-      </p:sp>
-      <p:sp>
-        <p:nvSpPr>
-          <p:cNvPr id="4" name="Textfeld 3">
+            <a:r>
+              <a:rPr lang="en-GB" dirty="0"/>
+              <a:t>Papers mentioned under different variations of CAS are all included in “Chinese Academy of Sciences”. The others have thus been omitted</a:t>
+            </a:r>
+          </a:p>
+        </p:txBody>
+      </p:sp>
+      <p:pic>
+        <p:nvPicPr>
+          <p:cNvPr id="7" name="Content Placeholder 6" descr="A graph with text and numbers&#10;&#10;Description automatically generated">
             <a:extLst>
               <a:ext uri="{FF2B5EF4-FFF2-40B4-BE49-F238E27FC236}">
-                <a16:creationId xmlns:a16="http://schemas.microsoft.com/office/drawing/2014/main" id="{BA2B4F4A-60F9-6D47-00DE-675F78EB287E}"/>
-              </a:ext>
-            </a:extLst>
-          </p:cNvPr>
-          <p:cNvSpPr txBox="1"/>
-          <p:nvPr/>
-        </p:nvSpPr>
-        <p:spPr>
-          <a:xfrm>
-            <a:off x="911678" y="5540541"/>
-            <a:ext cx="2138921" cy="1200329"/>
-          </a:xfrm>
-          <a:prstGeom prst="rect">
-            <a:avLst/>
-          </a:prstGeom>
-          <a:noFill/>
-        </p:spPr>
-        <p:txBody>
-          <a:bodyPr rot="0" spcFirstLastPara="0" vertOverflow="overflow" horzOverflow="overflow" vert="horz" wrap="square" lIns="91440" tIns="45720" rIns="91440" bIns="45720" numCol="1" spcCol="0" rtlCol="0" fromWordArt="0" anchor="t" anchorCtr="0" forceAA="0" compatLnSpc="1">
-            <a:prstTxWarp prst="textNoShape">
-              <a:avLst/>
-            </a:prstTxWarp>
-            <a:spAutoFit/>
-          </a:bodyPr>
-          <a:lstStyle/>
-          <a:p>
-            <a:r>
-              <a:rPr lang="de-DE" dirty="0">
-                <a:solidFill>
-                  <a:srgbClr val="FF0000"/>
-                </a:solidFill>
-              </a:rPr>
-              <a:t>CAS Prüfen ob es eine einzige </a:t>
-            </a:r>
-            <a:r>
-              <a:rPr lang="de-DE" err="1">
-                <a:solidFill>
-                  <a:srgbClr val="FF0000"/>
-                </a:solidFill>
-              </a:rPr>
-              <a:t>Universtität</a:t>
-            </a:r>
-            <a:r>
-              <a:rPr lang="de-DE" dirty="0">
-                <a:solidFill>
-                  <a:srgbClr val="FF0000"/>
-                </a:solidFill>
-              </a:rPr>
-              <a:t> ist (Andre)</a:t>
-            </a:r>
-          </a:p>
-        </p:txBody>
-      </p:sp>
-      <p:pic>
-        <p:nvPicPr>
-          <p:cNvPr id="9" name="Inhaltsplatzhalter 8" descr="Ein Bild, das Text, Screenshot, Schrift, Zahl enthält.&#10;&#10;Beschreibung automatisch generiert.">
-            <a:extLst>
-              <a:ext uri="{FF2B5EF4-FFF2-40B4-BE49-F238E27FC236}">
-                <a16:creationId xmlns:a16="http://schemas.microsoft.com/office/drawing/2014/main" id="{6DB65620-50C6-CF67-E98D-88FD618C3EF9}"/>
+                <a16:creationId xmlns:a16="http://schemas.microsoft.com/office/drawing/2014/main" id="{30ACB7C0-A576-7C01-C14A-8F97BEDBC501}"/>
               </a:ext>
             </a:extLst>
           </p:cNvPr>
@@ -5647,15 +5577,21 @@
           </p:nvPr>
         </p:nvPicPr>
         <p:blipFill>
-          <a:blip r:embed="rId2"/>
+          <a:blip r:embed="rId2">
+            <a:extLst>
+              <a:ext uri="{28A0092B-C50C-407E-A947-70E740481C1C}">
+                <a14:useLocalDpi xmlns:a14="http://schemas.microsoft.com/office/drawing/2010/main" val="0"/>
+              </a:ext>
+            </a:extLst>
+          </a:blip>
           <a:stretch>
             <a:fillRect/>
           </a:stretch>
         </p:blipFill>
         <p:spPr>
           <a:xfrm>
-            <a:off x="5221288" y="1595437"/>
-            <a:ext cx="6096000" cy="3657600"/>
+            <a:off x="5183188" y="1572577"/>
+            <a:ext cx="6172200" cy="3703320"/>
           </a:xfrm>
         </p:spPr>
       </p:pic>
@@ -5777,10 +5713,10 @@
       </p:sp>
       <p:pic>
         <p:nvPicPr>
-          <p:cNvPr id="13" name="Content Placeholder 12" descr="A graph of a number of publications&#10;&#10;Description automatically generated">
+          <p:cNvPr id="6" name="Content Placeholder 5" descr="A graph of a number of publications&#10;&#10;Description automatically generated">
             <a:extLst>
               <a:ext uri="{FF2B5EF4-FFF2-40B4-BE49-F238E27FC236}">
-                <a16:creationId xmlns:a16="http://schemas.microsoft.com/office/drawing/2014/main" id="{6A1D2B9B-177A-C221-FF46-6A8EAC97F0B7}"/>
+                <a16:creationId xmlns:a16="http://schemas.microsoft.com/office/drawing/2014/main" id="{82690D4E-AA80-F13C-B8CF-EDB4DFD30003}"/>
               </a:ext>
             </a:extLst>
           </p:cNvPr>
@@ -5792,15 +5728,21 @@
           </p:nvPr>
         </p:nvPicPr>
         <p:blipFill>
-          <a:blip r:embed="rId2"/>
+          <a:blip r:embed="rId2">
+            <a:extLst>
+              <a:ext uri="{28A0092B-C50C-407E-A947-70E740481C1C}">
+                <a14:useLocalDpi xmlns:a14="http://schemas.microsoft.com/office/drawing/2010/main" val="0"/>
+              </a:ext>
+            </a:extLst>
+          </a:blip>
           <a:stretch>
             <a:fillRect/>
           </a:stretch>
         </p:blipFill>
         <p:spPr>
           <a:xfrm>
-            <a:off x="5221288" y="1595437"/>
-            <a:ext cx="6096000" cy="3657600"/>
+            <a:off x="5183188" y="1572577"/>
+            <a:ext cx="6172200" cy="3703320"/>
           </a:xfrm>
         </p:spPr>
       </p:pic>
@@ -5934,35 +5876,6 @@
       </p:sp>
       <p:pic>
         <p:nvPicPr>
-          <p:cNvPr id="5" name="Content Placeholder 4" descr="A graph of a number of people&#10;&#10;Description automatically generated">
-            <a:extLst>
-              <a:ext uri="{FF2B5EF4-FFF2-40B4-BE49-F238E27FC236}">
-                <a16:creationId xmlns:a16="http://schemas.microsoft.com/office/drawing/2014/main" id="{DF394CB4-5B75-EA0E-1CC5-A4BEFEFD3619}"/>
-              </a:ext>
-            </a:extLst>
-          </p:cNvPr>
-          <p:cNvPicPr>
-            <a:picLocks noGrp="1" noChangeAspect="1"/>
-          </p:cNvPicPr>
-          <p:nvPr>
-            <p:ph idx="1"/>
-          </p:nvPr>
-        </p:nvPicPr>
-        <p:blipFill>
-          <a:blip r:embed="rId3"/>
-          <a:stretch>
-            <a:fillRect/>
-          </a:stretch>
-        </p:blipFill>
-        <p:spPr>
-          <a:xfrm>
-            <a:off x="6096177" y="1574271"/>
-            <a:ext cx="5263444" cy="3170766"/>
-          </a:xfrm>
-        </p:spPr>
-      </p:pic>
-      <p:pic>
-        <p:nvPicPr>
           <p:cNvPr id="6" name="Picture 5" descr="A graph of a number of people&#10;&#10;Description automatically generated">
             <a:extLst>
               <a:ext uri="{FF2B5EF4-FFF2-40B4-BE49-F238E27FC236}">
@@ -5976,7 +5889,7 @@
           <p:nvPr/>
         </p:nvPicPr>
         <p:blipFill>
-          <a:blip r:embed="rId4"/>
+          <a:blip r:embed="rId3"/>
           <a:stretch>
             <a:fillRect/>
           </a:stretch>
@@ -5991,48 +5904,41 @@
           </a:prstGeom>
         </p:spPr>
       </p:pic>
-      <p:sp>
-        <p:nvSpPr>
-          <p:cNvPr id="3" name="Textfeld 2">
+      <p:pic>
+        <p:nvPicPr>
+          <p:cNvPr id="10" name="Content Placeholder 9" descr="A graph of a bar graph&#10;&#10;Description automatically generated">
             <a:extLst>
               <a:ext uri="{FF2B5EF4-FFF2-40B4-BE49-F238E27FC236}">
-                <a16:creationId xmlns:a16="http://schemas.microsoft.com/office/drawing/2014/main" id="{85BC8F17-0385-2CC2-E1DD-64386C261278}"/>
+                <a16:creationId xmlns:a16="http://schemas.microsoft.com/office/drawing/2014/main" id="{C558C557-7972-C7A9-F5D7-43281D2AD907}"/>
               </a:ext>
             </a:extLst>
           </p:cNvPr>
-          <p:cNvSpPr txBox="1"/>
-          <p:nvPr/>
-        </p:nvSpPr>
+          <p:cNvPicPr>
+            <a:picLocks noGrp="1" noChangeAspect="1"/>
+          </p:cNvPicPr>
+          <p:nvPr>
+            <p:ph idx="1"/>
+          </p:nvPr>
+        </p:nvPicPr>
+        <p:blipFill>
+          <a:blip r:embed="rId4">
+            <a:extLst>
+              <a:ext uri="{28A0092B-C50C-407E-A947-70E740481C1C}">
+                <a14:useLocalDpi xmlns:a14="http://schemas.microsoft.com/office/drawing/2010/main" val="0"/>
+              </a:ext>
+            </a:extLst>
+          </a:blip>
+          <a:stretch>
+            <a:fillRect/>
+          </a:stretch>
+        </p:blipFill>
         <p:spPr>
           <a:xfrm>
-            <a:off x="7605839" y="5626940"/>
-            <a:ext cx="3960286" cy="923330"/>
+            <a:off x="6103056" y="1571978"/>
+            <a:ext cx="5185432" cy="3111259"/>
           </a:xfrm>
-          <a:prstGeom prst="rect">
-            <a:avLst/>
-          </a:prstGeom>
-          <a:noFill/>
         </p:spPr>
-        <p:txBody>
-          <a:bodyPr rot="0" spcFirstLastPara="0" vertOverflow="overflow" horzOverflow="overflow" vert="horz" wrap="square" lIns="91440" tIns="45720" rIns="91440" bIns="45720" numCol="1" spcCol="0" rtlCol="0" fromWordArt="0" anchor="t" anchorCtr="0" forceAA="0" compatLnSpc="1">
-            <a:prstTxWarp prst="textNoShape">
-              <a:avLst/>
-            </a:prstTxWarp>
-            <a:spAutoFit/>
-          </a:bodyPr>
-          <a:lstStyle/>
-          <a:p>
-            <a:r>
-              <a:rPr lang="de-DE" dirty="0">
-                <a:solidFill>
-                  <a:srgbClr val="FF0000"/>
-                </a:solidFill>
-              </a:rPr>
-              <a:t>Prüfen ob Daten für United Kingdom korrekt sind oder doppelt gezählte Paper vorkommen (Andre)</a:t>
-            </a:r>
-          </a:p>
-        </p:txBody>
-      </p:sp>
+      </p:pic>
     </p:spTree>
     <p:extLst>
       <p:ext uri="{BB962C8B-B14F-4D97-AF65-F5344CB8AC3E}">

</xml_diff>

<commit_message>
Added code to include graphs for all materials, presentation adjusted
</commit_message>
<xml_diff>
--- a/presentation/DataDrivenForesight.pptx
+++ b/presentation/DataDrivenForesight.pptx
@@ -7,18 +7,19 @@
   <p:sldIdLst>
     <p:sldId id="256" r:id="rId2"/>
     <p:sldId id="264" r:id="rId3"/>
-    <p:sldId id="257" r:id="rId4"/>
-    <p:sldId id="259" r:id="rId5"/>
-    <p:sldId id="260" r:id="rId6"/>
-    <p:sldId id="261" r:id="rId7"/>
-    <p:sldId id="262" r:id="rId8"/>
-    <p:sldId id="263" r:id="rId9"/>
-    <p:sldId id="265" r:id="rId10"/>
-    <p:sldId id="266" r:id="rId11"/>
-    <p:sldId id="268" r:id="rId12"/>
-    <p:sldId id="269" r:id="rId13"/>
-    <p:sldId id="270" r:id="rId14"/>
-    <p:sldId id="271" r:id="rId15"/>
+    <p:sldId id="272" r:id="rId4"/>
+    <p:sldId id="257" r:id="rId5"/>
+    <p:sldId id="259" r:id="rId6"/>
+    <p:sldId id="260" r:id="rId7"/>
+    <p:sldId id="261" r:id="rId8"/>
+    <p:sldId id="262" r:id="rId9"/>
+    <p:sldId id="263" r:id="rId10"/>
+    <p:sldId id="265" r:id="rId11"/>
+    <p:sldId id="266" r:id="rId12"/>
+    <p:sldId id="268" r:id="rId13"/>
+    <p:sldId id="269" r:id="rId14"/>
+    <p:sldId id="270" r:id="rId15"/>
+    <p:sldId id="271" r:id="rId16"/>
   </p:sldIdLst>
   <p:sldSz cx="12192000" cy="6858000"/>
   <p:notesSz cx="6858000" cy="9144000"/>
@@ -3091,7 +3092,7 @@
           <p:cNvPr id="2" name="Title 1">
             <a:extLst>
               <a:ext uri="{FF2B5EF4-FFF2-40B4-BE49-F238E27FC236}">
-                <a16:creationId xmlns:a16="http://schemas.microsoft.com/office/drawing/2014/main" id="{A1B1FB28-5B8C-BCFB-04B3-54966AAE995C}"/>
+                <a16:creationId xmlns:a16="http://schemas.microsoft.com/office/drawing/2014/main" id="{2AB2648D-BA5B-91F5-8BC1-12201440757D}"/>
               </a:ext>
             </a:extLst>
           </p:cNvPr>
@@ -3120,7 +3121,7 @@
           <p:cNvPr id="4" name="Text Placeholder 3">
             <a:extLst>
               <a:ext uri="{FF2B5EF4-FFF2-40B4-BE49-F238E27FC236}">
-                <a16:creationId xmlns:a16="http://schemas.microsoft.com/office/drawing/2014/main" id="{EC61FC60-B060-12B2-5E82-55544DE04D4C}"/>
+                <a16:creationId xmlns:a16="http://schemas.microsoft.com/office/drawing/2014/main" id="{8DC21876-0FFB-AD28-4A1F-84768DB132F2}"/>
               </a:ext>
             </a:extLst>
           </p:cNvPr>
@@ -3140,12 +3141,70 @@
           </a:p>
         </p:txBody>
       </p:sp>
+      <p:sp>
+        <p:nvSpPr>
+          <p:cNvPr id="5" name="Textfeld 4">
+            <a:extLst>
+              <a:ext uri="{FF2B5EF4-FFF2-40B4-BE49-F238E27FC236}">
+                <a16:creationId xmlns:a16="http://schemas.microsoft.com/office/drawing/2014/main" id="{340D1631-92C9-1212-9EA2-BC51E54E31A4}"/>
+              </a:ext>
+            </a:extLst>
+          </p:cNvPr>
+          <p:cNvSpPr txBox="1"/>
+          <p:nvPr/>
+        </p:nvSpPr>
+        <p:spPr>
+          <a:xfrm>
+            <a:off x="1149471" y="2763964"/>
+            <a:ext cx="2735035" cy="369332"/>
+          </a:xfrm>
+          <a:prstGeom prst="rect">
+            <a:avLst/>
+          </a:prstGeom>
+          <a:noFill/>
+        </p:spPr>
+        <p:txBody>
+          <a:bodyPr rot="0" spcFirstLastPara="0" vertOverflow="overflow" horzOverflow="overflow" vert="horz" wrap="square" lIns="91440" tIns="45720" rIns="91440" bIns="45720" numCol="1" spcCol="0" rtlCol="0" fromWordArt="0" anchor="t" anchorCtr="0" forceAA="0" compatLnSpc="1">
+            <a:prstTxWarp prst="textNoShape">
+              <a:avLst/>
+            </a:prstTxWarp>
+            <a:spAutoFit/>
+          </a:bodyPr>
+          <a:lstStyle/>
+          <a:p>
+            <a:r>
+              <a:rPr lang="de-DE" dirty="0">
+                <a:solidFill>
+                  <a:srgbClr val="FF0000"/>
+                </a:solidFill>
+              </a:rPr>
+              <a:t>Summary (</a:t>
+            </a:r>
+            <a:r>
+              <a:rPr lang="de-DE" err="1">
+                <a:solidFill>
+                  <a:srgbClr val="FF0000"/>
+                </a:solidFill>
+              </a:rPr>
+              <a:t>Seiar</a:t>
+            </a:r>
+            <a:r>
+              <a:rPr lang="de-DE" dirty="0">
+                <a:solidFill>
+                  <a:srgbClr val="FF0000"/>
+                </a:solidFill>
+              </a:rPr>
+              <a:t> )</a:t>
+            </a:r>
+          </a:p>
+        </p:txBody>
+      </p:sp>
       <p:pic>
         <p:nvPicPr>
-          <p:cNvPr id="7" name="Content Placeholder 6" descr="A graph showing the growth of a book&#10;&#10;Description automatically generated">
+          <p:cNvPr id="12" name="Inhaltsplatzhalter 11" descr="Ein Bild, das Text, Screenshot, Diagramm, Reihe enthält.&#10;&#10;Beschreibung automatisch generiert.">
             <a:extLst>
               <a:ext uri="{FF2B5EF4-FFF2-40B4-BE49-F238E27FC236}">
-                <a16:creationId xmlns:a16="http://schemas.microsoft.com/office/drawing/2014/main" id="{19EA9D37-D23E-EE12-4ACB-031C10461D17}"/>
+                <a16:creationId xmlns:a16="http://schemas.microsoft.com/office/drawing/2014/main" id="{6FC40EEA-592C-668A-0F4D-CC47AC3839DF}"/>
               </a:ext>
             </a:extLst>
           </p:cNvPr>
@@ -3169,144 +3228,10 @@
           </a:xfrm>
         </p:spPr>
       </p:pic>
-      <p:sp>
-        <p:nvSpPr>
-          <p:cNvPr id="3" name="Textfeld 2">
-            <a:extLst>
-              <a:ext uri="{FF2B5EF4-FFF2-40B4-BE49-F238E27FC236}">
-                <a16:creationId xmlns:a16="http://schemas.microsoft.com/office/drawing/2014/main" id="{99B88837-E2FE-A893-9E97-7F7FEF4938FC}"/>
-              </a:ext>
-            </a:extLst>
-          </p:cNvPr>
-          <p:cNvSpPr txBox="1"/>
-          <p:nvPr/>
-        </p:nvSpPr>
-        <p:spPr>
-          <a:xfrm>
-            <a:off x="1749126" y="3321856"/>
-            <a:ext cx="3265714" cy="369332"/>
-          </a:xfrm>
-          <a:prstGeom prst="rect">
-            <a:avLst/>
-          </a:prstGeom>
-          <a:noFill/>
-        </p:spPr>
-        <p:txBody>
-          <a:bodyPr rot="0" spcFirstLastPara="0" vertOverflow="overflow" horzOverflow="overflow" vert="horz" wrap="square" lIns="91440" tIns="45720" rIns="91440" bIns="45720" numCol="1" spcCol="0" rtlCol="0" fromWordArt="0" anchor="t" anchorCtr="0" forceAA="0" compatLnSpc="1">
-            <a:prstTxWarp prst="textNoShape">
-              <a:avLst/>
-            </a:prstTxWarp>
-            <a:spAutoFit/>
-          </a:bodyPr>
-          <a:lstStyle/>
-          <a:p>
-            <a:r>
-              <a:rPr lang="de-DE" dirty="0">
-                <a:solidFill>
-                  <a:srgbClr val="FF0000"/>
-                </a:solidFill>
-              </a:rPr>
-              <a:t>Warum Daten vor 2015? </a:t>
-            </a:r>
-          </a:p>
-        </p:txBody>
-      </p:sp>
-      <p:sp>
-        <p:nvSpPr>
-          <p:cNvPr id="5" name="Textfeld 4">
-            <a:extLst>
-              <a:ext uri="{FF2B5EF4-FFF2-40B4-BE49-F238E27FC236}">
-                <a16:creationId xmlns:a16="http://schemas.microsoft.com/office/drawing/2014/main" id="{7E388F70-DC19-C63B-C5DD-9939BF3A9210}"/>
-              </a:ext>
-            </a:extLst>
-          </p:cNvPr>
-          <p:cNvSpPr txBox="1"/>
-          <p:nvPr/>
-        </p:nvSpPr>
-        <p:spPr>
-          <a:xfrm>
-            <a:off x="5547731" y="5380961"/>
-            <a:ext cx="4293053" cy="369332"/>
-          </a:xfrm>
-          <a:prstGeom prst="rect">
-            <a:avLst/>
-          </a:prstGeom>
-          <a:noFill/>
-        </p:spPr>
-        <p:txBody>
-          <a:bodyPr rot="0" spcFirstLastPara="0" vertOverflow="overflow" horzOverflow="overflow" vert="horz" wrap="square" lIns="91440" tIns="45720" rIns="91440" bIns="45720" numCol="1" spcCol="0" rtlCol="0" fromWordArt="0" anchor="t" anchorCtr="0" forceAA="0" compatLnSpc="1">
-            <a:prstTxWarp prst="textNoShape">
-              <a:avLst/>
-            </a:prstTxWarp>
-            <a:spAutoFit/>
-          </a:bodyPr>
-          <a:lstStyle/>
-          <a:p>
-            <a:r>
-              <a:rPr lang="de-DE" dirty="0">
-                <a:solidFill>
-                  <a:srgbClr val="FF0000"/>
-                </a:solidFill>
-              </a:rPr>
-              <a:t>X-Achse Major/Minor Ticks (Georg)</a:t>
-            </a:r>
-          </a:p>
-        </p:txBody>
-      </p:sp>
-      <p:sp>
-        <p:nvSpPr>
-          <p:cNvPr id="6" name="Textfeld 5">
-            <a:extLst>
-              <a:ext uri="{FF2B5EF4-FFF2-40B4-BE49-F238E27FC236}">
-                <a16:creationId xmlns:a16="http://schemas.microsoft.com/office/drawing/2014/main" id="{04763C24-0F1C-6ED9-C263-605C9DE2CF33}"/>
-              </a:ext>
-            </a:extLst>
-          </p:cNvPr>
-          <p:cNvSpPr txBox="1"/>
-          <p:nvPr/>
-        </p:nvSpPr>
-        <p:spPr>
-          <a:xfrm>
-            <a:off x="5548947" y="5869213"/>
-            <a:ext cx="3816803" cy="646331"/>
-          </a:xfrm>
-          <a:prstGeom prst="rect">
-            <a:avLst/>
-          </a:prstGeom>
-          <a:noFill/>
-        </p:spPr>
-        <p:txBody>
-          <a:bodyPr rot="0" spcFirstLastPara="0" vertOverflow="overflow" horzOverflow="overflow" vert="horz" wrap="square" lIns="91440" tIns="45720" rIns="91440" bIns="45720" numCol="1" spcCol="0" rtlCol="0" fromWordArt="0" anchor="t" anchorCtr="0" forceAA="0" compatLnSpc="1">
-            <a:prstTxWarp prst="textNoShape">
-              <a:avLst/>
-            </a:prstTxWarp>
-            <a:spAutoFit/>
-          </a:bodyPr>
-          <a:lstStyle/>
-          <a:p>
-            <a:r>
-              <a:rPr lang="de-DE" dirty="0">
-                <a:solidFill>
-                  <a:srgbClr val="FF0000"/>
-                </a:solidFill>
-              </a:rPr>
-              <a:t>Vergleich mit Publikationsdaten, </a:t>
-            </a:r>
-            <a:r>
-              <a:rPr lang="de-DE">
-                <a:solidFill>
-                  <a:srgbClr val="FF0000"/>
-                </a:solidFill>
-              </a:rPr>
-              <a:t>auch vor 2015</a:t>
-            </a:r>
-          </a:p>
-        </p:txBody>
-      </p:sp>
     </p:spTree>
     <p:extLst>
       <p:ext uri="{BB962C8B-B14F-4D97-AF65-F5344CB8AC3E}">
-        <p14:creationId xmlns:p14="http://schemas.microsoft.com/office/powerpoint/2010/main" val="3666487214"/>
+        <p14:creationId xmlns:p14="http://schemas.microsoft.com/office/powerpoint/2010/main" val="233784213"/>
       </p:ext>
     </p:extLst>
   </p:cSld>
@@ -3338,7 +3263,7 @@
           <p:cNvPr id="2" name="Title 1">
             <a:extLst>
               <a:ext uri="{FF2B5EF4-FFF2-40B4-BE49-F238E27FC236}">
-                <a16:creationId xmlns:a16="http://schemas.microsoft.com/office/drawing/2014/main" id="{7103A217-21A5-7901-6120-28237D26EEE7}"/>
+                <a16:creationId xmlns:a16="http://schemas.microsoft.com/office/drawing/2014/main" id="{A1B1FB28-5B8C-BCFB-04B3-54966AAE995C}"/>
               </a:ext>
             </a:extLst>
           </p:cNvPr>
@@ -3355,19 +3280,44 @@
           <a:lstStyle/>
           <a:p>
             <a:r>
-              <a:rPr lang="en-US" dirty="0"/>
-              <a:t>WIPO</a:t>
+              <a:rPr lang="en-US" dirty="0" err="1"/>
+              <a:t>Espacenet</a:t>
             </a:r>
             <a:endParaRPr lang="en-DE" dirty="0"/>
+          </a:p>
+        </p:txBody>
+      </p:sp>
+      <p:sp>
+        <p:nvSpPr>
+          <p:cNvPr id="4" name="Text Placeholder 3">
+            <a:extLst>
+              <a:ext uri="{FF2B5EF4-FFF2-40B4-BE49-F238E27FC236}">
+                <a16:creationId xmlns:a16="http://schemas.microsoft.com/office/drawing/2014/main" id="{EC61FC60-B060-12B2-5E82-55544DE04D4C}"/>
+              </a:ext>
+            </a:extLst>
+          </p:cNvPr>
+          <p:cNvSpPr>
+            <a:spLocks noGrp="1"/>
+          </p:cNvSpPr>
+          <p:nvPr>
+            <p:ph type="body" sz="half" idx="2"/>
+          </p:nvPr>
+        </p:nvSpPr>
+        <p:spPr/>
+        <p:txBody>
+          <a:bodyPr/>
+          <a:lstStyle/>
+          <a:p>
+            <a:endParaRPr lang="en-DE"/>
           </a:p>
         </p:txBody>
       </p:sp>
       <p:pic>
         <p:nvPicPr>
-          <p:cNvPr id="6" name="Content Placeholder 5" descr="A screenshot of a computer&#10;&#10;Description automatically generated">
+          <p:cNvPr id="7" name="Content Placeholder 6" descr="A graph showing the growth of a book&#10;&#10;Description automatically generated">
             <a:extLst>
               <a:ext uri="{FF2B5EF4-FFF2-40B4-BE49-F238E27FC236}">
-                <a16:creationId xmlns:a16="http://schemas.microsoft.com/office/drawing/2014/main" id="{4B3A4204-5FA0-8266-8F40-B1B7C419A7FD}"/>
+                <a16:creationId xmlns:a16="http://schemas.microsoft.com/office/drawing/2014/main" id="{19EA9D37-D23E-EE12-4ACB-031C10461D17}"/>
               </a:ext>
             </a:extLst>
           </p:cNvPr>
@@ -3379,55 +3329,24 @@
           </p:nvPr>
         </p:nvPicPr>
         <p:blipFill>
-          <a:blip r:embed="rId2" cstate="print">
-            <a:extLst>
-              <a:ext uri="{28A0092B-C50C-407E-A947-70E740481C1C}">
-                <a14:useLocalDpi xmlns:a14="http://schemas.microsoft.com/office/drawing/2010/main" val="0"/>
-              </a:ext>
-            </a:extLst>
-          </a:blip>
+          <a:blip r:embed="rId2"/>
           <a:stretch>
             <a:fillRect/>
           </a:stretch>
         </p:blipFill>
         <p:spPr>
           <a:xfrm>
-            <a:off x="-312830" y="2499396"/>
-            <a:ext cx="11710639" cy="2632990"/>
+            <a:off x="5221288" y="1595437"/>
+            <a:ext cx="6096000" cy="3657600"/>
           </a:xfrm>
         </p:spPr>
       </p:pic>
       <p:sp>
         <p:nvSpPr>
-          <p:cNvPr id="4" name="Text Placeholder 3">
-            <a:extLst>
-              <a:ext uri="{FF2B5EF4-FFF2-40B4-BE49-F238E27FC236}">
-                <a16:creationId xmlns:a16="http://schemas.microsoft.com/office/drawing/2014/main" id="{62A3F758-1198-A982-F141-E7B7353A52B0}"/>
-              </a:ext>
-            </a:extLst>
-          </p:cNvPr>
-          <p:cNvSpPr>
-            <a:spLocks noGrp="1"/>
-          </p:cNvSpPr>
-          <p:nvPr>
-            <p:ph type="body" sz="half" idx="2"/>
-          </p:nvPr>
-        </p:nvSpPr>
-        <p:spPr/>
-        <p:txBody>
-          <a:bodyPr/>
-          <a:lstStyle/>
-          <a:p>
-            <a:endParaRPr lang="en-DE"/>
-          </a:p>
-        </p:txBody>
-      </p:sp>
-      <p:sp>
-        <p:nvSpPr>
           <p:cNvPr id="3" name="Textfeld 2">
             <a:extLst>
               <a:ext uri="{FF2B5EF4-FFF2-40B4-BE49-F238E27FC236}">
-                <a16:creationId xmlns:a16="http://schemas.microsoft.com/office/drawing/2014/main" id="{8F97CCA7-EE85-DE8E-AC2C-A412E11936F7}"/>
+                <a16:creationId xmlns:a16="http://schemas.microsoft.com/office/drawing/2014/main" id="{99B88837-E2FE-A893-9E97-7F7FEF4938FC}"/>
               </a:ext>
             </a:extLst>
           </p:cNvPr>
@@ -3436,8 +3355,8 @@
         </p:nvSpPr>
         <p:spPr>
           <a:xfrm>
-            <a:off x="6170839" y="5572125"/>
-            <a:ext cx="4082142" cy="369332"/>
+            <a:off x="1749126" y="3321856"/>
+            <a:ext cx="3265714" cy="369332"/>
           </a:xfrm>
           <a:prstGeom prst="rect">
             <a:avLst/>
@@ -3459,7 +3378,99 @@
                   <a:srgbClr val="FF0000"/>
                 </a:solidFill>
               </a:rPr>
-              <a:t>IPC Codes (?)</a:t>
+              <a:t>Warum Daten vor 2015? </a:t>
+            </a:r>
+          </a:p>
+        </p:txBody>
+      </p:sp>
+      <p:sp>
+        <p:nvSpPr>
+          <p:cNvPr id="5" name="Textfeld 4">
+            <a:extLst>
+              <a:ext uri="{FF2B5EF4-FFF2-40B4-BE49-F238E27FC236}">
+                <a16:creationId xmlns:a16="http://schemas.microsoft.com/office/drawing/2014/main" id="{7E388F70-DC19-C63B-C5DD-9939BF3A9210}"/>
+              </a:ext>
+            </a:extLst>
+          </p:cNvPr>
+          <p:cNvSpPr txBox="1"/>
+          <p:nvPr/>
+        </p:nvSpPr>
+        <p:spPr>
+          <a:xfrm>
+            <a:off x="5547731" y="5380961"/>
+            <a:ext cx="4293053" cy="369332"/>
+          </a:xfrm>
+          <a:prstGeom prst="rect">
+            <a:avLst/>
+          </a:prstGeom>
+          <a:noFill/>
+        </p:spPr>
+        <p:txBody>
+          <a:bodyPr rot="0" spcFirstLastPara="0" vertOverflow="overflow" horzOverflow="overflow" vert="horz" wrap="square" lIns="91440" tIns="45720" rIns="91440" bIns="45720" numCol="1" spcCol="0" rtlCol="0" fromWordArt="0" anchor="t" anchorCtr="0" forceAA="0" compatLnSpc="1">
+            <a:prstTxWarp prst="textNoShape">
+              <a:avLst/>
+            </a:prstTxWarp>
+            <a:spAutoFit/>
+          </a:bodyPr>
+          <a:lstStyle/>
+          <a:p>
+            <a:r>
+              <a:rPr lang="de-DE" dirty="0">
+                <a:solidFill>
+                  <a:srgbClr val="FF0000"/>
+                </a:solidFill>
+              </a:rPr>
+              <a:t>X-Achse Major/Minor Ticks (Georg)</a:t>
+            </a:r>
+          </a:p>
+        </p:txBody>
+      </p:sp>
+      <p:sp>
+        <p:nvSpPr>
+          <p:cNvPr id="6" name="Textfeld 5">
+            <a:extLst>
+              <a:ext uri="{FF2B5EF4-FFF2-40B4-BE49-F238E27FC236}">
+                <a16:creationId xmlns:a16="http://schemas.microsoft.com/office/drawing/2014/main" id="{04763C24-0F1C-6ED9-C263-605C9DE2CF33}"/>
+              </a:ext>
+            </a:extLst>
+          </p:cNvPr>
+          <p:cNvSpPr txBox="1"/>
+          <p:nvPr/>
+        </p:nvSpPr>
+        <p:spPr>
+          <a:xfrm>
+            <a:off x="5548947" y="5869213"/>
+            <a:ext cx="3816803" cy="646331"/>
+          </a:xfrm>
+          <a:prstGeom prst="rect">
+            <a:avLst/>
+          </a:prstGeom>
+          <a:noFill/>
+        </p:spPr>
+        <p:txBody>
+          <a:bodyPr rot="0" spcFirstLastPara="0" vertOverflow="overflow" horzOverflow="overflow" vert="horz" wrap="square" lIns="91440" tIns="45720" rIns="91440" bIns="45720" numCol="1" spcCol="0" rtlCol="0" fromWordArt="0" anchor="t" anchorCtr="0" forceAA="0" compatLnSpc="1">
+            <a:prstTxWarp prst="textNoShape">
+              <a:avLst/>
+            </a:prstTxWarp>
+            <a:spAutoFit/>
+          </a:bodyPr>
+          <a:lstStyle/>
+          <a:p>
+            <a:r>
+              <a:rPr lang="de-DE" dirty="0">
+                <a:solidFill>
+                  <a:srgbClr val="FF0000"/>
+                </a:solidFill>
+              </a:rPr>
+              <a:t>Vergleich mit Publikationsdaten, </a:t>
+            </a:r>
+            <a:r>
+              <a:rPr lang="de-DE">
+                <a:solidFill>
+                  <a:srgbClr val="FF0000"/>
+                </a:solidFill>
+              </a:rPr>
+              <a:t>auch vor 2015</a:t>
             </a:r>
           </a:p>
         </p:txBody>
@@ -3467,7 +3478,7 @@
     </p:spTree>
     <p:extLst>
       <p:ext uri="{BB962C8B-B14F-4D97-AF65-F5344CB8AC3E}">
-        <p14:creationId xmlns:p14="http://schemas.microsoft.com/office/powerpoint/2010/main" val="3145640299"/>
+        <p14:creationId xmlns:p14="http://schemas.microsoft.com/office/powerpoint/2010/main" val="3666487214"/>
       </p:ext>
     </p:extLst>
   </p:cSld>
@@ -3499,7 +3510,7 @@
           <p:cNvPr id="2" name="Title 1">
             <a:extLst>
               <a:ext uri="{FF2B5EF4-FFF2-40B4-BE49-F238E27FC236}">
-                <a16:creationId xmlns:a16="http://schemas.microsoft.com/office/drawing/2014/main" id="{2607136C-E885-609E-94FD-103F489D415B}"/>
+                <a16:creationId xmlns:a16="http://schemas.microsoft.com/office/drawing/2014/main" id="{7103A217-21A5-7901-6120-28237D26EEE7}"/>
               </a:ext>
             </a:extLst>
           </p:cNvPr>
@@ -3523,50 +3534,12 @@
           </a:p>
         </p:txBody>
       </p:sp>
-      <p:sp>
-        <p:nvSpPr>
-          <p:cNvPr id="4" name="Text Placeholder 3">
+      <p:pic>
+        <p:nvPicPr>
+          <p:cNvPr id="6" name="Content Placeholder 5" descr="A screenshot of a computer&#10;&#10;Description automatically generated">
             <a:extLst>
               <a:ext uri="{FF2B5EF4-FFF2-40B4-BE49-F238E27FC236}">
-                <a16:creationId xmlns:a16="http://schemas.microsoft.com/office/drawing/2014/main" id="{A9E17B91-A842-294D-FDBB-489DAA25A9FA}"/>
-              </a:ext>
-            </a:extLst>
-          </p:cNvPr>
-          <p:cNvSpPr>
-            <a:spLocks noGrp="1"/>
-          </p:cNvSpPr>
-          <p:nvPr>
-            <p:ph type="body" sz="half" idx="2"/>
-          </p:nvPr>
-        </p:nvSpPr>
-        <p:spPr/>
-        <p:txBody>
-          <a:bodyPr vert="horz" lIns="91440" tIns="45720" rIns="91440" bIns="45720" rtlCol="0" anchor="t">
-            <a:normAutofit/>
-          </a:bodyPr>
-          <a:lstStyle/>
-          <a:p>
-            <a:pPr marL="285750" indent="-285750">
-              <a:buChar char="•"/>
-            </a:pPr>
-            <a:r>
-              <a:rPr lang="en-DE" dirty="0"/>
-              <a:t>WIPO additionally manages the rights to 605 international patents (not shown </a:t>
-            </a:r>
-            <a:r>
-              <a:rPr lang="en-DE"/>
-              <a:t>in graph)</a:t>
-            </a:r>
-            <a:endParaRPr lang="en-DE" dirty="0"/>
-          </a:p>
-        </p:txBody>
-      </p:sp>
-      <p:pic>
-        <p:nvPicPr>
-          <p:cNvPr id="7" name="Content Placeholder 6" descr="A graph of blue and white bars&#10;&#10;Description automatically generated">
-            <a:extLst>
-              <a:ext uri="{FF2B5EF4-FFF2-40B4-BE49-F238E27FC236}">
-                <a16:creationId xmlns:a16="http://schemas.microsoft.com/office/drawing/2014/main" id="{28E7E884-2B3B-27CF-FF3A-73A149F825F9}"/>
+                <a16:creationId xmlns:a16="http://schemas.microsoft.com/office/drawing/2014/main" id="{4B3A4204-5FA0-8266-8F40-B1B7C419A7FD}"/>
               </a:ext>
             </a:extLst>
           </p:cNvPr>
@@ -3578,24 +3551,55 @@
           </p:nvPr>
         </p:nvPicPr>
         <p:blipFill>
-          <a:blip r:embed="rId2"/>
+          <a:blip r:embed="rId2" cstate="print">
+            <a:extLst>
+              <a:ext uri="{28A0092B-C50C-407E-A947-70E740481C1C}">
+                <a14:useLocalDpi xmlns:a14="http://schemas.microsoft.com/office/drawing/2010/main" val="0"/>
+              </a:ext>
+            </a:extLst>
+          </a:blip>
           <a:stretch>
             <a:fillRect/>
           </a:stretch>
         </p:blipFill>
         <p:spPr>
           <a:xfrm>
-            <a:off x="5221288" y="1595437"/>
-            <a:ext cx="6096000" cy="3657600"/>
+            <a:off x="-312830" y="2499396"/>
+            <a:ext cx="11710639" cy="2632990"/>
           </a:xfrm>
         </p:spPr>
       </p:pic>
       <p:sp>
         <p:nvSpPr>
+          <p:cNvPr id="4" name="Text Placeholder 3">
+            <a:extLst>
+              <a:ext uri="{FF2B5EF4-FFF2-40B4-BE49-F238E27FC236}">
+                <a16:creationId xmlns:a16="http://schemas.microsoft.com/office/drawing/2014/main" id="{62A3F758-1198-A982-F141-E7B7353A52B0}"/>
+              </a:ext>
+            </a:extLst>
+          </p:cNvPr>
+          <p:cNvSpPr>
+            <a:spLocks noGrp="1"/>
+          </p:cNvSpPr>
+          <p:nvPr>
+            <p:ph type="body" sz="half" idx="2"/>
+          </p:nvPr>
+        </p:nvSpPr>
+        <p:spPr/>
+        <p:txBody>
+          <a:bodyPr/>
+          <a:lstStyle/>
+          <a:p>
+            <a:endParaRPr lang="en-DE"/>
+          </a:p>
+        </p:txBody>
+      </p:sp>
+      <p:sp>
+        <p:nvSpPr>
           <p:cNvPr id="3" name="Textfeld 2">
             <a:extLst>
               <a:ext uri="{FF2B5EF4-FFF2-40B4-BE49-F238E27FC236}">
-                <a16:creationId xmlns:a16="http://schemas.microsoft.com/office/drawing/2014/main" id="{EE654DBD-9C9F-7792-2F9B-8D0FD2B9BF5F}"/>
+                <a16:creationId xmlns:a16="http://schemas.microsoft.com/office/drawing/2014/main" id="{8F97CCA7-EE85-DE8E-AC2C-A412E11936F7}"/>
               </a:ext>
             </a:extLst>
           </p:cNvPr>
@@ -3604,8 +3608,8 @@
         </p:nvSpPr>
         <p:spPr>
           <a:xfrm>
-            <a:off x="5651887" y="5417744"/>
-            <a:ext cx="3510642" cy="369332"/>
+            <a:off x="6170839" y="5572125"/>
+            <a:ext cx="4082142" cy="369332"/>
           </a:xfrm>
           <a:prstGeom prst="rect">
             <a:avLst/>
@@ -3627,28 +3631,15 @@
                   <a:srgbClr val="FF0000"/>
                 </a:solidFill>
               </a:rPr>
-              <a:t>Vergleich mit </a:t>
-            </a:r>
-            <a:r>
-              <a:rPr lang="de-DE" err="1">
-                <a:solidFill>
-                  <a:srgbClr val="FF0000"/>
-                </a:solidFill>
-              </a:rPr>
-              <a:t>Espacenet</a:t>
-            </a:r>
-            <a:endParaRPr lang="de-DE">
-              <a:solidFill>
-                <a:srgbClr val="FF0000"/>
-              </a:solidFill>
-            </a:endParaRPr>
+              <a:t>IPC Codes (?)</a:t>
+            </a:r>
           </a:p>
         </p:txBody>
       </p:sp>
     </p:spTree>
     <p:extLst>
       <p:ext uri="{BB962C8B-B14F-4D97-AF65-F5344CB8AC3E}">
-        <p14:creationId xmlns:p14="http://schemas.microsoft.com/office/powerpoint/2010/main" val="3793083112"/>
+        <p14:creationId xmlns:p14="http://schemas.microsoft.com/office/powerpoint/2010/main" val="3145640299"/>
       </p:ext>
     </p:extLst>
   </p:cSld>
@@ -3680,7 +3671,7 @@
           <p:cNvPr id="2" name="Title 1">
             <a:extLst>
               <a:ext uri="{FF2B5EF4-FFF2-40B4-BE49-F238E27FC236}">
-                <a16:creationId xmlns:a16="http://schemas.microsoft.com/office/drawing/2014/main" id="{48B0D354-45FF-F7F1-B31C-13325FBFAE41}"/>
+                <a16:creationId xmlns:a16="http://schemas.microsoft.com/office/drawing/2014/main" id="{2607136C-E885-609E-94FD-103F489D415B}"/>
               </a:ext>
             </a:extLst>
           </p:cNvPr>
@@ -3709,7 +3700,7 @@
           <p:cNvPr id="4" name="Text Placeholder 3">
             <a:extLst>
               <a:ext uri="{FF2B5EF4-FFF2-40B4-BE49-F238E27FC236}">
-                <a16:creationId xmlns:a16="http://schemas.microsoft.com/office/drawing/2014/main" id="{B6B3E347-573E-8418-4C83-C104B4CA332C}"/>
+                <a16:creationId xmlns:a16="http://schemas.microsoft.com/office/drawing/2014/main" id="{A9E17B91-A842-294D-FDBB-489DAA25A9FA}"/>
               </a:ext>
             </a:extLst>
           </p:cNvPr>
@@ -3722,19 +3713,32 @@
         </p:nvSpPr>
         <p:spPr/>
         <p:txBody>
-          <a:bodyPr/>
-          <a:lstStyle/>
-          <a:p>
+          <a:bodyPr vert="horz" lIns="91440" tIns="45720" rIns="91440" bIns="45720" rtlCol="0" anchor="t">
+            <a:normAutofit/>
+          </a:bodyPr>
+          <a:lstStyle/>
+          <a:p>
+            <a:pPr marL="285750" indent="-285750">
+              <a:buChar char="•"/>
+            </a:pPr>
+            <a:r>
+              <a:rPr lang="en-DE" dirty="0"/>
+              <a:t>WIPO additionally manages the rights to 605 international patents (not shown </a:t>
+            </a:r>
+            <a:r>
+              <a:rPr lang="en-DE"/>
+              <a:t>in graph)</a:t>
+            </a:r>
             <a:endParaRPr lang="en-DE" dirty="0"/>
           </a:p>
         </p:txBody>
       </p:sp>
       <p:pic>
         <p:nvPicPr>
-          <p:cNvPr id="7" name="Content Placeholder 6" descr="A graph showing the number of patentes&#10;&#10;Description automatically generated">
+          <p:cNvPr id="7" name="Content Placeholder 6" descr="A graph of blue and white bars&#10;&#10;Description automatically generated">
             <a:extLst>
               <a:ext uri="{FF2B5EF4-FFF2-40B4-BE49-F238E27FC236}">
-                <a16:creationId xmlns:a16="http://schemas.microsoft.com/office/drawing/2014/main" id="{32121764-E93C-8100-8E7A-17DFC621D7B6}"/>
+                <a16:creationId xmlns:a16="http://schemas.microsoft.com/office/drawing/2014/main" id="{28E7E884-2B3B-27CF-FF3A-73A149F825F9}"/>
               </a:ext>
             </a:extLst>
           </p:cNvPr>
@@ -3760,6 +3764,174 @@
       </p:pic>
       <p:sp>
         <p:nvSpPr>
+          <p:cNvPr id="3" name="Textfeld 2">
+            <a:extLst>
+              <a:ext uri="{FF2B5EF4-FFF2-40B4-BE49-F238E27FC236}">
+                <a16:creationId xmlns:a16="http://schemas.microsoft.com/office/drawing/2014/main" id="{EE654DBD-9C9F-7792-2F9B-8D0FD2B9BF5F}"/>
+              </a:ext>
+            </a:extLst>
+          </p:cNvPr>
+          <p:cNvSpPr txBox="1"/>
+          <p:nvPr/>
+        </p:nvSpPr>
+        <p:spPr>
+          <a:xfrm>
+            <a:off x="5651887" y="5417744"/>
+            <a:ext cx="3510642" cy="369332"/>
+          </a:xfrm>
+          <a:prstGeom prst="rect">
+            <a:avLst/>
+          </a:prstGeom>
+          <a:noFill/>
+        </p:spPr>
+        <p:txBody>
+          <a:bodyPr rot="0" spcFirstLastPara="0" vertOverflow="overflow" horzOverflow="overflow" vert="horz" wrap="square" lIns="91440" tIns="45720" rIns="91440" bIns="45720" numCol="1" spcCol="0" rtlCol="0" fromWordArt="0" anchor="t" anchorCtr="0" forceAA="0" compatLnSpc="1">
+            <a:prstTxWarp prst="textNoShape">
+              <a:avLst/>
+            </a:prstTxWarp>
+            <a:spAutoFit/>
+          </a:bodyPr>
+          <a:lstStyle/>
+          <a:p>
+            <a:r>
+              <a:rPr lang="de-DE" dirty="0">
+                <a:solidFill>
+                  <a:srgbClr val="FF0000"/>
+                </a:solidFill>
+              </a:rPr>
+              <a:t>Vergleich mit </a:t>
+            </a:r>
+            <a:r>
+              <a:rPr lang="de-DE" err="1">
+                <a:solidFill>
+                  <a:srgbClr val="FF0000"/>
+                </a:solidFill>
+              </a:rPr>
+              <a:t>Espacenet</a:t>
+            </a:r>
+            <a:endParaRPr lang="de-DE">
+              <a:solidFill>
+                <a:srgbClr val="FF0000"/>
+              </a:solidFill>
+            </a:endParaRPr>
+          </a:p>
+        </p:txBody>
+      </p:sp>
+    </p:spTree>
+    <p:extLst>
+      <p:ext uri="{BB962C8B-B14F-4D97-AF65-F5344CB8AC3E}">
+        <p14:creationId xmlns:p14="http://schemas.microsoft.com/office/powerpoint/2010/main" val="3793083112"/>
+      </p:ext>
+    </p:extLst>
+  </p:cSld>
+  <p:clrMapOvr>
+    <a:masterClrMapping/>
+  </p:clrMapOvr>
+</p:sld>
+</file>
+
+<file path=ppt/slides/slide14.xml><?xml version="1.0" encoding="utf-8"?>
+<p:sld xmlns:a="http://schemas.openxmlformats.org/drawingml/2006/main" xmlns:r="http://schemas.openxmlformats.org/officeDocument/2006/relationships" xmlns:p="http://schemas.openxmlformats.org/presentationml/2006/main">
+  <p:cSld>
+    <p:spTree>
+      <p:nvGrpSpPr>
+        <p:cNvPr id="1" name=""/>
+        <p:cNvGrpSpPr/>
+        <p:nvPr/>
+      </p:nvGrpSpPr>
+      <p:grpSpPr>
+        <a:xfrm>
+          <a:off x="0" y="0"/>
+          <a:ext cx="0" cy="0"/>
+          <a:chOff x="0" y="0"/>
+          <a:chExt cx="0" cy="0"/>
+        </a:xfrm>
+      </p:grpSpPr>
+      <p:sp>
+        <p:nvSpPr>
+          <p:cNvPr id="2" name="Title 1">
+            <a:extLst>
+              <a:ext uri="{FF2B5EF4-FFF2-40B4-BE49-F238E27FC236}">
+                <a16:creationId xmlns:a16="http://schemas.microsoft.com/office/drawing/2014/main" id="{48B0D354-45FF-F7F1-B31C-13325FBFAE41}"/>
+              </a:ext>
+            </a:extLst>
+          </p:cNvPr>
+          <p:cNvSpPr>
+            <a:spLocks noGrp="1"/>
+          </p:cNvSpPr>
+          <p:nvPr>
+            <p:ph type="title"/>
+          </p:nvPr>
+        </p:nvSpPr>
+        <p:spPr/>
+        <p:txBody>
+          <a:bodyPr/>
+          <a:lstStyle/>
+          <a:p>
+            <a:r>
+              <a:rPr lang="en-US" dirty="0"/>
+              <a:t>WIPO</a:t>
+            </a:r>
+            <a:endParaRPr lang="en-DE" dirty="0"/>
+          </a:p>
+        </p:txBody>
+      </p:sp>
+      <p:sp>
+        <p:nvSpPr>
+          <p:cNvPr id="4" name="Text Placeholder 3">
+            <a:extLst>
+              <a:ext uri="{FF2B5EF4-FFF2-40B4-BE49-F238E27FC236}">
+                <a16:creationId xmlns:a16="http://schemas.microsoft.com/office/drawing/2014/main" id="{B6B3E347-573E-8418-4C83-C104B4CA332C}"/>
+              </a:ext>
+            </a:extLst>
+          </p:cNvPr>
+          <p:cNvSpPr>
+            <a:spLocks noGrp="1"/>
+          </p:cNvSpPr>
+          <p:nvPr>
+            <p:ph type="body" sz="half" idx="2"/>
+          </p:nvPr>
+        </p:nvSpPr>
+        <p:spPr/>
+        <p:txBody>
+          <a:bodyPr/>
+          <a:lstStyle/>
+          <a:p>
+            <a:endParaRPr lang="en-DE" dirty="0"/>
+          </a:p>
+        </p:txBody>
+      </p:sp>
+      <p:pic>
+        <p:nvPicPr>
+          <p:cNvPr id="7" name="Content Placeholder 6" descr="A graph showing the number of patentes&#10;&#10;Description automatically generated">
+            <a:extLst>
+              <a:ext uri="{FF2B5EF4-FFF2-40B4-BE49-F238E27FC236}">
+                <a16:creationId xmlns:a16="http://schemas.microsoft.com/office/drawing/2014/main" id="{32121764-E93C-8100-8E7A-17DFC621D7B6}"/>
+              </a:ext>
+            </a:extLst>
+          </p:cNvPr>
+          <p:cNvPicPr>
+            <a:picLocks noGrp="1" noChangeAspect="1"/>
+          </p:cNvPicPr>
+          <p:nvPr>
+            <p:ph idx="1"/>
+          </p:nvPr>
+        </p:nvPicPr>
+        <p:blipFill>
+          <a:blip r:embed="rId2"/>
+          <a:stretch>
+            <a:fillRect/>
+          </a:stretch>
+        </p:blipFill>
+        <p:spPr>
+          <a:xfrm>
+            <a:off x="5221288" y="1595437"/>
+            <a:ext cx="6096000" cy="3657600"/>
+          </a:xfrm>
+        </p:spPr>
+      </p:pic>
+      <p:sp>
+        <p:nvSpPr>
           <p:cNvPr id="5" name="Textfeld 4">
             <a:extLst>
               <a:ext uri="{FF2B5EF4-FFF2-40B4-BE49-F238E27FC236}">
@@ -3826,7 +3998,7 @@
 </p:sld>
 </file>
 
-<file path=ppt/slides/slide14.xml><?xml version="1.0" encoding="utf-8"?>
+<file path=ppt/slides/slide15.xml><?xml version="1.0" encoding="utf-8"?>
 <p:sld xmlns:a="http://schemas.openxmlformats.org/drawingml/2006/main" xmlns:r="http://schemas.openxmlformats.org/officeDocument/2006/relationships" xmlns:p="http://schemas.openxmlformats.org/presentationml/2006/main">
   <p:cSld>
     <p:spTree>
@@ -3991,15 +4163,18 @@
                 <a:ea typeface="+mn-lt"/>
                 <a:cs typeface="+mn-lt"/>
               </a:rPr>
-              <a:t>  TS=("</a:t>
-            </a:r>
-            <a:r>
-              <a:rPr lang="en-GB" sz="1400" err="1">
-                <a:latin typeface="Lucida Console"/>
-                <a:ea typeface="+mn-lt"/>
-                <a:cs typeface="+mn-lt"/>
-              </a:rPr>
-              <a:t>self heal</a:t>
+              <a:t>  TS=("self heal*" </a:t>
+            </a:r>
+            <a:r>
+              <a:rPr lang="en-GB" sz="1400" b="1" dirty="0">
+                <a:solidFill>
+                  <a:srgbClr val="000080"/>
+                </a:solidFill>
+                <a:latin typeface="Lucida Console"/>
+                <a:ea typeface="+mn-lt"/>
+                <a:cs typeface="+mn-lt"/>
+              </a:rPr>
+              <a:t>OR</a:t>
             </a:r>
             <a:r>
               <a:rPr lang="en-GB" sz="1400" dirty="0">
@@ -4007,7 +4182,7 @@
                 <a:ea typeface="+mn-lt"/>
                 <a:cs typeface="+mn-lt"/>
               </a:rPr>
-              <a:t>*" </a:t>
+              <a:t> "self repair*" </a:t>
             </a:r>
             <a:r>
               <a:rPr lang="en-GB" sz="1400" b="1" dirty="0">
@@ -4029,12 +4204,12 @@
               <a:t> "</a:t>
             </a:r>
             <a:r>
-              <a:rPr lang="en-GB" sz="1400" err="1">
-                <a:latin typeface="Lucida Console"/>
-                <a:ea typeface="+mn-lt"/>
-                <a:cs typeface="+mn-lt"/>
-              </a:rPr>
-              <a:t>self repair</a:t>
+              <a:rPr lang="en-GB" sz="1400" dirty="0" err="1">
+                <a:latin typeface="Lucida Console"/>
+                <a:ea typeface="+mn-lt"/>
+                <a:cs typeface="+mn-lt"/>
+              </a:rPr>
+              <a:t>autonom</a:t>
             </a:r>
             <a:r>
               <a:rPr lang="en-GB" sz="1400" dirty="0">
@@ -4042,7 +4217,7 @@
                 <a:ea typeface="+mn-lt"/>
                 <a:cs typeface="+mn-lt"/>
               </a:rPr>
-              <a:t>*" </a:t>
+              <a:t>* repair*" </a:t>
             </a:r>
             <a:r>
               <a:rPr lang="en-GB" sz="1400" b="1" dirty="0">
@@ -4064,7 +4239,7 @@
               <a:t> "</a:t>
             </a:r>
             <a:r>
-              <a:rPr lang="en-GB" sz="1400" err="1">
+              <a:rPr lang="en-GB" sz="1400" dirty="0" err="1">
                 <a:latin typeface="Lucida Console"/>
                 <a:ea typeface="+mn-lt"/>
                 <a:cs typeface="+mn-lt"/>
@@ -4077,44 +4252,9 @@
                 <a:ea typeface="+mn-lt"/>
                 <a:cs typeface="+mn-lt"/>
               </a:rPr>
-              <a:t>* repair*" </a:t>
-            </a:r>
-            <a:r>
-              <a:rPr lang="en-GB" sz="1400" b="1" dirty="0">
-                <a:solidFill>
-                  <a:srgbClr val="000080"/>
-                </a:solidFill>
-                <a:latin typeface="Lucida Console"/>
-                <a:ea typeface="+mn-lt"/>
-                <a:cs typeface="+mn-lt"/>
-              </a:rPr>
-              <a:t>OR</a:t>
-            </a:r>
-            <a:r>
-              <a:rPr lang="en-GB" sz="1400" dirty="0">
-                <a:latin typeface="Lucida Console"/>
-                <a:ea typeface="+mn-lt"/>
-                <a:cs typeface="+mn-lt"/>
-              </a:rPr>
-              <a:t> "</a:t>
-            </a:r>
-            <a:r>
-              <a:rPr lang="en-GB" sz="1400" err="1">
-                <a:latin typeface="Lucida Console"/>
-                <a:ea typeface="+mn-lt"/>
-                <a:cs typeface="+mn-lt"/>
-              </a:rPr>
-              <a:t>autonom</a:t>
-            </a:r>
-            <a:r>
-              <a:rPr lang="en-GB" sz="1400" dirty="0">
-                <a:latin typeface="Lucida Console"/>
-                <a:ea typeface="+mn-lt"/>
-                <a:cs typeface="+mn-lt"/>
-              </a:rPr>
               <a:t>* heal*")</a:t>
             </a:r>
-            <a:endParaRPr lang="en-US" sz="1400"/>
+            <a:endParaRPr lang="en-US" sz="1400" dirty="0"/>
           </a:p>
           <a:p>
             <a:pPr marL="0" indent="0">
@@ -4612,7 +4752,7 @@
               </a:rPr>
               <a:t> "spirit*")  </a:t>
             </a:r>
-            <a:endParaRPr lang="en-GB" sz="1400">
+            <a:endParaRPr lang="en-GB" sz="1400" dirty="0">
               <a:solidFill>
                 <a:srgbClr val="000000"/>
               </a:solidFill>
@@ -4663,7 +4803,7 @@
               </a:rPr>
               <a:t>)</a:t>
             </a:r>
-            <a:endParaRPr lang="en-GB" sz="1400"/>
+            <a:endParaRPr lang="en-GB" sz="1400" dirty="0"/>
           </a:p>
           <a:p>
             <a:endParaRPr lang="en-GB" dirty="0"/>
@@ -4780,6 +4920,165 @@
   <p:cSld>
     <p:spTree>
       <p:nvGrpSpPr>
+        <p:cNvPr id="1" name="">
+          <a:extLst>
+            <a:ext uri="{FF2B5EF4-FFF2-40B4-BE49-F238E27FC236}">
+              <a16:creationId xmlns:a16="http://schemas.microsoft.com/office/drawing/2014/main" id="{B0D8BFF9-DE05-DAAC-6ACC-438907B13EFC}"/>
+            </a:ext>
+          </a:extLst>
+        </p:cNvPr>
+        <p:cNvGrpSpPr/>
+        <p:nvPr/>
+      </p:nvGrpSpPr>
+      <p:grpSpPr>
+        <a:xfrm>
+          <a:off x="0" y="0"/>
+          <a:ext cx="0" cy="0"/>
+          <a:chOff x="0" y="0"/>
+          <a:chExt cx="0" cy="0"/>
+        </a:xfrm>
+      </p:grpSpPr>
+      <p:sp>
+        <p:nvSpPr>
+          <p:cNvPr id="2" name="Title 1">
+            <a:extLst>
+              <a:ext uri="{FF2B5EF4-FFF2-40B4-BE49-F238E27FC236}">
+                <a16:creationId xmlns:a16="http://schemas.microsoft.com/office/drawing/2014/main" id="{00B2BAF8-5B1E-961D-5B94-0AF612A46044}"/>
+              </a:ext>
+            </a:extLst>
+          </p:cNvPr>
+          <p:cNvSpPr>
+            <a:spLocks noGrp="1"/>
+          </p:cNvSpPr>
+          <p:nvPr>
+            <p:ph type="title"/>
+          </p:nvPr>
+        </p:nvSpPr>
+        <p:spPr>
+          <a:xfrm>
+            <a:off x="839788" y="457200"/>
+            <a:ext cx="10517651" cy="1309030"/>
+          </a:xfrm>
+        </p:spPr>
+        <p:txBody>
+          <a:bodyPr vert="horz" lIns="91440" tIns="45720" rIns="91440" bIns="45720" rtlCol="0" anchor="t">
+            <a:normAutofit/>
+          </a:bodyPr>
+          <a:lstStyle/>
+          <a:p>
+            <a:r>
+              <a:rPr lang="en-GB" dirty="0"/>
+              <a:t>Number of annual publications for all material types</a:t>
+            </a:r>
+          </a:p>
+        </p:txBody>
+      </p:sp>
+      <p:sp>
+        <p:nvSpPr>
+          <p:cNvPr id="8" name="Text Placeholder 7">
+            <a:extLst>
+              <a:ext uri="{FF2B5EF4-FFF2-40B4-BE49-F238E27FC236}">
+                <a16:creationId xmlns:a16="http://schemas.microsoft.com/office/drawing/2014/main" id="{DBC74D7B-5F0F-DD3B-3637-3A5FCF93D79E}"/>
+              </a:ext>
+            </a:extLst>
+          </p:cNvPr>
+          <p:cNvSpPr>
+            <a:spLocks noGrp="1"/>
+          </p:cNvSpPr>
+          <p:nvPr>
+            <p:ph type="body" sz="half" idx="2"/>
+          </p:nvPr>
+        </p:nvSpPr>
+        <p:spPr>
+          <a:xfrm>
+            <a:off x="839788" y="1574180"/>
+            <a:ext cx="3932237" cy="3706271"/>
+          </a:xfrm>
+        </p:spPr>
+        <p:txBody>
+          <a:bodyPr vert="horz" lIns="91440" tIns="45720" rIns="91440" bIns="45720" rtlCol="0" anchor="ctr">
+            <a:normAutofit/>
+          </a:bodyPr>
+          <a:lstStyle/>
+          <a:p>
+            <a:pPr marL="285750" indent="-285750">
+              <a:buChar char="•"/>
+            </a:pPr>
+            <a:r>
+              <a:rPr lang="en-GB" dirty="0"/>
+              <a:t>Annual publications are steadily increasing each year</a:t>
+            </a:r>
+          </a:p>
+          <a:p>
+            <a:pPr marL="285750" indent="-285750">
+              <a:buChar char="•"/>
+            </a:pPr>
+            <a:r>
+              <a:rPr lang="en-GB" dirty="0"/>
+              <a:t>While some years have a higher increase than others to the previous year, generally the increase is linear</a:t>
+            </a:r>
+          </a:p>
+          <a:p>
+            <a:pPr marL="285750" indent="-285750">
+              <a:buChar char="•"/>
+            </a:pPr>
+            <a:endParaRPr lang="en-GB" dirty="0"/>
+          </a:p>
+        </p:txBody>
+      </p:sp>
+      <p:pic>
+        <p:nvPicPr>
+          <p:cNvPr id="9" name="Content Placeholder 8" descr="A graph showing the growth of a number of publications&#10;&#10;Description automatically generated">
+            <a:extLst>
+              <a:ext uri="{FF2B5EF4-FFF2-40B4-BE49-F238E27FC236}">
+                <a16:creationId xmlns:a16="http://schemas.microsoft.com/office/drawing/2014/main" id="{4D1B89E6-3507-606D-9C55-C974AFEADE1D}"/>
+              </a:ext>
+            </a:extLst>
+          </p:cNvPr>
+          <p:cNvPicPr>
+            <a:picLocks noGrp="1" noChangeAspect="1"/>
+          </p:cNvPicPr>
+          <p:nvPr>
+            <p:ph idx="1"/>
+          </p:nvPr>
+        </p:nvPicPr>
+        <p:blipFill>
+          <a:blip r:embed="rId2">
+            <a:extLst>
+              <a:ext uri="{28A0092B-C50C-407E-A947-70E740481C1C}">
+                <a14:useLocalDpi xmlns:a14="http://schemas.microsoft.com/office/drawing/2010/main" val="0"/>
+              </a:ext>
+            </a:extLst>
+          </a:blip>
+          <a:stretch>
+            <a:fillRect/>
+          </a:stretch>
+        </p:blipFill>
+        <p:spPr>
+          <a:xfrm>
+            <a:off x="5183188" y="1572577"/>
+            <a:ext cx="6172200" cy="3703320"/>
+          </a:xfrm>
+        </p:spPr>
+      </p:pic>
+    </p:spTree>
+    <p:extLst>
+      <p:ext uri="{BB962C8B-B14F-4D97-AF65-F5344CB8AC3E}">
+        <p14:creationId xmlns:p14="http://schemas.microsoft.com/office/powerpoint/2010/main" val="2583637851"/>
+      </p:ext>
+    </p:extLst>
+  </p:cSld>
+  <p:clrMapOvr>
+    <a:masterClrMapping/>
+  </p:clrMapOvr>
+</p:sld>
+</file>
+
+<file path=ppt/slides/slide4.xml><?xml version="1.0" encoding="utf-8"?>
+<p:sld xmlns:a="http://schemas.openxmlformats.org/drawingml/2006/main" xmlns:r="http://schemas.openxmlformats.org/officeDocument/2006/relationships" xmlns:p="http://schemas.openxmlformats.org/presentationml/2006/main">
+  <p:cSld>
+    <p:spTree>
+      <p:nvGrpSpPr>
         <p:cNvPr id="1" name=""/>
         <p:cNvGrpSpPr/>
         <p:nvPr/>
@@ -4856,12 +5155,193 @@
           <a:lstStyle/>
           <a:p>
             <a:pPr marL="285750" indent="-285750">
+              <a:buFont typeface="Arial" panose="020B0604020202020204" pitchFamily="34" charset="0"/>
               <a:buChar char="•"/>
             </a:pPr>
             <a:r>
-              <a:rPr lang="en-GB" dirty="0"/>
-              <a:t>Yearly Number of Publications is generally rising for all material types. </a:t>
-            </a:r>
+              <a:rPr lang="en-GB" sz="1600" b="1" dirty="0">
+                <a:solidFill>
+                  <a:srgbClr val="000080"/>
+                </a:solidFill>
+                <a:latin typeface="Lucida Console"/>
+                <a:ea typeface="+mn-lt"/>
+                <a:cs typeface="+mn-lt"/>
+              </a:rPr>
+              <a:t>AND</a:t>
+            </a:r>
+            <a:r>
+              <a:rPr lang="en-GB" sz="1600" dirty="0">
+                <a:latin typeface="Lucida Console"/>
+                <a:ea typeface="+mn-lt"/>
+                <a:cs typeface="+mn-lt"/>
+              </a:rPr>
+              <a:t> TS=(</a:t>
+            </a:r>
+            <a:r>
+              <a:rPr lang="en-GB" sz="1600" strike="sngStrike" dirty="0">
+                <a:latin typeface="Lucida Console"/>
+                <a:ea typeface="+mn-lt"/>
+                <a:cs typeface="+mn-lt"/>
+              </a:rPr>
+              <a:t>"material*" </a:t>
+            </a:r>
+            <a:r>
+              <a:rPr lang="en-GB" sz="1600" b="1" strike="sngStrike" dirty="0">
+                <a:solidFill>
+                  <a:srgbClr val="000080"/>
+                </a:solidFill>
+                <a:latin typeface="Lucida Console"/>
+                <a:ea typeface="+mn-lt"/>
+                <a:cs typeface="+mn-lt"/>
+              </a:rPr>
+              <a:t>OR</a:t>
+            </a:r>
+            <a:r>
+              <a:rPr lang="en-GB" sz="1600" dirty="0">
+                <a:latin typeface="Lucida Console"/>
+                <a:ea typeface="+mn-lt"/>
+                <a:cs typeface="+mn-lt"/>
+              </a:rPr>
+              <a:t> </a:t>
+            </a:r>
+            <a:r>
+              <a:rPr lang="en-GB" sz="1600" dirty="0">
+                <a:solidFill>
+                  <a:srgbClr val="FF0000"/>
+                </a:solidFill>
+                <a:latin typeface="Lucida Console"/>
+                <a:ea typeface="+mn-lt"/>
+                <a:cs typeface="+mn-lt"/>
+              </a:rPr>
+              <a:t>"polymer*" </a:t>
+            </a:r>
+            <a:r>
+              <a:rPr lang="en-GB" sz="1600" b="1" strike="sngStrike" dirty="0">
+                <a:solidFill>
+                  <a:srgbClr val="000080"/>
+                </a:solidFill>
+                <a:latin typeface="Lucida Console"/>
+                <a:ea typeface="+mn-lt"/>
+                <a:cs typeface="+mn-lt"/>
+              </a:rPr>
+              <a:t>OR</a:t>
+            </a:r>
+            <a:r>
+              <a:rPr lang="en-GB" sz="1600" strike="sngStrike" dirty="0">
+                <a:latin typeface="Lucida Console"/>
+                <a:ea typeface="+mn-lt"/>
+                <a:cs typeface="+mn-lt"/>
+              </a:rPr>
+              <a:t> "composite*" </a:t>
+            </a:r>
+            <a:r>
+              <a:rPr lang="en-GB" sz="1600" b="1" strike="sngStrike" dirty="0">
+                <a:solidFill>
+                  <a:srgbClr val="000080"/>
+                </a:solidFill>
+                <a:latin typeface="Lucida Console"/>
+                <a:ea typeface="+mn-lt"/>
+                <a:cs typeface="+mn-lt"/>
+              </a:rPr>
+              <a:t>OR</a:t>
+            </a:r>
+            <a:r>
+              <a:rPr lang="en-GB" sz="1600" strike="sngStrike" dirty="0">
+                <a:latin typeface="Lucida Console"/>
+                <a:ea typeface="+mn-lt"/>
+                <a:cs typeface="+mn-lt"/>
+              </a:rPr>
+              <a:t> "ceramic*" </a:t>
+            </a:r>
+            <a:r>
+              <a:rPr lang="en-GB" sz="1600" b="1" strike="sngStrike" dirty="0">
+                <a:solidFill>
+                  <a:srgbClr val="000080"/>
+                </a:solidFill>
+                <a:latin typeface="Lucida Console"/>
+                <a:ea typeface="+mn-lt"/>
+                <a:cs typeface="+mn-lt"/>
+              </a:rPr>
+              <a:t>OR</a:t>
+            </a:r>
+            <a:r>
+              <a:rPr lang="en-GB" sz="1600" strike="sngStrike" dirty="0">
+                <a:latin typeface="Lucida Console"/>
+                <a:ea typeface="+mn-lt"/>
+                <a:cs typeface="+mn-lt"/>
+              </a:rPr>
+              <a:t> "metal*" </a:t>
+            </a:r>
+            <a:r>
+              <a:rPr lang="en-GB" sz="1600" b="1" strike="sngStrike" dirty="0">
+                <a:solidFill>
+                  <a:srgbClr val="000080"/>
+                </a:solidFill>
+                <a:latin typeface="Lucida Console"/>
+                <a:ea typeface="+mn-lt"/>
+                <a:cs typeface="+mn-lt"/>
+              </a:rPr>
+              <a:t>OR</a:t>
+            </a:r>
+            <a:r>
+              <a:rPr lang="en-GB" sz="1600" strike="sngStrike" dirty="0">
+                <a:latin typeface="Lucida Console"/>
+                <a:ea typeface="+mn-lt"/>
+                <a:cs typeface="+mn-lt"/>
+              </a:rPr>
+              <a:t>  "alloy*" </a:t>
+            </a:r>
+            <a:r>
+              <a:rPr lang="en-GB" sz="1600" b="1" strike="sngStrike" dirty="0">
+                <a:solidFill>
+                  <a:srgbClr val="000080"/>
+                </a:solidFill>
+                <a:latin typeface="Lucida Console"/>
+                <a:ea typeface="+mn-lt"/>
+                <a:cs typeface="+mn-lt"/>
+              </a:rPr>
+              <a:t>OR</a:t>
+            </a:r>
+            <a:r>
+              <a:rPr lang="en-GB" sz="1600" strike="sngStrike" dirty="0">
+                <a:latin typeface="Lucida Console"/>
+                <a:ea typeface="+mn-lt"/>
+                <a:cs typeface="+mn-lt"/>
+              </a:rPr>
+              <a:t>   "cement*" </a:t>
+            </a:r>
+            <a:r>
+              <a:rPr lang="en-GB" sz="1600" b="1" strike="sngStrike" dirty="0">
+                <a:solidFill>
+                  <a:srgbClr val="000080"/>
+                </a:solidFill>
+                <a:latin typeface="Lucida Console"/>
+                <a:ea typeface="+mn-lt"/>
+                <a:cs typeface="+mn-lt"/>
+              </a:rPr>
+              <a:t>OR</a:t>
+            </a:r>
+            <a:r>
+              <a:rPr lang="en-GB" sz="1600" strike="sngStrike" dirty="0">
+                <a:latin typeface="Lucida Console"/>
+                <a:ea typeface="+mn-lt"/>
+                <a:cs typeface="+mn-lt"/>
+              </a:rPr>
+              <a:t> "concrete*“</a:t>
+            </a:r>
+            <a:r>
+              <a:rPr lang="en-GB" sz="1600" dirty="0">
+                <a:latin typeface="Lucida Console"/>
+                <a:ea typeface="+mn-lt"/>
+                <a:cs typeface="+mn-lt"/>
+              </a:rPr>
+              <a:t>) and so on</a:t>
+            </a:r>
+            <a:endParaRPr lang="en-GB" sz="1600" dirty="0">
+              <a:latin typeface="Aptos" panose="020B0004020202020204"/>
+              <a:ea typeface="+mn-lt"/>
+              <a:cs typeface="+mn-lt"/>
+            </a:endParaRPr>
           </a:p>
           <a:p>
             <a:pPr marL="285750" indent="-285750">
@@ -4870,6 +5350,16 @@
             <a:r>
               <a:rPr lang="en-GB" dirty="0"/>
               <a:t>The most amount of research is done regarding self-healing polymer materials</a:t>
+            </a:r>
+          </a:p>
+          <a:p>
+            <a:pPr marL="285750" indent="-285750">
+              <a:buFont typeface="Arial" panose="020B0604020202020204" pitchFamily="34" charset="0"/>
+              <a:buChar char="•"/>
+            </a:pPr>
+            <a:r>
+              <a:rPr lang="en-GB" dirty="0"/>
+              <a:t>Yearly Number of Publications is generally rising for all material types. </a:t>
             </a:r>
           </a:p>
         </p:txBody>
@@ -4888,7 +5378,7 @@
         </p:nvSpPr>
         <p:spPr>
           <a:xfrm>
-            <a:off x="2041071" y="4565196"/>
+            <a:off x="2649310" y="4932589"/>
             <a:ext cx="2769053" cy="1754326"/>
           </a:xfrm>
           <a:prstGeom prst="rect">
@@ -5005,39 +5495,7 @@
                   <a:srgbClr val="FF0000"/>
                 </a:solidFill>
               </a:rPr>
-              <a:t>Kategorien summieren wegen </a:t>
-            </a:r>
-            <a:r>
-              <a:rPr lang="de-DE" err="1">
-                <a:solidFill>
-                  <a:srgbClr val="FF0000"/>
-                </a:solidFill>
-              </a:rPr>
-              <a:t>Searchstring</a:t>
-            </a:r>
-            <a:r>
-              <a:rPr lang="de-DE" dirty="0">
-                <a:solidFill>
-                  <a:srgbClr val="FF0000"/>
-                </a:solidFill>
-              </a:rPr>
-              <a:t>, bzw. </a:t>
-            </a:r>
-            <a:r>
-              <a:rPr lang="de-DE" err="1">
-                <a:solidFill>
-                  <a:srgbClr val="FF0000"/>
-                </a:solidFill>
-              </a:rPr>
-              <a:t>Seachstring</a:t>
-            </a:r>
-            <a:r>
-              <a:rPr lang="de-DE" dirty="0">
-                <a:solidFill>
-                  <a:srgbClr val="FF0000"/>
-                </a:solidFill>
-              </a:rPr>
-              <a:t> nach Kategorien aufteilen oder Filter nach Material erwähnen</a:t>
+              <a:t>Kategorien summieren wegen Searchstring, bzw. Seachstring nach Kategorien aufteilen oder Filter nach Material erwähnen</a:t>
             </a:r>
           </a:p>
         </p:txBody>
@@ -5084,7 +5542,7 @@
 </p:sld>
 </file>
 
-<file path=ppt/slides/slide4.xml><?xml version="1.0" encoding="utf-8"?>
+<file path=ppt/slides/slide5.xml><?xml version="1.0" encoding="utf-8"?>
 <p:sld xmlns:a="http://schemas.openxmlformats.org/drawingml/2006/main" xmlns:r="http://schemas.openxmlformats.org/officeDocument/2006/relationships" xmlns:p="http://schemas.openxmlformats.org/presentationml/2006/main">
   <p:cSld>
     <p:spTree>
@@ -5248,7 +5706,7 @@
 </p:sld>
 </file>
 
-<file path=ppt/slides/slide5.xml><?xml version="1.0" encoding="utf-8"?>
+<file path=ppt/slides/slide6.xml><?xml version="1.0" encoding="utf-8"?>
 <p:sld xmlns:a="http://schemas.openxmlformats.org/drawingml/2006/main" xmlns:r="http://schemas.openxmlformats.org/officeDocument/2006/relationships" xmlns:p="http://schemas.openxmlformats.org/presentationml/2006/main">
   <p:cSld>
     <p:spTree>
@@ -5413,7 +5871,7 @@
 </p:sld>
 </file>
 
-<file path=ppt/slides/slide6.xml><?xml version="1.0" encoding="utf-8"?>
+<file path=ppt/slides/slide7.xml><?xml version="1.0" encoding="utf-8"?>
 <p:sld xmlns:a="http://schemas.openxmlformats.org/drawingml/2006/main" xmlns:r="http://schemas.openxmlformats.org/officeDocument/2006/relationships" xmlns:p="http://schemas.openxmlformats.org/presentationml/2006/main">
   <p:cSld>
     <p:spTree>
@@ -5555,7 +6013,17 @@
             </a:pPr>
             <a:r>
               <a:rPr lang="en-GB" dirty="0"/>
-              <a:t>Papers mentioned under different variations of CAS are all included in “Chinese Academy of Sciences”. The others have thus been omitted</a:t>
+              <a:t>Papers mentioned under variations of CAS are all included in “Chinese Academy of Sciences” </a:t>
+            </a:r>
+            <a:r>
+              <a:rPr lang="en-GB" dirty="0">
+                <a:sym typeface="Wingdings" panose="05000000000000000000" pitchFamily="2" charset="2"/>
+              </a:rPr>
+              <a:t> </a:t>
+            </a:r>
+            <a:r>
+              <a:rPr lang="en-GB" dirty="0"/>
+              <a:t>others have thus been omitted</a:t>
             </a:r>
           </a:p>
         </p:txBody>
@@ -5608,7 +6076,7 @@
 </p:sld>
 </file>
 
-<file path=ppt/slides/slide7.xml><?xml version="1.0" encoding="utf-8"?>
+<file path=ppt/slides/slide8.xml><?xml version="1.0" encoding="utf-8"?>
 <p:sld xmlns:a="http://schemas.openxmlformats.org/drawingml/2006/main" xmlns:r="http://schemas.openxmlformats.org/officeDocument/2006/relationships" xmlns:p="http://schemas.openxmlformats.org/presentationml/2006/main">
   <p:cSld>
     <p:spTree>
@@ -5759,7 +6227,7 @@
 </p:sld>
 </file>
 
-<file path=ppt/slides/slide8.xml><?xml version="1.0" encoding="utf-8"?>
+<file path=ppt/slides/slide9.xml><?xml version="1.0" encoding="utf-8"?>
 <p:sld xmlns:a="http://schemas.openxmlformats.org/drawingml/2006/main" xmlns:r="http://schemas.openxmlformats.org/officeDocument/2006/relationships" xmlns:p="http://schemas.openxmlformats.org/presentationml/2006/main">
   <p:cSld>
     <p:spTree>
@@ -5943,177 +6411,6 @@
     <p:extLst>
       <p:ext uri="{BB962C8B-B14F-4D97-AF65-F5344CB8AC3E}">
         <p14:creationId xmlns:p14="http://schemas.microsoft.com/office/powerpoint/2010/main" val="2163132736"/>
-      </p:ext>
-    </p:extLst>
-  </p:cSld>
-  <p:clrMapOvr>
-    <a:masterClrMapping/>
-  </p:clrMapOvr>
-</p:sld>
-</file>
-
-<file path=ppt/slides/slide9.xml><?xml version="1.0" encoding="utf-8"?>
-<p:sld xmlns:a="http://schemas.openxmlformats.org/drawingml/2006/main" xmlns:r="http://schemas.openxmlformats.org/officeDocument/2006/relationships" xmlns:p="http://schemas.openxmlformats.org/presentationml/2006/main">
-  <p:cSld>
-    <p:spTree>
-      <p:nvGrpSpPr>
-        <p:cNvPr id="1" name=""/>
-        <p:cNvGrpSpPr/>
-        <p:nvPr/>
-      </p:nvGrpSpPr>
-      <p:grpSpPr>
-        <a:xfrm>
-          <a:off x="0" y="0"/>
-          <a:ext cx="0" cy="0"/>
-          <a:chOff x="0" y="0"/>
-          <a:chExt cx="0" cy="0"/>
-        </a:xfrm>
-      </p:grpSpPr>
-      <p:sp>
-        <p:nvSpPr>
-          <p:cNvPr id="2" name="Title 1">
-            <a:extLst>
-              <a:ext uri="{FF2B5EF4-FFF2-40B4-BE49-F238E27FC236}">
-                <a16:creationId xmlns:a16="http://schemas.microsoft.com/office/drawing/2014/main" id="{2AB2648D-BA5B-91F5-8BC1-12201440757D}"/>
-              </a:ext>
-            </a:extLst>
-          </p:cNvPr>
-          <p:cNvSpPr>
-            <a:spLocks noGrp="1"/>
-          </p:cNvSpPr>
-          <p:nvPr>
-            <p:ph type="title"/>
-          </p:nvPr>
-        </p:nvSpPr>
-        <p:spPr/>
-        <p:txBody>
-          <a:bodyPr/>
-          <a:lstStyle/>
-          <a:p>
-            <a:r>
-              <a:rPr lang="en-US" dirty="0" err="1"/>
-              <a:t>Espacenet</a:t>
-            </a:r>
-            <a:endParaRPr lang="en-DE" dirty="0"/>
-          </a:p>
-        </p:txBody>
-      </p:sp>
-      <p:sp>
-        <p:nvSpPr>
-          <p:cNvPr id="4" name="Text Placeholder 3">
-            <a:extLst>
-              <a:ext uri="{FF2B5EF4-FFF2-40B4-BE49-F238E27FC236}">
-                <a16:creationId xmlns:a16="http://schemas.microsoft.com/office/drawing/2014/main" id="{8DC21876-0FFB-AD28-4A1F-84768DB132F2}"/>
-              </a:ext>
-            </a:extLst>
-          </p:cNvPr>
-          <p:cNvSpPr>
-            <a:spLocks noGrp="1"/>
-          </p:cNvSpPr>
-          <p:nvPr>
-            <p:ph type="body" sz="half" idx="2"/>
-          </p:nvPr>
-        </p:nvSpPr>
-        <p:spPr/>
-        <p:txBody>
-          <a:bodyPr/>
-          <a:lstStyle/>
-          <a:p>
-            <a:endParaRPr lang="en-DE"/>
-          </a:p>
-        </p:txBody>
-      </p:sp>
-      <p:sp>
-        <p:nvSpPr>
-          <p:cNvPr id="5" name="Textfeld 4">
-            <a:extLst>
-              <a:ext uri="{FF2B5EF4-FFF2-40B4-BE49-F238E27FC236}">
-                <a16:creationId xmlns:a16="http://schemas.microsoft.com/office/drawing/2014/main" id="{340D1631-92C9-1212-9EA2-BC51E54E31A4}"/>
-              </a:ext>
-            </a:extLst>
-          </p:cNvPr>
-          <p:cNvSpPr txBox="1"/>
-          <p:nvPr/>
-        </p:nvSpPr>
-        <p:spPr>
-          <a:xfrm>
-            <a:off x="1149471" y="2763964"/>
-            <a:ext cx="2735035" cy="369332"/>
-          </a:xfrm>
-          <a:prstGeom prst="rect">
-            <a:avLst/>
-          </a:prstGeom>
-          <a:noFill/>
-        </p:spPr>
-        <p:txBody>
-          <a:bodyPr rot="0" spcFirstLastPara="0" vertOverflow="overflow" horzOverflow="overflow" vert="horz" wrap="square" lIns="91440" tIns="45720" rIns="91440" bIns="45720" numCol="1" spcCol="0" rtlCol="0" fromWordArt="0" anchor="t" anchorCtr="0" forceAA="0" compatLnSpc="1">
-            <a:prstTxWarp prst="textNoShape">
-              <a:avLst/>
-            </a:prstTxWarp>
-            <a:spAutoFit/>
-          </a:bodyPr>
-          <a:lstStyle/>
-          <a:p>
-            <a:r>
-              <a:rPr lang="de-DE" dirty="0">
-                <a:solidFill>
-                  <a:srgbClr val="FF0000"/>
-                </a:solidFill>
-              </a:rPr>
-              <a:t>Summary (</a:t>
-            </a:r>
-            <a:r>
-              <a:rPr lang="de-DE" err="1">
-                <a:solidFill>
-                  <a:srgbClr val="FF0000"/>
-                </a:solidFill>
-              </a:rPr>
-              <a:t>Seiar</a:t>
-            </a:r>
-            <a:r>
-              <a:rPr lang="de-DE" dirty="0">
-                <a:solidFill>
-                  <a:srgbClr val="FF0000"/>
-                </a:solidFill>
-              </a:rPr>
-              <a:t> )</a:t>
-            </a:r>
-          </a:p>
-        </p:txBody>
-      </p:sp>
-      <p:pic>
-        <p:nvPicPr>
-          <p:cNvPr id="12" name="Inhaltsplatzhalter 11" descr="Ein Bild, das Text, Screenshot, Diagramm, Reihe enthält.&#10;&#10;Beschreibung automatisch generiert.">
-            <a:extLst>
-              <a:ext uri="{FF2B5EF4-FFF2-40B4-BE49-F238E27FC236}">
-                <a16:creationId xmlns:a16="http://schemas.microsoft.com/office/drawing/2014/main" id="{6FC40EEA-592C-668A-0F4D-CC47AC3839DF}"/>
-              </a:ext>
-            </a:extLst>
-          </p:cNvPr>
-          <p:cNvPicPr>
-            <a:picLocks noGrp="1" noChangeAspect="1"/>
-          </p:cNvPicPr>
-          <p:nvPr>
-            <p:ph idx="1"/>
-          </p:nvPr>
-        </p:nvPicPr>
-        <p:blipFill>
-          <a:blip r:embed="rId2"/>
-          <a:stretch>
-            <a:fillRect/>
-          </a:stretch>
-        </p:blipFill>
-        <p:spPr>
-          <a:xfrm>
-            <a:off x="5221288" y="1595437"/>
-            <a:ext cx="6096000" cy="3657600"/>
-          </a:xfrm>
-        </p:spPr>
-      </p:pic>
-    </p:spTree>
-    <p:extLst>
-      <p:ext uri="{BB962C8B-B14F-4D97-AF65-F5344CB8AC3E}">
-        <p14:creationId xmlns:p14="http://schemas.microsoft.com/office/powerpoint/2010/main" val="233784213"/>
       </p:ext>
     </p:extLst>
   </p:cSld>

</xml_diff>

<commit_message>
Espacenet graph analysis, fixed search query in presentation
</commit_message>
<xml_diff>
--- a/presentation/DataDrivenForesight.pptx
+++ b/presentation/DataDrivenForesight.pptx
@@ -1093,7 +1093,7 @@
           <a:p>
             <a:fld id="{846CE7D5-CF57-46EF-B807-FDD0502418D4}" type="datetimeFigureOut">
               <a:rPr lang="en-GB" smtClean="0"/>
-              <a:t>09/01/2025</a:t>
+              <a:t>10/01/2025</a:t>
             </a:fld>
             <a:endParaRPr lang="en-GB"/>
           </a:p>
@@ -1261,7 +1261,7 @@
           <a:p>
             <a:fld id="{846CE7D5-CF57-46EF-B807-FDD0502418D4}" type="datetimeFigureOut">
               <a:rPr lang="en-GB" smtClean="0"/>
-              <a:t>09/01/2025</a:t>
+              <a:t>10/01/2025</a:t>
             </a:fld>
             <a:endParaRPr lang="en-GB"/>
           </a:p>
@@ -1439,7 +1439,7 @@
           <a:p>
             <a:fld id="{846CE7D5-CF57-46EF-B807-FDD0502418D4}" type="datetimeFigureOut">
               <a:rPr lang="en-GB" smtClean="0"/>
-              <a:t>09/01/2025</a:t>
+              <a:t>10/01/2025</a:t>
             </a:fld>
             <a:endParaRPr lang="en-GB"/>
           </a:p>
@@ -1607,7 +1607,7 @@
           <a:p>
             <a:fld id="{846CE7D5-CF57-46EF-B807-FDD0502418D4}" type="datetimeFigureOut">
               <a:rPr lang="en-GB" smtClean="0"/>
-              <a:t>09/01/2025</a:t>
+              <a:t>10/01/2025</a:t>
             </a:fld>
             <a:endParaRPr lang="en-GB"/>
           </a:p>
@@ -1852,7 +1852,7 @@
           <a:p>
             <a:fld id="{846CE7D5-CF57-46EF-B807-FDD0502418D4}" type="datetimeFigureOut">
               <a:rPr lang="en-GB" smtClean="0"/>
-              <a:t>09/01/2025</a:t>
+              <a:t>10/01/2025</a:t>
             </a:fld>
             <a:endParaRPr lang="en-GB"/>
           </a:p>
@@ -2081,7 +2081,7 @@
           <a:p>
             <a:fld id="{846CE7D5-CF57-46EF-B807-FDD0502418D4}" type="datetimeFigureOut">
               <a:rPr lang="en-GB" smtClean="0"/>
-              <a:t>09/01/2025</a:t>
+              <a:t>10/01/2025</a:t>
             </a:fld>
             <a:endParaRPr lang="en-GB"/>
           </a:p>
@@ -2445,7 +2445,7 @@
           <a:p>
             <a:fld id="{846CE7D5-CF57-46EF-B807-FDD0502418D4}" type="datetimeFigureOut">
               <a:rPr lang="en-GB" smtClean="0"/>
-              <a:t>09/01/2025</a:t>
+              <a:t>10/01/2025</a:t>
             </a:fld>
             <a:endParaRPr lang="en-GB"/>
           </a:p>
@@ -2562,7 +2562,7 @@
           <a:p>
             <a:fld id="{846CE7D5-CF57-46EF-B807-FDD0502418D4}" type="datetimeFigureOut">
               <a:rPr lang="en-GB" smtClean="0"/>
-              <a:t>09/01/2025</a:t>
+              <a:t>10/01/2025</a:t>
             </a:fld>
             <a:endParaRPr lang="en-GB"/>
           </a:p>
@@ -2657,7 +2657,7 @@
           <a:p>
             <a:fld id="{846CE7D5-CF57-46EF-B807-FDD0502418D4}" type="datetimeFigureOut">
               <a:rPr lang="en-GB" smtClean="0"/>
-              <a:t>09/01/2025</a:t>
+              <a:t>10/01/2025</a:t>
             </a:fld>
             <a:endParaRPr lang="en-GB"/>
           </a:p>
@@ -2932,7 +2932,7 @@
           <a:p>
             <a:fld id="{846CE7D5-CF57-46EF-B807-FDD0502418D4}" type="datetimeFigureOut">
               <a:rPr lang="en-GB" smtClean="0"/>
-              <a:t>09/01/2025</a:t>
+              <a:t>10/01/2025</a:t>
             </a:fld>
             <a:endParaRPr lang="en-GB"/>
           </a:p>
@@ -3187,7 +3187,7 @@
           <a:p>
             <a:fld id="{846CE7D5-CF57-46EF-B807-FDD0502418D4}" type="datetimeFigureOut">
               <a:rPr lang="en-GB" smtClean="0"/>
-              <a:t>09/01/2025</a:t>
+              <a:t>10/01/2025</a:t>
             </a:fld>
             <a:endParaRPr lang="en-GB"/>
           </a:p>
@@ -3398,7 +3398,7 @@
           <a:p>
             <a:fld id="{846CE7D5-CF57-46EF-B807-FDD0502418D4}" type="datetimeFigureOut">
               <a:rPr lang="en-GB" smtClean="0"/>
-              <a:t>09/01/2025</a:t>
+              <a:t>10/01/2025</a:t>
             </a:fld>
             <a:endParaRPr lang="en-GB"/>
           </a:p>
@@ -5506,10 +5506,43 @@
               <a:buChar char="•"/>
             </a:pPr>
             <a:r>
-              <a:rPr lang="en-US"/>
-              <a:t>Data before 2015 shown likely due to the earliest publication being before 2015, while current publication of the corresponding patent is from 2015 onward</a:t>
-            </a:r>
-            <a:endParaRPr lang="en-DE"/>
+              <a:rPr lang="en-US" dirty="0" err="1"/>
+              <a:t>Noticable</a:t>
+            </a:r>
+            <a:r>
+              <a:rPr lang="en-US" dirty="0"/>
+              <a:t> increase starting from 2005</a:t>
+            </a:r>
+          </a:p>
+          <a:p>
+            <a:pPr marL="285750" indent="-285750">
+              <a:buFont typeface="Arial" panose="020B0604020202020204" pitchFamily="34" charset="0"/>
+              <a:buChar char="•"/>
+            </a:pPr>
+            <a:r>
+              <a:rPr lang="en-US" dirty="0"/>
+              <a:t>Exponential growth from 2014 onward</a:t>
+            </a:r>
+          </a:p>
+          <a:p>
+            <a:pPr marL="285750" indent="-285750">
+              <a:buFont typeface="Arial" panose="020B0604020202020204" pitchFamily="34" charset="0"/>
+              <a:buChar char="•"/>
+            </a:pPr>
+            <a:r>
+              <a:rPr lang="en-US" dirty="0"/>
+              <a:t>Small drop in 2022 in an otherwise steep upward trajectory</a:t>
+            </a:r>
+            <a:br>
+              <a:rPr lang="en-US" dirty="0"/>
+            </a:br>
+            <a:r>
+              <a:rPr lang="en-US" dirty="0">
+                <a:sym typeface="Wingdings" panose="05000000000000000000" pitchFamily="2" charset="2"/>
+              </a:rPr>
+              <a:t> likely due to COVID-19</a:t>
+            </a:r>
+            <a:endParaRPr lang="en-DE" dirty="0"/>
           </a:p>
         </p:txBody>
       </p:sp>
@@ -5542,51 +5575,6 @@
           </a:xfrm>
         </p:spPr>
       </p:pic>
-      <p:sp>
-        <p:nvSpPr>
-          <p:cNvPr id="5" name="TextBox 4">
-            <a:extLst>
-              <a:ext uri="{FF2B5EF4-FFF2-40B4-BE49-F238E27FC236}">
-                <a16:creationId xmlns:a16="http://schemas.microsoft.com/office/drawing/2014/main" id="{9FE5F8D1-AC54-3C3F-FF5D-3996FB214FDD}"/>
-              </a:ext>
-            </a:extLst>
-          </p:cNvPr>
-          <p:cNvSpPr txBox="1"/>
-          <p:nvPr/>
-        </p:nvSpPr>
-        <p:spPr>
-          <a:xfrm>
-            <a:off x="202790" y="4021569"/>
-            <a:ext cx="5693272" cy="1015663"/>
-          </a:xfrm>
-          <a:prstGeom prst="rect">
-            <a:avLst/>
-          </a:prstGeom>
-          <a:solidFill>
-            <a:schemeClr val="bg1"/>
-          </a:solidFill>
-        </p:spPr>
-        <p:txBody>
-          <a:bodyPr rot="0" spcFirstLastPara="0" vertOverflow="overflow" horzOverflow="overflow" vert="horz" wrap="square" lIns="91440" tIns="45720" rIns="91440" bIns="45720" numCol="1" spcCol="0" rtlCol="0" fromWordArt="0" anchor="t" anchorCtr="0" forceAA="0" compatLnSpc="1">
-            <a:prstTxWarp prst="textNoShape">
-              <a:avLst/>
-            </a:prstTxWarp>
-            <a:spAutoFit/>
-          </a:bodyPr>
-          <a:lstStyle/>
-          <a:p>
-            <a:pPr algn="l"/>
-            <a:r>
-              <a:rPr lang="en-GB" sz="6000">
-                <a:solidFill>
-                  <a:srgbClr val="FF0000"/>
-                </a:solidFill>
-              </a:rPr>
-              <a:t>UPDATEN</a:t>
-            </a:r>
-          </a:p>
-        </p:txBody>
-      </p:sp>
     </p:spTree>
     <p:extLst>
       <p:ext uri="{BB962C8B-B14F-4D97-AF65-F5344CB8AC3E}">
@@ -5672,10 +5660,30 @@
               <a:buChar char="•"/>
             </a:pPr>
             <a:r>
-              <a:rPr lang="en-US"/>
-              <a:t>Data before 2015 shown likely due to the earliest publication being before 2015, while current publication of the corresponding patent is from 2015 onward</a:t>
-            </a:r>
-            <a:endParaRPr lang="en-DE"/>
+              <a:rPr lang="en-US" dirty="0"/>
+              <a:t>Starting from 2013 the number of publications dominate the number of patents significantly</a:t>
+            </a:r>
+          </a:p>
+          <a:p>
+            <a:pPr marL="285750" indent="-285750">
+              <a:buFont typeface="Arial" panose="020B0604020202020204" pitchFamily="34" charset="0"/>
+              <a:buChar char="•"/>
+            </a:pPr>
+            <a:r>
+              <a:rPr lang="en-US" dirty="0"/>
+              <a:t>Research largely unaffected by COVID</a:t>
+            </a:r>
+          </a:p>
+          <a:p>
+            <a:pPr marL="285750" indent="-285750">
+              <a:buFont typeface="Arial" panose="020B0604020202020204" pitchFamily="34" charset="0"/>
+              <a:buChar char="•"/>
+            </a:pPr>
+            <a:r>
+              <a:rPr lang="en-US" dirty="0"/>
+              <a:t>Number of patents is expected to follow the upward trajectory in the coming years</a:t>
+            </a:r>
+            <a:endParaRPr lang="en-DE" dirty="0"/>
           </a:p>
         </p:txBody>
       </p:sp>
@@ -5708,51 +5716,6 @@
           </a:xfrm>
         </p:spPr>
       </p:pic>
-      <p:sp>
-        <p:nvSpPr>
-          <p:cNvPr id="5" name="TextBox 4">
-            <a:extLst>
-              <a:ext uri="{FF2B5EF4-FFF2-40B4-BE49-F238E27FC236}">
-                <a16:creationId xmlns:a16="http://schemas.microsoft.com/office/drawing/2014/main" id="{37A8797B-7C54-DF99-34BB-B5AD38258131}"/>
-              </a:ext>
-            </a:extLst>
-          </p:cNvPr>
-          <p:cNvSpPr txBox="1"/>
-          <p:nvPr/>
-        </p:nvSpPr>
-        <p:spPr>
-          <a:xfrm>
-            <a:off x="2636274" y="3960118"/>
-            <a:ext cx="5693272" cy="1015663"/>
-          </a:xfrm>
-          <a:prstGeom prst="rect">
-            <a:avLst/>
-          </a:prstGeom>
-          <a:solidFill>
-            <a:schemeClr val="bg1"/>
-          </a:solidFill>
-        </p:spPr>
-        <p:txBody>
-          <a:bodyPr rot="0" spcFirstLastPara="0" vertOverflow="overflow" horzOverflow="overflow" vert="horz" wrap="square" lIns="91440" tIns="45720" rIns="91440" bIns="45720" numCol="1" spcCol="0" rtlCol="0" fromWordArt="0" anchor="t" anchorCtr="0" forceAA="0" compatLnSpc="1">
-            <a:prstTxWarp prst="textNoShape">
-              <a:avLst/>
-            </a:prstTxWarp>
-            <a:spAutoFit/>
-          </a:bodyPr>
-          <a:lstStyle/>
-          <a:p>
-            <a:pPr algn="l"/>
-            <a:r>
-              <a:rPr lang="en-GB" sz="6000">
-                <a:solidFill>
-                  <a:srgbClr val="FF0000"/>
-                </a:solidFill>
-              </a:rPr>
-              <a:t>UPDATEN</a:t>
-            </a:r>
-          </a:p>
-        </p:txBody>
-      </p:sp>
     </p:spTree>
     <p:extLst>
       <p:ext uri="{BB962C8B-B14F-4D97-AF65-F5344CB8AC3E}">
@@ -5843,7 +5806,7 @@
               <a:buNone/>
             </a:pPr>
             <a:r>
-              <a:rPr lang="en-GB" sz="1400">
+              <a:rPr lang="en-GB" sz="1400" dirty="0">
                 <a:latin typeface="Consolas"/>
                 <a:ea typeface="+mn-lt"/>
                 <a:cs typeface="+mn-lt"/>
@@ -5851,7 +5814,7 @@
               <a:t>  TS=("self heal*" </a:t>
             </a:r>
             <a:r>
-              <a:rPr lang="en-GB" sz="1400" b="1">
+              <a:rPr lang="en-GB" sz="1400" b="1" dirty="0">
                 <a:solidFill>
                   <a:srgbClr val="000080"/>
                 </a:solidFill>
@@ -5862,7 +5825,7 @@
               <a:t>OR</a:t>
             </a:r>
             <a:r>
-              <a:rPr lang="en-GB" sz="1400">
+              <a:rPr lang="en-GB" sz="1400" dirty="0">
                 <a:latin typeface="Consolas"/>
                 <a:ea typeface="+mn-lt"/>
                 <a:cs typeface="+mn-lt"/>
@@ -5870,7 +5833,7 @@
               <a:t> "self repair*" </a:t>
             </a:r>
             <a:r>
-              <a:rPr lang="en-GB" sz="1400" b="1">
+              <a:rPr lang="en-GB" sz="1400" b="1" dirty="0">
                 <a:solidFill>
                   <a:srgbClr val="000080"/>
                 </a:solidFill>
@@ -5881,7 +5844,7 @@
               <a:t>OR</a:t>
             </a:r>
             <a:r>
-              <a:rPr lang="en-GB" sz="1400">
+              <a:rPr lang="en-GB" sz="1400" dirty="0">
                 <a:latin typeface="Consolas"/>
                 <a:ea typeface="+mn-lt"/>
                 <a:cs typeface="+mn-lt"/>
@@ -5889,7 +5852,7 @@
               <a:t> "</a:t>
             </a:r>
             <a:r>
-              <a:rPr lang="en-GB" sz="1400" err="1">
+              <a:rPr lang="en-GB" sz="1400" dirty="0" err="1">
                 <a:latin typeface="Consolas"/>
                 <a:ea typeface="+mn-lt"/>
                 <a:cs typeface="+mn-lt"/>
@@ -5897,7 +5860,7 @@
               <a:t>autonom</a:t>
             </a:r>
             <a:r>
-              <a:rPr lang="en-GB" sz="1400">
+              <a:rPr lang="en-GB" sz="1400" dirty="0">
                 <a:latin typeface="Consolas"/>
                 <a:ea typeface="+mn-lt"/>
                 <a:cs typeface="+mn-lt"/>
@@ -5905,7 +5868,7 @@
               <a:t>* repair*" </a:t>
             </a:r>
             <a:r>
-              <a:rPr lang="en-GB" sz="1400" b="1">
+              <a:rPr lang="en-GB" sz="1400" b="1" dirty="0">
                 <a:solidFill>
                   <a:srgbClr val="000080"/>
                 </a:solidFill>
@@ -5916,7 +5879,7 @@
               <a:t>OR</a:t>
             </a:r>
             <a:r>
-              <a:rPr lang="en-GB" sz="1400">
+              <a:rPr lang="en-GB" sz="1400" dirty="0">
                 <a:latin typeface="Consolas"/>
                 <a:ea typeface="+mn-lt"/>
                 <a:cs typeface="+mn-lt"/>
@@ -5924,7 +5887,7 @@
               <a:t> "</a:t>
             </a:r>
             <a:r>
-              <a:rPr lang="en-GB" sz="1400" err="1">
+              <a:rPr lang="en-GB" sz="1400" dirty="0" err="1">
                 <a:latin typeface="Consolas"/>
                 <a:ea typeface="+mn-lt"/>
                 <a:cs typeface="+mn-lt"/>
@@ -5932,14 +5895,14 @@
               <a:t>autonom</a:t>
             </a:r>
             <a:r>
-              <a:rPr lang="en-GB" sz="1400">
+              <a:rPr lang="en-GB" sz="1400" dirty="0">
                 <a:latin typeface="Consolas"/>
                 <a:ea typeface="+mn-lt"/>
                 <a:cs typeface="+mn-lt"/>
               </a:rPr>
               <a:t>* heal*")</a:t>
             </a:r>
-            <a:endParaRPr lang="en-US" sz="1400">
+            <a:endParaRPr lang="en-US" sz="1400" dirty="0">
               <a:latin typeface="Consolas"/>
             </a:endParaRPr>
           </a:p>
@@ -5948,7 +5911,7 @@
               <a:buNone/>
             </a:pPr>
             <a:r>
-              <a:rPr lang="en-GB" sz="1400">
+              <a:rPr lang="en-GB" sz="1400" dirty="0">
                 <a:latin typeface="Consolas"/>
                 <a:ea typeface="+mn-lt"/>
                 <a:cs typeface="+mn-lt"/>
@@ -5956,7 +5919,7 @@
               <a:t>  </a:t>
             </a:r>
             <a:r>
-              <a:rPr lang="en-GB" sz="1400" b="1">
+              <a:rPr lang="en-GB" sz="1400" b="1" dirty="0">
                 <a:solidFill>
                   <a:srgbClr val="000080"/>
                 </a:solidFill>
@@ -5967,7 +5930,7 @@
               <a:t>AND</a:t>
             </a:r>
             <a:r>
-              <a:rPr lang="en-GB" sz="1400">
+              <a:rPr lang="en-GB" sz="1400" dirty="0">
                 <a:latin typeface="Consolas"/>
                 <a:ea typeface="+mn-lt"/>
                 <a:cs typeface="+mn-lt"/>
@@ -5975,7 +5938,7 @@
               <a:t> TS=("material*" </a:t>
             </a:r>
             <a:r>
-              <a:rPr lang="en-GB" sz="1400" b="1">
+              <a:rPr lang="en-GB" sz="1400" b="1" dirty="0">
                 <a:solidFill>
                   <a:srgbClr val="000080"/>
                 </a:solidFill>
@@ -5986,7 +5949,7 @@
               <a:t>OR</a:t>
             </a:r>
             <a:r>
-              <a:rPr lang="en-GB" sz="1400">
+              <a:rPr lang="en-GB" sz="1400" dirty="0">
                 <a:latin typeface="Consolas"/>
                 <a:ea typeface="+mn-lt"/>
                 <a:cs typeface="+mn-lt"/>
@@ -5994,7 +5957,7 @@
               <a:t> "polymer*" </a:t>
             </a:r>
             <a:r>
-              <a:rPr lang="en-GB" sz="1400" b="1">
+              <a:rPr lang="en-GB" sz="1400" b="1" dirty="0">
                 <a:solidFill>
                   <a:srgbClr val="000080"/>
                 </a:solidFill>
@@ -6005,7 +5968,7 @@
               <a:t>OR</a:t>
             </a:r>
             <a:r>
-              <a:rPr lang="en-GB" sz="1400">
+              <a:rPr lang="en-GB" sz="1400" dirty="0">
                 <a:latin typeface="Consolas"/>
                 <a:ea typeface="+mn-lt"/>
                 <a:cs typeface="+mn-lt"/>
@@ -6013,7 +5976,7 @@
               <a:t> "composite*" </a:t>
             </a:r>
             <a:r>
-              <a:rPr lang="en-GB" sz="1400" b="1">
+              <a:rPr lang="en-GB" sz="1400" b="1" dirty="0">
                 <a:solidFill>
                   <a:srgbClr val="000080"/>
                 </a:solidFill>
@@ -6024,7 +5987,7 @@
               <a:t>OR</a:t>
             </a:r>
             <a:r>
-              <a:rPr lang="en-GB" sz="1400">
+              <a:rPr lang="en-GB" sz="1400" dirty="0">
                 <a:latin typeface="Consolas"/>
                 <a:ea typeface="+mn-lt"/>
                 <a:cs typeface="+mn-lt"/>
@@ -6032,7 +5995,7 @@
               <a:t> "ceramic*" </a:t>
             </a:r>
             <a:r>
-              <a:rPr lang="en-GB" sz="1400" b="1">
+              <a:rPr lang="en-GB" sz="1400" b="1" dirty="0">
                 <a:solidFill>
                   <a:srgbClr val="000080"/>
                 </a:solidFill>
@@ -6043,7 +6006,7 @@
               <a:t>OR</a:t>
             </a:r>
             <a:r>
-              <a:rPr lang="en-GB" sz="1400">
+              <a:rPr lang="en-GB" sz="1400" dirty="0">
                 <a:latin typeface="Consolas"/>
                 <a:ea typeface="+mn-lt"/>
                 <a:cs typeface="+mn-lt"/>
@@ -6051,7 +6014,7 @@
               <a:t> "metal*" </a:t>
             </a:r>
             <a:r>
-              <a:rPr lang="en-GB" sz="1400" b="1">
+              <a:rPr lang="en-GB" sz="1400" b="1" dirty="0">
                 <a:solidFill>
                   <a:srgbClr val="000080"/>
                 </a:solidFill>
@@ -6062,7 +6025,7 @@
               <a:t>OR</a:t>
             </a:r>
             <a:r>
-              <a:rPr lang="en-GB" sz="1400">
+              <a:rPr lang="en-GB" sz="1400" dirty="0">
                 <a:latin typeface="Consolas"/>
                 <a:ea typeface="+mn-lt"/>
                 <a:cs typeface="+mn-lt"/>
@@ -6070,7 +6033,7 @@
               <a:t>  "alloy*" </a:t>
             </a:r>
             <a:r>
-              <a:rPr lang="en-GB" sz="1400" b="1">
+              <a:rPr lang="en-GB" sz="1400" b="1" dirty="0">
                 <a:solidFill>
                   <a:srgbClr val="000080"/>
                 </a:solidFill>
@@ -6081,7 +6044,7 @@
               <a:t>OR</a:t>
             </a:r>
             <a:r>
-              <a:rPr lang="en-GB" sz="1400">
+              <a:rPr lang="en-GB" sz="1400" dirty="0">
                 <a:latin typeface="Consolas"/>
                 <a:ea typeface="+mn-lt"/>
                 <a:cs typeface="+mn-lt"/>
@@ -6089,7 +6052,7 @@
               <a:t> "cement*" </a:t>
             </a:r>
             <a:r>
-              <a:rPr lang="en-GB" sz="1400">
+              <a:rPr lang="en-GB" sz="1400" dirty="0">
                 <a:solidFill>
                   <a:srgbClr val="000000"/>
                 </a:solidFill>
@@ -6100,7 +6063,7 @@
               <a:t>    </a:t>
             </a:r>
             <a:r>
-              <a:rPr lang="en-GB" sz="1400" b="1">
+              <a:rPr lang="en-GB" sz="1400" b="1" dirty="0">
                 <a:solidFill>
                   <a:srgbClr val="000080"/>
                 </a:solidFill>
@@ -6111,7 +6074,7 @@
               <a:t>  OR</a:t>
             </a:r>
             <a:r>
-              <a:rPr lang="en-GB" sz="1400">
+              <a:rPr lang="en-GB" sz="1400" dirty="0">
                 <a:latin typeface="Consolas"/>
                 <a:ea typeface="+mn-lt"/>
                 <a:cs typeface="+mn-lt"/>
@@ -6124,7 +6087,7 @@
               <a:buNone/>
             </a:pPr>
             <a:r>
-              <a:rPr lang="en-GB" sz="1400" b="1">
+              <a:rPr lang="en-GB" sz="1400" b="1" dirty="0">
                 <a:solidFill>
                   <a:srgbClr val="000080"/>
                 </a:solidFill>
@@ -6135,7 +6098,7 @@
               <a:t>  NOT</a:t>
             </a:r>
             <a:r>
-              <a:rPr lang="en-GB" sz="1400">
+              <a:rPr lang="en-GB" sz="1400" dirty="0">
                 <a:latin typeface="Consolas"/>
                 <a:ea typeface="+mn-lt"/>
                 <a:cs typeface="+mn-lt"/>
@@ -6143,7 +6106,7 @@
               <a:t> TS=("biology"</a:t>
             </a:r>
             <a:r>
-              <a:rPr lang="en-GB" sz="1400">
+              <a:rPr lang="en-GB" sz="1400" dirty="0">
                 <a:solidFill>
                   <a:srgbClr val="000000"/>
                 </a:solidFill>
@@ -6154,7 +6117,7 @@
               <a:t> </a:t>
             </a:r>
             <a:r>
-              <a:rPr lang="en-GB" sz="1400" b="1">
+              <a:rPr lang="en-GB" sz="1400" b="1" dirty="0">
                 <a:solidFill>
                   <a:srgbClr val="000080"/>
                 </a:solidFill>
@@ -6165,7 +6128,7 @@
               <a:t>OR</a:t>
             </a:r>
             <a:r>
-              <a:rPr lang="en-GB" sz="1400">
+              <a:rPr lang="en-GB" sz="1400" dirty="0">
                 <a:latin typeface="Consolas"/>
                 <a:ea typeface="+mn-lt"/>
                 <a:cs typeface="+mn-lt"/>
@@ -6173,7 +6136,7 @@
               <a:t> "biological system*" </a:t>
             </a:r>
             <a:r>
-              <a:rPr lang="en-GB" sz="1400" b="1">
+              <a:rPr lang="en-GB" sz="1400" b="1" dirty="0">
                 <a:solidFill>
                   <a:srgbClr val="000080"/>
                 </a:solidFill>
@@ -6184,64 +6147,64 @@
               <a:t>OR</a:t>
             </a:r>
             <a:r>
-              <a:rPr lang="en-GB" sz="1400">
+              <a:rPr lang="en-GB" sz="1400" dirty="0">
                 <a:latin typeface="Consolas"/>
                 <a:ea typeface="+mn-lt"/>
                 <a:cs typeface="+mn-lt"/>
               </a:rPr>
-              <a:t> "hydrogel*" </a:t>
-            </a:r>
-            <a:r>
-              <a:rPr lang="en-GB" sz="1400" b="1">
-                <a:solidFill>
-                  <a:srgbClr val="000080"/>
+              <a:t> "organic material*"</a:t>
+            </a:r>
+            <a:r>
+              <a:rPr lang="en-GB" sz="1400" dirty="0">
+                <a:solidFill>
+                  <a:srgbClr val="000000"/>
                 </a:solidFill>
                 <a:latin typeface="Consolas"/>
                 <a:ea typeface="+mn-lt"/>
                 <a:cs typeface="+mn-lt"/>
               </a:rPr>
-              <a:t>OR</a:t>
-            </a:r>
-            <a:r>
-              <a:rPr lang="en-GB" sz="1400">
+              <a:t> </a:t>
+            </a:r>
+            <a:r>
+              <a:rPr lang="en-GB" sz="1400" b="1" dirty="0">
+                <a:solidFill>
+                  <a:srgbClr val="000080"/>
+                </a:solidFill>
                 <a:latin typeface="Consolas"/>
                 <a:ea typeface="+mn-lt"/>
                 <a:cs typeface="+mn-lt"/>
               </a:rPr>
-              <a:t> "gel*" </a:t>
-            </a:r>
-            <a:r>
-              <a:rPr lang="en-GB" sz="1400" b="1">
-                <a:solidFill>
-                  <a:srgbClr val="000080"/>
-                </a:solidFill>
+              <a:t>OR</a:t>
+            </a:r>
+            <a:r>
+              <a:rPr lang="en-GB" sz="1400" dirty="0">
                 <a:latin typeface="Consolas"/>
                 <a:ea typeface="+mn-lt"/>
                 <a:cs typeface="+mn-lt"/>
               </a:rPr>
-              <a:t>OR</a:t>
-            </a:r>
-            <a:r>
-              <a:rPr lang="en-GB" sz="1400">
+              <a:t> "wound     heal*" </a:t>
+            </a:r>
+            <a:r>
+              <a:rPr lang="en-GB" sz="1400" b="1" dirty="0">
+                <a:solidFill>
+                  <a:srgbClr val="000080"/>
+                </a:solidFill>
                 <a:latin typeface="Consolas"/>
                 <a:ea typeface="+mn-lt"/>
                 <a:cs typeface="+mn-lt"/>
               </a:rPr>
-              <a:t> "organic material*"</a:t>
-            </a:r>
-            <a:r>
-              <a:rPr lang="en-GB" sz="1400">
-                <a:solidFill>
-                  <a:srgbClr val="000000"/>
-                </a:solidFill>
+              <a:t>OR </a:t>
+            </a:r>
+            <a:r>
+              <a:rPr lang="en-GB" sz="1400" dirty="0">
                 <a:latin typeface="Consolas"/>
                 <a:ea typeface="+mn-lt"/>
                 <a:cs typeface="+mn-lt"/>
               </a:rPr>
-              <a:t> </a:t>
-            </a:r>
-            <a:r>
-              <a:rPr lang="en-GB" sz="1400" b="1">
+              <a:t>"medic*" </a:t>
+            </a:r>
+            <a:r>
+              <a:rPr lang="en-GB" sz="1400" b="1" dirty="0">
                 <a:solidFill>
                   <a:srgbClr val="000080"/>
                 </a:solidFill>
@@ -6252,15 +6215,15 @@
               <a:t>OR</a:t>
             </a:r>
             <a:r>
-              <a:rPr lang="en-GB" sz="1400">
+              <a:rPr lang="en-GB" sz="1400" dirty="0">
                 <a:latin typeface="Consolas"/>
                 <a:ea typeface="+mn-lt"/>
                 <a:cs typeface="+mn-lt"/>
               </a:rPr>
-              <a:t> "wound     heal*" </a:t>
-            </a:r>
-            <a:r>
-              <a:rPr lang="en-GB" sz="1400" b="1">
+              <a:t> "healthcare" </a:t>
+            </a:r>
+            <a:r>
+              <a:rPr lang="en-GB" sz="1400" b="1" dirty="0">
                 <a:solidFill>
                   <a:srgbClr val="000080"/>
                 </a:solidFill>
@@ -6268,55 +6231,17 @@
                 <a:ea typeface="+mn-lt"/>
                 <a:cs typeface="+mn-lt"/>
               </a:rPr>
-              <a:t>OR </a:t>
-            </a:r>
-            <a:r>
-              <a:rPr lang="en-GB" sz="1400">
+              <a:t>OR</a:t>
+            </a:r>
+            <a:r>
+              <a:rPr lang="en-GB" sz="1400" dirty="0">
                 <a:latin typeface="Consolas"/>
                 <a:ea typeface="+mn-lt"/>
                 <a:cs typeface="+mn-lt"/>
               </a:rPr>
-              <a:t>"medic*" </a:t>
-            </a:r>
-            <a:r>
-              <a:rPr lang="en-GB" sz="1400" b="1">
-                <a:solidFill>
-                  <a:srgbClr val="000080"/>
-                </a:solidFill>
-                <a:latin typeface="Consolas"/>
-                <a:ea typeface="+mn-lt"/>
-                <a:cs typeface="+mn-lt"/>
-              </a:rPr>
-              <a:t>OR</a:t>
-            </a:r>
-            <a:r>
-              <a:rPr lang="en-GB" sz="1400">
-                <a:latin typeface="Consolas"/>
-                <a:ea typeface="+mn-lt"/>
-                <a:cs typeface="+mn-lt"/>
-              </a:rPr>
-              <a:t> "healthcare" </a:t>
-            </a:r>
-            <a:r>
-              <a:rPr lang="en-GB" sz="1400" b="1">
-                <a:solidFill>
-                  <a:srgbClr val="000080"/>
-                </a:solidFill>
-                <a:latin typeface="Consolas"/>
-                <a:ea typeface="+mn-lt"/>
-                <a:cs typeface="+mn-lt"/>
-              </a:rPr>
-              <a:t>OR</a:t>
-            </a:r>
-            <a:r>
-              <a:rPr lang="en-GB" sz="1400">
-                <a:latin typeface="Consolas"/>
-                <a:ea typeface="+mn-lt"/>
-                <a:cs typeface="+mn-lt"/>
-              </a:rPr>
               <a:t> "spirit*")  </a:t>
             </a:r>
-            <a:endParaRPr lang="en-GB" sz="1400">
+            <a:endParaRPr lang="en-GB" sz="1400" dirty="0">
               <a:solidFill>
                 <a:srgbClr val="000000"/>
               </a:solidFill>
@@ -6324,55 +6249,6 @@
               <a:ea typeface="+mn-lt"/>
               <a:cs typeface="+mn-lt"/>
             </a:endParaRPr>
-          </a:p>
-          <a:p>
-            <a:pPr marL="0" indent="0">
-              <a:buNone/>
-            </a:pPr>
-            <a:r>
-              <a:rPr lang="en-GB" sz="1400" b="1">
-                <a:solidFill>
-                  <a:srgbClr val="000080"/>
-                </a:solidFill>
-                <a:latin typeface="Consolas"/>
-                <a:ea typeface="+mn-lt"/>
-                <a:cs typeface="+mn-lt"/>
-              </a:rPr>
-              <a:t>  AND</a:t>
-            </a:r>
-            <a:r>
-              <a:rPr lang="en-GB" sz="1400">
-                <a:latin typeface="Consolas"/>
-                <a:ea typeface="+mn-lt"/>
-                <a:cs typeface="+mn-lt"/>
-              </a:rPr>
-              <a:t> PY=(</a:t>
-            </a:r>
-            <a:r>
-              <a:rPr lang="en-GB" sz="1400">
-                <a:solidFill>
-                  <a:srgbClr val="0000FF"/>
-                </a:solidFill>
-                <a:latin typeface="Consolas"/>
-                <a:ea typeface="+mn-lt"/>
-                <a:cs typeface="+mn-lt"/>
-              </a:rPr>
-              <a:t>2015-2025</a:t>
-            </a:r>
-            <a:r>
-              <a:rPr lang="en-GB" sz="1400">
-                <a:latin typeface="Consolas"/>
-                <a:ea typeface="+mn-lt"/>
-                <a:cs typeface="+mn-lt"/>
-              </a:rPr>
-              <a:t>)</a:t>
-            </a:r>
-            <a:endParaRPr lang="en-GB" sz="1400">
-              <a:latin typeface="Consolas"/>
-            </a:endParaRPr>
-          </a:p>
-          <a:p>
-            <a:endParaRPr lang="en-GB"/>
           </a:p>
         </p:txBody>
       </p:sp>
@@ -6391,7 +6267,7 @@
           <p:nvPr>
             <p:extLst>
               <p:ext uri="{D42A27DB-BD31-4B8C-83A1-F6EECF244321}">
-                <p14:modId xmlns:p14="http://schemas.microsoft.com/office/powerpoint/2010/main" val="4036500019"/>
+                <p14:modId xmlns:p14="http://schemas.microsoft.com/office/powerpoint/2010/main" val="1733330817"/>
               </p:ext>
             </p:extLst>
           </p:nvPr>
@@ -6613,20 +6489,8 @@
                     <a:lstStyle/>
                     <a:p>
                       <a:r>
-                        <a:rPr lang="de-DE" sz="1400" err="1"/>
-                        <a:t>Autonomous</a:t>
-                      </a:r>
-                      <a:r>
-                        <a:rPr lang="de-DE" sz="1400"/>
-                        <a:t> </a:t>
-                      </a:r>
-                      <a:r>
-                        <a:rPr lang="de-DE" sz="1400" err="1"/>
-                        <a:t>repair</a:t>
-                      </a:r>
-                      <a:r>
-                        <a:rPr lang="de-DE" sz="1400"/>
-                        <a:t>*</a:t>
+                        <a:rPr lang="de-DE" sz="1400" dirty="0"/>
+                        <a:t>Autonom* repair*</a:t>
                       </a:r>
                     </a:p>
                   </a:txBody>
@@ -6671,8 +6535,8 @@
                     <a:lstStyle/>
                     <a:p>
                       <a:r>
-                        <a:rPr lang="de-DE" sz="1400"/>
-                        <a:t>Hydrogel*</a:t>
+                        <a:rPr lang="de-DE" sz="1400" dirty="0"/>
+                        <a:t>Organic material*</a:t>
                       </a:r>
                     </a:p>
                   </a:txBody>
@@ -6691,20 +6555,8 @@
                     <a:lstStyle/>
                     <a:p>
                       <a:r>
-                        <a:rPr lang="de-DE" sz="1400" err="1"/>
-                        <a:t>Autonomous</a:t>
-                      </a:r>
-                      <a:r>
-                        <a:rPr lang="de-DE" sz="1400"/>
-                        <a:t> </a:t>
-                      </a:r>
-                      <a:r>
-                        <a:rPr lang="de-DE" sz="1400" err="1"/>
-                        <a:t>heal</a:t>
-                      </a:r>
-                      <a:r>
-                        <a:rPr lang="de-DE" sz="1400"/>
-                        <a:t>*</a:t>
+                        <a:rPr lang="de-DE" sz="1400" dirty="0"/>
+                        <a:t>Autonom* heal*</a:t>
                       </a:r>
                     </a:p>
                   </a:txBody>
@@ -6753,8 +6605,20 @@
                     <a:lstStyle/>
                     <a:p>
                       <a:r>
+                        <a:rPr lang="de-DE" sz="1400" err="1"/>
+                        <a:t>Wound</a:t>
+                      </a:r>
+                      <a:r>
                         <a:rPr lang="de-DE" sz="1400"/>
-                        <a:t>Gel*</a:t>
+                        <a:t> </a:t>
+                      </a:r>
+                      <a:r>
+                        <a:rPr lang="de-DE" sz="1400" err="1"/>
+                        <a:t>heal</a:t>
+                      </a:r>
+                      <a:r>
+                        <a:rPr lang="de-DE" sz="1400"/>
+                        <a:t>*</a:t>
                       </a:r>
                     </a:p>
                   </a:txBody>
@@ -6820,12 +6684,8 @@
                     <a:lstStyle/>
                     <a:p>
                       <a:r>
-                        <a:rPr lang="de-DE" sz="1400" err="1"/>
-                        <a:t>Organic</a:t>
-                      </a:r>
-                      <a:r>
-                        <a:rPr lang="de-DE" sz="1400"/>
-                        <a:t> material*</a:t>
+                        <a:rPr lang="de-DE" sz="1400" dirty="0"/>
+                        <a:t>Medic*</a:t>
                       </a:r>
                     </a:p>
                   </a:txBody>
@@ -6891,20 +6751,8 @@
                     <a:lstStyle/>
                     <a:p>
                       <a:r>
-                        <a:rPr lang="de-DE" sz="1400" err="1"/>
-                        <a:t>Wound</a:t>
-                      </a:r>
-                      <a:r>
-                        <a:rPr lang="de-DE" sz="1400"/>
-                        <a:t> </a:t>
-                      </a:r>
-                      <a:r>
-                        <a:rPr lang="de-DE" sz="1400" err="1"/>
-                        <a:t>heal</a:t>
-                      </a:r>
-                      <a:r>
-                        <a:rPr lang="de-DE" sz="1400"/>
-                        <a:t>*</a:t>
+                        <a:rPr lang="de-DE" sz="1400" dirty="0"/>
+                        <a:t>Healthcare</a:t>
                       </a:r>
                     </a:p>
                   </a:txBody>
@@ -6970,8 +6818,8 @@
                     <a:lstStyle/>
                     <a:p>
                       <a:r>
-                        <a:rPr lang="de-DE" sz="1400"/>
-                        <a:t>Medic*</a:t>
+                        <a:rPr lang="de-DE" sz="1400" dirty="0"/>
+                        <a:t>Spirit*</a:t>
                       </a:r>
                     </a:p>
                   </a:txBody>
@@ -7010,12 +6858,8 @@
                     <a:lstStyle/>
                     <a:p>
                       <a:r>
-                        <a:rPr lang="de-DE" sz="1400" err="1"/>
-                        <a:t>Concrete</a:t>
-                      </a:r>
-                      <a:r>
-                        <a:rPr lang="de-DE" sz="1400"/>
-                        <a:t>*</a:t>
+                        <a:rPr lang="de-DE" sz="1400" dirty="0"/>
+                        <a:t>Concrete*</a:t>
                       </a:r>
                     </a:p>
                   </a:txBody>
@@ -7036,11 +6880,7 @@
                     <a:bodyPr/>
                     <a:lstStyle/>
                     <a:p>
-                      <a:r>
-                        <a:rPr lang="de-DE" sz="1400" err="1"/>
-                        <a:t>Healthcare</a:t>
-                      </a:r>
-                      <a:endParaRPr lang="de-DE" sz="1400"/>
+                      <a:endParaRPr lang="de-DE" sz="1400" dirty="0"/>
                     </a:p>
                   </a:txBody>
                   <a:tcPr marL="90000"/>
@@ -7077,7 +6917,7 @@
                     <a:bodyPr/>
                     <a:lstStyle/>
                     <a:p>
-                      <a:endParaRPr lang="de-DE" sz="1400"/>
+                      <a:endParaRPr lang="de-DE" sz="1400" dirty="0"/>
                     </a:p>
                   </a:txBody>
                   <a:tcPr marL="90000"/>
@@ -7097,10 +6937,7 @@
                     <a:bodyPr/>
                     <a:lstStyle/>
                     <a:p>
-                      <a:r>
-                        <a:rPr lang="de-DE" sz="1400"/>
-                        <a:t>Spirit*</a:t>
-                      </a:r>
+                      <a:endParaRPr lang="de-DE" sz="1400" dirty="0"/>
                     </a:p>
                   </a:txBody>
                   <a:tcPr marL="90000"/>
@@ -7231,51 +7068,6 @@
           </p:txBody>
         </p:sp>
       </p:grpSp>
-      <p:sp>
-        <p:nvSpPr>
-          <p:cNvPr id="6" name="TextBox 5">
-            <a:extLst>
-              <a:ext uri="{FF2B5EF4-FFF2-40B4-BE49-F238E27FC236}">
-                <a16:creationId xmlns:a16="http://schemas.microsoft.com/office/drawing/2014/main" id="{8DBD5D5B-06F5-213F-4F9C-2CD752AA9F26}"/>
-              </a:ext>
-            </a:extLst>
-          </p:cNvPr>
-          <p:cNvSpPr txBox="1"/>
-          <p:nvPr/>
-        </p:nvSpPr>
-        <p:spPr>
-          <a:xfrm>
-            <a:off x="3170903" y="2411537"/>
-            <a:ext cx="5693272" cy="1015663"/>
-          </a:xfrm>
-          <a:prstGeom prst="rect">
-            <a:avLst/>
-          </a:prstGeom>
-          <a:solidFill>
-            <a:schemeClr val="bg1"/>
-          </a:solidFill>
-        </p:spPr>
-        <p:txBody>
-          <a:bodyPr rot="0" spcFirstLastPara="0" vertOverflow="overflow" horzOverflow="overflow" vert="horz" wrap="square" lIns="91440" tIns="45720" rIns="91440" bIns="45720" numCol="1" spcCol="0" rtlCol="0" fromWordArt="0" anchor="t" anchorCtr="0" forceAA="0" compatLnSpc="1">
-            <a:prstTxWarp prst="textNoShape">
-              <a:avLst/>
-            </a:prstTxWarp>
-            <a:spAutoFit/>
-          </a:bodyPr>
-          <a:lstStyle/>
-          <a:p>
-            <a:pPr algn="l"/>
-            <a:r>
-              <a:rPr lang="en-GB" sz="6000">
-                <a:solidFill>
-                  <a:srgbClr val="FF0000"/>
-                </a:solidFill>
-              </a:rPr>
-              <a:t>UPDATEN</a:t>
-            </a:r>
-          </a:p>
-        </p:txBody>
-      </p:sp>
     </p:spTree>
     <p:extLst>
       <p:ext uri="{BB962C8B-B14F-4D97-AF65-F5344CB8AC3E}">

</xml_diff>

<commit_message>
presentation fix, deleted old graphs
</commit_message>
<xml_diff>
--- a/presentation/DataDrivenForesight.pptx
+++ b/presentation/DataDrivenForesight.pptx
@@ -139,7 +139,7 @@
 <p1510:revInfo xmlns:a="http://schemas.openxmlformats.org/drawingml/2006/main" xmlns:r="http://schemas.openxmlformats.org/officeDocument/2006/relationships" xmlns:p1510="http://schemas.microsoft.com/office/powerpoint/2015/10/main">
   <p1510:revLst>
     <p1510:client id="{1C05B34B-6E39-6232-9EF4-3C5D0C2E088E}" v="947" dt="2025-01-12T21:34:39.105"/>
-    <p1510:client id="{8CDA426B-F6BE-03CE-D3BE-0C608CE54C7C}" v="12" dt="2025-01-11T10:39:06.523"/>
+    <p1510:client id="{33B2A1B0-75D2-FF34-777C-60E0FA8D1AB7}" v="52" dt="2025-01-13T19:04:36.950"/>
     <p1510:client id="{90A3C9C0-2634-4210-09F6-2A76E971AA20}" v="3" dt="2025-01-13T09:42:07.459"/>
   </p1510:revLst>
 </p1510:revInfo>
@@ -5333,12 +5333,69 @@
           <a:chExt cx="0" cy="0"/>
         </a:xfrm>
       </p:grpSpPr>
+      <p:sp>
+        <p:nvSpPr>
+          <p:cNvPr id="2" name="Fußzeilenplatzhalter 1">
+            <a:extLst>
+              <a:ext uri="{FF2B5EF4-FFF2-40B4-BE49-F238E27FC236}">
+                <a16:creationId xmlns:a16="http://schemas.microsoft.com/office/drawing/2014/main" id="{3831953B-1458-E626-C916-46717E29E13E}"/>
+              </a:ext>
+            </a:extLst>
+          </p:cNvPr>
+          <p:cNvSpPr>
+            <a:spLocks noGrp="1"/>
+          </p:cNvSpPr>
+          <p:nvPr>
+            <p:ph type="ftr" sz="quarter" idx="11"/>
+          </p:nvPr>
+        </p:nvSpPr>
+        <p:spPr/>
+        <p:txBody>
+          <a:bodyPr/>
+          <a:lstStyle/>
+          <a:p>
+            <a:r>
+              <a:rPr lang="de-DE"/>
+              <a:t>RWTH Aachen | Seminar Data Driven Foresight | 13.01.2025</a:t>
+            </a:r>
+          </a:p>
+        </p:txBody>
+      </p:sp>
+      <p:sp>
+        <p:nvSpPr>
+          <p:cNvPr id="3" name="Foliennummernplatzhalter 2">
+            <a:extLst>
+              <a:ext uri="{FF2B5EF4-FFF2-40B4-BE49-F238E27FC236}">
+                <a16:creationId xmlns:a16="http://schemas.microsoft.com/office/drawing/2014/main" id="{756087FE-A492-F6B7-2889-8E9C1FA1FB92}"/>
+              </a:ext>
+            </a:extLst>
+          </p:cNvPr>
+          <p:cNvSpPr>
+            <a:spLocks noGrp="1"/>
+          </p:cNvSpPr>
+          <p:nvPr>
+            <p:ph type="sldNum" sz="quarter" idx="12"/>
+          </p:nvPr>
+        </p:nvSpPr>
+        <p:spPr/>
+        <p:txBody>
+          <a:bodyPr/>
+          <a:lstStyle/>
+          <a:p>
+            <a:fld id="{330EA680-D336-4FF7-8B7A-9848BB0A1C32}" type="slidenum">
+              <a:rPr lang="en-GB" smtClean="0"/>
+              <a:t>10</a:t>
+            </a:fld>
+            <a:endParaRPr lang="de-DE"/>
+          </a:p>
+        </p:txBody>
+      </p:sp>
       <p:pic>
         <p:nvPicPr>
-          <p:cNvPr id="8" name="Picture 7" descr="A graph with green and white bars&#10;&#10;Description automatically generated">
+          <p:cNvPr id="4" name="Picture 3" descr="A graph of a number of publications&#10;&#10;Description automatically generated">
             <a:extLst>
               <a:ext uri="{FF2B5EF4-FFF2-40B4-BE49-F238E27FC236}">
-                <a16:creationId xmlns:a16="http://schemas.microsoft.com/office/drawing/2014/main" id="{2044E551-2EF2-4CA6-A5F0-BA1FACBECEED}"/>
+                <a16:creationId xmlns:a16="http://schemas.microsoft.com/office/drawing/2014/main" id="{46557523-78FA-BA5F-690C-D41FDBE9C4C7}"/>
               </a:ext>
             </a:extLst>
           </p:cNvPr>
@@ -5355,8 +5412,8 @@
         </p:blipFill>
         <p:spPr>
           <a:xfrm>
-            <a:off x="915628" y="232666"/>
-            <a:ext cx="5088193" cy="2986550"/>
+            <a:off x="839225" y="217478"/>
+            <a:ext cx="4902534" cy="2908092"/>
           </a:xfrm>
           <a:prstGeom prst="rect">
             <a:avLst/>
@@ -5365,10 +5422,10 @@
       </p:pic>
       <p:pic>
         <p:nvPicPr>
-          <p:cNvPr id="9" name="Picture 8" descr="A graph with red squares&#10;&#10;Description automatically generated">
+          <p:cNvPr id="5" name="Picture 4" descr="A graph of a number of publications&#10;&#10;Description automatically generated">
             <a:extLst>
               <a:ext uri="{FF2B5EF4-FFF2-40B4-BE49-F238E27FC236}">
-                <a16:creationId xmlns:a16="http://schemas.microsoft.com/office/drawing/2014/main" id="{02B295B9-D327-23CE-A83A-8F1CB774B947}"/>
+                <a16:creationId xmlns:a16="http://schemas.microsoft.com/office/drawing/2014/main" id="{CA1EABBB-D69E-6296-941A-72DAB41533AB}"/>
               </a:ext>
             </a:extLst>
           </p:cNvPr>
@@ -5385,8 +5442,8 @@
         </p:blipFill>
         <p:spPr>
           <a:xfrm>
-            <a:off x="6083710" y="232668"/>
-            <a:ext cx="5088194" cy="2986548"/>
+            <a:off x="6304537" y="191596"/>
+            <a:ext cx="4903033" cy="2908093"/>
           </a:xfrm>
           <a:prstGeom prst="rect">
             <a:avLst/>
@@ -5395,10 +5452,10 @@
       </p:pic>
       <p:pic>
         <p:nvPicPr>
-          <p:cNvPr id="10" name="Picture 9" descr="A graph with numbers and lines&#10;&#10;Description automatically generated">
+          <p:cNvPr id="6" name="Picture 5" descr="A graph with numbers and letters&#10;&#10;Description automatically generated">
             <a:extLst>
               <a:ext uri="{FF2B5EF4-FFF2-40B4-BE49-F238E27FC236}">
-                <a16:creationId xmlns:a16="http://schemas.microsoft.com/office/drawing/2014/main" id="{A7695196-A241-2859-8B85-77C1B07A4EE8}"/>
+                <a16:creationId xmlns:a16="http://schemas.microsoft.com/office/drawing/2014/main" id="{04E0245D-3C12-A1D0-0F8E-3A69CD01FE9A}"/>
               </a:ext>
             </a:extLst>
           </p:cNvPr>
@@ -5415,8 +5472,8 @@
         </p:blipFill>
         <p:spPr>
           <a:xfrm>
-            <a:off x="915629" y="3280667"/>
-            <a:ext cx="5088195" cy="3066434"/>
+            <a:off x="837692" y="3378425"/>
+            <a:ext cx="4903033" cy="2901847"/>
           </a:xfrm>
           <a:prstGeom prst="rect">
             <a:avLst/>
@@ -5425,10 +5482,10 @@
       </p:pic>
       <p:pic>
         <p:nvPicPr>
-          <p:cNvPr id="13" name="Picture 12" descr="A graph of a number of publications&#10;&#10;Description automatically generated">
+          <p:cNvPr id="7" name="Picture 6">
             <a:extLst>
               <a:ext uri="{FF2B5EF4-FFF2-40B4-BE49-F238E27FC236}">
-                <a16:creationId xmlns:a16="http://schemas.microsoft.com/office/drawing/2014/main" id="{169025DA-1FED-1FE0-9771-38F97A07C62B}"/>
+                <a16:creationId xmlns:a16="http://schemas.microsoft.com/office/drawing/2014/main" id="{E8CAEEF5-23D4-9B5C-E51C-04F62E78248E}"/>
               </a:ext>
             </a:extLst>
           </p:cNvPr>
@@ -5445,71 +5502,14 @@
         </p:blipFill>
         <p:spPr>
           <a:xfrm>
-            <a:off x="6084587" y="3283125"/>
-            <a:ext cx="5088194" cy="3061520"/>
+            <a:off x="6304423" y="3303633"/>
+            <a:ext cx="4903033" cy="2901847"/>
           </a:xfrm>
           <a:prstGeom prst="rect">
             <a:avLst/>
           </a:prstGeom>
         </p:spPr>
       </p:pic>
-      <p:sp>
-        <p:nvSpPr>
-          <p:cNvPr id="2" name="Fußzeilenplatzhalter 1">
-            <a:extLst>
-              <a:ext uri="{FF2B5EF4-FFF2-40B4-BE49-F238E27FC236}">
-                <a16:creationId xmlns:a16="http://schemas.microsoft.com/office/drawing/2014/main" id="{3831953B-1458-E626-C916-46717E29E13E}"/>
-              </a:ext>
-            </a:extLst>
-          </p:cNvPr>
-          <p:cNvSpPr>
-            <a:spLocks noGrp="1"/>
-          </p:cNvSpPr>
-          <p:nvPr>
-            <p:ph type="ftr" sz="quarter" idx="11"/>
-          </p:nvPr>
-        </p:nvSpPr>
-        <p:spPr/>
-        <p:txBody>
-          <a:bodyPr/>
-          <a:lstStyle/>
-          <a:p>
-            <a:r>
-              <a:rPr lang="de-DE"/>
-              <a:t>RWTH Aachen | Seminar Data Driven Foresight | 13.01.2025</a:t>
-            </a:r>
-          </a:p>
-        </p:txBody>
-      </p:sp>
-      <p:sp>
-        <p:nvSpPr>
-          <p:cNvPr id="3" name="Foliennummernplatzhalter 2">
-            <a:extLst>
-              <a:ext uri="{FF2B5EF4-FFF2-40B4-BE49-F238E27FC236}">
-                <a16:creationId xmlns:a16="http://schemas.microsoft.com/office/drawing/2014/main" id="{756087FE-A492-F6B7-2889-8E9C1FA1FB92}"/>
-              </a:ext>
-            </a:extLst>
-          </p:cNvPr>
-          <p:cNvSpPr>
-            <a:spLocks noGrp="1"/>
-          </p:cNvSpPr>
-          <p:nvPr>
-            <p:ph type="sldNum" sz="quarter" idx="12"/>
-          </p:nvPr>
-        </p:nvSpPr>
-        <p:spPr/>
-        <p:txBody>
-          <a:bodyPr/>
-          <a:lstStyle/>
-          <a:p>
-            <a:fld id="{330EA680-D336-4FF7-8B7A-9848BB0A1C32}" type="slidenum">
-              <a:rPr lang="en-GB" smtClean="0"/>
-              <a:t>10</a:t>
-            </a:fld>
-            <a:endParaRPr lang="de-DE"/>
-          </a:p>
-        </p:txBody>
-      </p:sp>
     </p:spTree>
     <p:extLst>
       <p:ext uri="{BB962C8B-B14F-4D97-AF65-F5344CB8AC3E}">
@@ -13829,16 +13829,7 @@
             </a:pPr>
             <a:r>
               <a:rPr lang="en-GB" dirty="0"/>
-              <a:t>The institution with the highest number of affiliations has more than 300 papers linked to it</a:t>
-            </a:r>
-          </a:p>
-          <a:p>
-            <a:pPr marL="285750" indent="-285750">
-              <a:buChar char="•"/>
-            </a:pPr>
-            <a:r>
-              <a:rPr lang="en-GB" dirty="0"/>
-              <a:t>All institutions researching polymers have published more than 10 papers on the topic – a few more than 100</a:t>
+              <a:t>The institution with the highest number of affiliations has more than 300 papers linked to it (not shown in image)</a:t>
             </a:r>
           </a:p>
         </p:txBody>
@@ -13902,10 +13893,10 @@
       </p:sp>
       <p:pic>
         <p:nvPicPr>
-          <p:cNvPr id="9" name="Content Placeholder 8" descr="A graph of a number of publications&#10;&#10;Description automatically generated">
+          <p:cNvPr id="7" name="Content Placeholder 6" descr="A graph of a number of publications&#10;&#10;Description automatically generated">
             <a:extLst>
               <a:ext uri="{FF2B5EF4-FFF2-40B4-BE49-F238E27FC236}">
-                <a16:creationId xmlns:a16="http://schemas.microsoft.com/office/drawing/2014/main" id="{4E89E306-C2A1-4172-8C50-4A02D7BBF8CD}"/>
+                <a16:creationId xmlns:a16="http://schemas.microsoft.com/office/drawing/2014/main" id="{4AE588DC-ADE3-B02E-B882-7D820F0E27FE}"/>
               </a:ext>
             </a:extLst>
           </p:cNvPr>

</xml_diff>